<commit_message>
Update to power point presentation
</commit_message>
<xml_diff>
--- a/Reapp Overview.pptx
+++ b/Reapp Overview.pptx
@@ -1,38 +1,38 @@
 
 <file path=ppt/presentation.xml><?xml version="1.0" encoding="utf-8"?>
-<p:presentation xmlns:a="http://schemas.openxmlformats.org/drawingml/2006/main" xmlns:r="http://schemas.openxmlformats.org/officeDocument/2006/relationships" xmlns:mc="http://schemas.openxmlformats.org/markup-compatibility/2006" xmlns:mv="urn:schemas-microsoft-com:mac:vml" xmlns:p="http://schemas.openxmlformats.org/presentationml/2006/main" xmlns:c="http://schemas.openxmlformats.org/drawingml/2006/chart" xmlns:dgm="http://schemas.openxmlformats.org/drawingml/2006/diagram" xmlns:o="urn:schemas-microsoft-com:office:office" xmlns:v="urn:schemas-microsoft-com:vml" xmlns:pvml="urn:schemas-microsoft-com:office:powerpoint" xmlns:com="http://schemas.openxmlformats.org/drawingml/2006/compatibility" xmlns:p14="http://schemas.microsoft.com/office/powerpoint/2010/main" autoCompressPictures="0" embedTrueTypeFonts="1" strictFirstAndLastChars="0" saveSubsetFonts="1">
+<p:presentation xmlns:a="http://schemas.openxmlformats.org/drawingml/2006/main" xmlns:r="http://schemas.openxmlformats.org/officeDocument/2006/relationships" xmlns:p="http://schemas.openxmlformats.org/presentationml/2006/main" strictFirstAndLastChars="0" embedTrueTypeFonts="1" saveSubsetFonts="1" autoCompressPictures="0">
   <p:sldMasterIdLst>
-    <p:sldMasterId id="2147483659" r:id="rId3"/>
+    <p:sldMasterId id="2147483659" r:id="rId1"/>
   </p:sldMasterIdLst>
   <p:notesMasterIdLst>
-    <p:notesMasterId r:id="rId4"/>
+    <p:notesMasterId r:id="rId8"/>
   </p:notesMasterIdLst>
   <p:sldIdLst>
-    <p:sldId id="256" r:id="rId5"/>
-    <p:sldId id="257" r:id="rId6"/>
-    <p:sldId id="258" r:id="rId7"/>
-    <p:sldId id="259" r:id="rId8"/>
-    <p:sldId id="260" r:id="rId9"/>
-    <p:sldId id="261" r:id="rId10"/>
+    <p:sldId id="256" r:id="rId2"/>
+    <p:sldId id="257" r:id="rId3"/>
+    <p:sldId id="258" r:id="rId4"/>
+    <p:sldId id="259" r:id="rId5"/>
+    <p:sldId id="260" r:id="rId6"/>
+    <p:sldId id="261" r:id="rId7"/>
   </p:sldIdLst>
-  <p:sldSz cy="5143500" cx="9144000"/>
+  <p:sldSz cx="9144000" cy="5143500" type="screen16x9"/>
   <p:notesSz cx="6858000" cy="9144000"/>
   <p:embeddedFontLst>
     <p:embeddedFont>
-      <p:font typeface="PT Sans Narrow"/>
+      <p:font typeface="PT Sans Narrow" panose="020B0604020202020204" charset="0"/>
+      <p:regular r:id="rId9"/>
+      <p:bold r:id="rId10"/>
+    </p:embeddedFont>
+    <p:embeddedFont>
+      <p:font typeface="Open Sans" panose="020B0604020202020204" charset="0"/>
       <p:regular r:id="rId11"/>
       <p:bold r:id="rId12"/>
-    </p:embeddedFont>
-    <p:embeddedFont>
-      <p:font typeface="Open Sans"/>
-      <p:regular r:id="rId13"/>
-      <p:bold r:id="rId14"/>
-      <p:italic r:id="rId15"/>
-      <p:boldItalic r:id="rId16"/>
+      <p:italic r:id="rId13"/>
+      <p:boldItalic r:id="rId14"/>
     </p:embeddedFont>
   </p:embeddedFontLst>
   <p:defaultTextStyle>
-    <a:defPPr lvl="0" marR="0" rtl="0" algn="l">
+    <a:defPPr marR="0" lvl="0" algn="l" rtl="0">
       <a:lnSpc>
         <a:spcPct val="100000"/>
       </a:lnSpc>
@@ -43,7 +43,7 @@
         <a:spcPts val="0"/>
       </a:spcAft>
     </a:defPPr>
-    <a:lvl1pPr lvl="0" marR="0" rtl="0" algn="l">
+    <a:lvl1pPr marR="0" lvl="0" algn="l" rtl="0">
       <a:lnSpc>
         <a:spcPct val="100000"/>
       </a:lnSpc>
@@ -54,7 +54,7 @@
         <a:spcPts val="0"/>
       </a:spcAft>
       <a:buNone/>
-      <a:defRPr b="0" i="0" sz="1400" u="none" cap="none" strike="noStrike">
+      <a:defRPr sz="1400" b="0" i="0" u="none" strike="noStrike" cap="none">
         <a:solidFill>
           <a:srgbClr val="000000"/>
         </a:solidFill>
@@ -64,7 +64,7 @@
         <a:sym typeface="Arial"/>
       </a:defRPr>
     </a:lvl1pPr>
-    <a:lvl2pPr lvl="1" marR="0" rtl="0" algn="l">
+    <a:lvl2pPr marR="0" lvl="1" algn="l" rtl="0">
       <a:lnSpc>
         <a:spcPct val="100000"/>
       </a:lnSpc>
@@ -75,7 +75,7 @@
         <a:spcPts val="0"/>
       </a:spcAft>
       <a:buNone/>
-      <a:defRPr b="0" i="0" sz="1400" u="none" cap="none" strike="noStrike">
+      <a:defRPr sz="1400" b="0" i="0" u="none" strike="noStrike" cap="none">
         <a:solidFill>
           <a:srgbClr val="000000"/>
         </a:solidFill>
@@ -85,7 +85,7 @@
         <a:sym typeface="Arial"/>
       </a:defRPr>
     </a:lvl2pPr>
-    <a:lvl3pPr lvl="2" marR="0" rtl="0" algn="l">
+    <a:lvl3pPr marR="0" lvl="2" algn="l" rtl="0">
       <a:lnSpc>
         <a:spcPct val="100000"/>
       </a:lnSpc>
@@ -96,7 +96,7 @@
         <a:spcPts val="0"/>
       </a:spcAft>
       <a:buNone/>
-      <a:defRPr b="0" i="0" sz="1400" u="none" cap="none" strike="noStrike">
+      <a:defRPr sz="1400" b="0" i="0" u="none" strike="noStrike" cap="none">
         <a:solidFill>
           <a:srgbClr val="000000"/>
         </a:solidFill>
@@ -106,7 +106,7 @@
         <a:sym typeface="Arial"/>
       </a:defRPr>
     </a:lvl3pPr>
-    <a:lvl4pPr lvl="3" marR="0" rtl="0" algn="l">
+    <a:lvl4pPr marR="0" lvl="3" algn="l" rtl="0">
       <a:lnSpc>
         <a:spcPct val="100000"/>
       </a:lnSpc>
@@ -117,7 +117,7 @@
         <a:spcPts val="0"/>
       </a:spcAft>
       <a:buNone/>
-      <a:defRPr b="0" i="0" sz="1400" u="none" cap="none" strike="noStrike">
+      <a:defRPr sz="1400" b="0" i="0" u="none" strike="noStrike" cap="none">
         <a:solidFill>
           <a:srgbClr val="000000"/>
         </a:solidFill>
@@ -127,7 +127,7 @@
         <a:sym typeface="Arial"/>
       </a:defRPr>
     </a:lvl4pPr>
-    <a:lvl5pPr lvl="4" marR="0" rtl="0" algn="l">
+    <a:lvl5pPr marR="0" lvl="4" algn="l" rtl="0">
       <a:lnSpc>
         <a:spcPct val="100000"/>
       </a:lnSpc>
@@ -138,7 +138,7 @@
         <a:spcPts val="0"/>
       </a:spcAft>
       <a:buNone/>
-      <a:defRPr b="0" i="0" sz="1400" u="none" cap="none" strike="noStrike">
+      <a:defRPr sz="1400" b="0" i="0" u="none" strike="noStrike" cap="none">
         <a:solidFill>
           <a:srgbClr val="000000"/>
         </a:solidFill>
@@ -148,7 +148,7 @@
         <a:sym typeface="Arial"/>
       </a:defRPr>
     </a:lvl5pPr>
-    <a:lvl6pPr lvl="5" marR="0" rtl="0" algn="l">
+    <a:lvl6pPr marR="0" lvl="5" algn="l" rtl="0">
       <a:lnSpc>
         <a:spcPct val="100000"/>
       </a:lnSpc>
@@ -159,7 +159,7 @@
         <a:spcPts val="0"/>
       </a:spcAft>
       <a:buNone/>
-      <a:defRPr b="0" i="0" sz="1400" u="none" cap="none" strike="noStrike">
+      <a:defRPr sz="1400" b="0" i="0" u="none" strike="noStrike" cap="none">
         <a:solidFill>
           <a:srgbClr val="000000"/>
         </a:solidFill>
@@ -169,7 +169,7 @@
         <a:sym typeface="Arial"/>
       </a:defRPr>
     </a:lvl6pPr>
-    <a:lvl7pPr lvl="6" marR="0" rtl="0" algn="l">
+    <a:lvl7pPr marR="0" lvl="6" algn="l" rtl="0">
       <a:lnSpc>
         <a:spcPct val="100000"/>
       </a:lnSpc>
@@ -180,7 +180,7 @@
         <a:spcPts val="0"/>
       </a:spcAft>
       <a:buNone/>
-      <a:defRPr b="0" i="0" sz="1400" u="none" cap="none" strike="noStrike">
+      <a:defRPr sz="1400" b="0" i="0" u="none" strike="noStrike" cap="none">
         <a:solidFill>
           <a:srgbClr val="000000"/>
         </a:solidFill>
@@ -190,7 +190,7 @@
         <a:sym typeface="Arial"/>
       </a:defRPr>
     </a:lvl7pPr>
-    <a:lvl8pPr lvl="7" marR="0" rtl="0" algn="l">
+    <a:lvl8pPr marR="0" lvl="7" algn="l" rtl="0">
       <a:lnSpc>
         <a:spcPct val="100000"/>
       </a:lnSpc>
@@ -201,7 +201,7 @@
         <a:spcPts val="0"/>
       </a:spcAft>
       <a:buNone/>
-      <a:defRPr b="0" i="0" sz="1400" u="none" cap="none" strike="noStrike">
+      <a:defRPr sz="1400" b="0" i="0" u="none" strike="noStrike" cap="none">
         <a:solidFill>
           <a:srgbClr val="000000"/>
         </a:solidFill>
@@ -211,7 +211,7 @@
         <a:sym typeface="Arial"/>
       </a:defRPr>
     </a:lvl8pPr>
-    <a:lvl9pPr lvl="8" marR="0" rtl="0" algn="l">
+    <a:lvl9pPr marR="0" lvl="8" algn="l" rtl="0">
       <a:lnSpc>
         <a:spcPct val="100000"/>
       </a:lnSpc>
@@ -222,7 +222,7 @@
         <a:spcPts val="0"/>
       </a:spcAft>
       <a:buNone/>
-      <a:defRPr b="0" i="0" sz="1400" u="none" cap="none" strike="noStrike">
+      <a:defRPr sz="1400" b="0" i="0" u="none" strike="noStrike" cap="none">
         <a:solidFill>
           <a:srgbClr val="000000"/>
         </a:solidFill>
@@ -236,12 +236,17 @@
 </p:presentation>
 </file>
 
-<file path=ppt/notesMasters/notesMaster.xml><?xml version="1.0" encoding="utf-8"?>
-<p:notesMaster xmlns:a="http://schemas.openxmlformats.org/drawingml/2006/main" xmlns:r="http://schemas.openxmlformats.org/officeDocument/2006/relationships" xmlns:mc="http://schemas.openxmlformats.org/markup-compatibility/2006" xmlns:mv="urn:schemas-microsoft-com:mac:vml" xmlns:p="http://schemas.openxmlformats.org/presentationml/2006/main" xmlns:c="http://schemas.openxmlformats.org/drawingml/2006/chart" xmlns:dgm="http://schemas.openxmlformats.org/drawingml/2006/diagram" xmlns:o="urn:schemas-microsoft-com:office:office" xmlns:v="urn:schemas-microsoft-com:vml" xmlns:pvml="urn:schemas-microsoft-com:office:powerpoint" xmlns:com="http://schemas.openxmlformats.org/drawingml/2006/compatibility" xmlns:p14="http://schemas.microsoft.com/office/powerpoint/2010/main">
+<file path=ppt/notesMasters/notesMaster1.xml><?xml version="1.0" encoding="utf-8"?>
+<p:notesMaster xmlns:a="http://schemas.openxmlformats.org/drawingml/2006/main" xmlns:r="http://schemas.openxmlformats.org/officeDocument/2006/relationships" xmlns:p="http://schemas.openxmlformats.org/presentationml/2006/main">
   <p:cSld>
+    <p:bg>
+      <p:bgRef idx="1001">
+        <a:schemeClr val="bg1"/>
+      </p:bgRef>
+    </p:bg>
     <p:spTree>
       <p:nvGrpSpPr>
-        <p:cNvPr id="2" name="Shape 2"/>
+        <p:cNvPr id="1" name="Shape 2"/>
         <p:cNvGrpSpPr/>
         <p:nvPr/>
       </p:nvGrpSpPr>
@@ -256,9 +261,11 @@
       <p:sp>
         <p:nvSpPr>
           <p:cNvPr id="3" name="Shape 3"/>
-          <p:cNvSpPr/>
+          <p:cNvSpPr>
+            <a:spLocks noGrp="1" noRot="1" noChangeAspect="1"/>
+          </p:cNvSpPr>
           <p:nvPr>
-            <p:ph idx="2" type="sldImg"/>
+            <p:ph type="sldImg" idx="2"/>
           </p:nvPr>
         </p:nvSpPr>
         <p:spPr>
@@ -267,8 +274,13 @@
             <a:ext cx="6096075" cy="3429000"/>
           </a:xfrm>
           <a:custGeom>
+            <a:avLst/>
+            <a:gdLst/>
+            <a:ahLst/>
+            <a:cxnLst/>
+            <a:rect l="0" t="0" r="0" b="0"/>
             <a:pathLst>
-              <a:path extrusionOk="0" h="120000" w="120000">
+              <a:path w="120000" h="120000" extrusionOk="0">
                 <a:moveTo>
                   <a:pt x="0" y="0"/>
                 </a:moveTo>
@@ -286,23 +298,25 @@
             </a:pathLst>
           </a:custGeom>
           <a:noFill/>
-          <a:ln cap="flat" cmpd="sng" w="9525">
+          <a:ln w="9525" cap="flat" cmpd="sng">
             <a:solidFill>
               <a:srgbClr val="000000"/>
             </a:solidFill>
             <a:prstDash val="solid"/>
             <a:round/>
-            <a:headEnd len="med" w="med" type="none"/>
-            <a:tailEnd len="med" w="med" type="none"/>
+            <a:headEnd type="none" w="med" len="med"/>
+            <a:tailEnd type="none" w="med" len="med"/>
           </a:ln>
         </p:spPr>
       </p:sp>
       <p:sp>
         <p:nvSpPr>
           <p:cNvPr id="4" name="Shape 4"/>
-          <p:cNvSpPr txBox="1"/>
+          <p:cNvSpPr txBox="1">
+            <a:spLocks noGrp="1"/>
+          </p:cNvSpPr>
           <p:nvPr>
-            <p:ph idx="1" type="body"/>
+            <p:ph type="body" idx="1"/>
           </p:nvPr>
         </p:nvSpPr>
         <p:spPr>
@@ -319,7 +333,7 @@
           </a:ln>
         </p:spPr>
         <p:txBody>
-          <a:bodyPr anchorCtr="0" anchor="t" bIns="91425" lIns="91425" rIns="91425" tIns="91425"/>
+          <a:bodyPr lIns="91425" tIns="91425" rIns="91425" bIns="91425" anchor="t" anchorCtr="0"/>
           <a:lstStyle>
             <a:lvl1pPr lvl="0">
               <a:spcBef>
@@ -376,21 +390,120 @@
               <a:defRPr sz="1100"/>
             </a:lvl9pPr>
           </a:lstStyle>
-          <a:p/>
+          <a:p>
+            <a:endParaRPr/>
+          </a:p>
         </p:txBody>
       </p:sp>
     </p:spTree>
+    <p:extLst>
+      <p:ext uri="{BB962C8B-B14F-4D97-AF65-F5344CB8AC3E}">
+        <p14:creationId xmlns:p14="http://schemas.microsoft.com/office/powerpoint/2010/main" val="1920338475"/>
+      </p:ext>
+    </p:extLst>
   </p:cSld>
-  <p:clrMap accent1="accent1" accent2="accent2" accent3="accent3" accent4="accent4" accent5="accent5" accent6="accent6" bg1="lt1" bg2="dk2" tx1="dk1" tx2="lt2" folHlink="folHlink" hlink="hlink"/>
+  <p:clrMap bg1="lt1" tx1="dk1" bg2="dk2" tx2="lt2" accent1="accent1" accent2="accent2" accent3="accent3" accent4="accent4" accent5="accent5" accent6="accent6" hlink="hlink" folHlink="folHlink"/>
+  <p:notesStyle>
+    <a:lvl1pPr marL="0" algn="l" defTabSz="914400" rtl="0" eaLnBrk="1" latinLnBrk="0" hangingPunct="1">
+      <a:defRPr sz="1200" kern="1200">
+        <a:solidFill>
+          <a:schemeClr val="tx1"/>
+        </a:solidFill>
+        <a:latin typeface="+mn-lt"/>
+        <a:ea typeface="+mn-ea"/>
+        <a:cs typeface="+mn-cs"/>
+      </a:defRPr>
+    </a:lvl1pPr>
+    <a:lvl2pPr marL="457200" algn="l" defTabSz="914400" rtl="0" eaLnBrk="1" latinLnBrk="0" hangingPunct="1">
+      <a:defRPr sz="1200" kern="1200">
+        <a:solidFill>
+          <a:schemeClr val="tx1"/>
+        </a:solidFill>
+        <a:latin typeface="+mn-lt"/>
+        <a:ea typeface="+mn-ea"/>
+        <a:cs typeface="+mn-cs"/>
+      </a:defRPr>
+    </a:lvl2pPr>
+    <a:lvl3pPr marL="914400" algn="l" defTabSz="914400" rtl="0" eaLnBrk="1" latinLnBrk="0" hangingPunct="1">
+      <a:defRPr sz="1200" kern="1200">
+        <a:solidFill>
+          <a:schemeClr val="tx1"/>
+        </a:solidFill>
+        <a:latin typeface="+mn-lt"/>
+        <a:ea typeface="+mn-ea"/>
+        <a:cs typeface="+mn-cs"/>
+      </a:defRPr>
+    </a:lvl3pPr>
+    <a:lvl4pPr marL="1371600" algn="l" defTabSz="914400" rtl="0" eaLnBrk="1" latinLnBrk="0" hangingPunct="1">
+      <a:defRPr sz="1200" kern="1200">
+        <a:solidFill>
+          <a:schemeClr val="tx1"/>
+        </a:solidFill>
+        <a:latin typeface="+mn-lt"/>
+        <a:ea typeface="+mn-ea"/>
+        <a:cs typeface="+mn-cs"/>
+      </a:defRPr>
+    </a:lvl4pPr>
+    <a:lvl5pPr marL="1828800" algn="l" defTabSz="914400" rtl="0" eaLnBrk="1" latinLnBrk="0" hangingPunct="1">
+      <a:defRPr sz="1200" kern="1200">
+        <a:solidFill>
+          <a:schemeClr val="tx1"/>
+        </a:solidFill>
+        <a:latin typeface="+mn-lt"/>
+        <a:ea typeface="+mn-ea"/>
+        <a:cs typeface="+mn-cs"/>
+      </a:defRPr>
+    </a:lvl5pPr>
+    <a:lvl6pPr marL="2286000" algn="l" defTabSz="914400" rtl="0" eaLnBrk="1" latinLnBrk="0" hangingPunct="1">
+      <a:defRPr sz="1200" kern="1200">
+        <a:solidFill>
+          <a:schemeClr val="tx1"/>
+        </a:solidFill>
+        <a:latin typeface="+mn-lt"/>
+        <a:ea typeface="+mn-ea"/>
+        <a:cs typeface="+mn-cs"/>
+      </a:defRPr>
+    </a:lvl6pPr>
+    <a:lvl7pPr marL="2743200" algn="l" defTabSz="914400" rtl="0" eaLnBrk="1" latinLnBrk="0" hangingPunct="1">
+      <a:defRPr sz="1200" kern="1200">
+        <a:solidFill>
+          <a:schemeClr val="tx1"/>
+        </a:solidFill>
+        <a:latin typeface="+mn-lt"/>
+        <a:ea typeface="+mn-ea"/>
+        <a:cs typeface="+mn-cs"/>
+      </a:defRPr>
+    </a:lvl7pPr>
+    <a:lvl8pPr marL="3200400" algn="l" defTabSz="914400" rtl="0" eaLnBrk="1" latinLnBrk="0" hangingPunct="1">
+      <a:defRPr sz="1200" kern="1200">
+        <a:solidFill>
+          <a:schemeClr val="tx1"/>
+        </a:solidFill>
+        <a:latin typeface="+mn-lt"/>
+        <a:ea typeface="+mn-ea"/>
+        <a:cs typeface="+mn-cs"/>
+      </a:defRPr>
+    </a:lvl8pPr>
+    <a:lvl9pPr marL="3657600" algn="l" defTabSz="914400" rtl="0" eaLnBrk="1" latinLnBrk="0" hangingPunct="1">
+      <a:defRPr sz="1200" kern="1200">
+        <a:solidFill>
+          <a:schemeClr val="tx1"/>
+        </a:solidFill>
+        <a:latin typeface="+mn-lt"/>
+        <a:ea typeface="+mn-ea"/>
+        <a:cs typeface="+mn-cs"/>
+      </a:defRPr>
+    </a:lvl9pPr>
+  </p:notesStyle>
 </p:notesMaster>
 </file>
 
-<file path=ppt/notesSlides/notesSlide.xml><?xml version="1.0" encoding="utf-8"?>
-<p:notes xmlns:a="http://schemas.openxmlformats.org/drawingml/2006/main" xmlns:r="http://schemas.openxmlformats.org/officeDocument/2006/relationships" xmlns:mc="http://schemas.openxmlformats.org/markup-compatibility/2006" xmlns:mv="urn:schemas-microsoft-com:mac:vml" xmlns:p="http://schemas.openxmlformats.org/presentationml/2006/main" xmlns:c="http://schemas.openxmlformats.org/drawingml/2006/chart" xmlns:dgm="http://schemas.openxmlformats.org/drawingml/2006/diagram" xmlns:o="urn:schemas-microsoft-com:office:office" xmlns:v="urn:schemas-microsoft-com:vml" xmlns:pvml="urn:schemas-microsoft-com:office:powerpoint" xmlns:com="http://schemas.openxmlformats.org/drawingml/2006/compatibility" xmlns:p14="http://schemas.microsoft.com/office/powerpoint/2010/main" showMasterPhAnim="0" showMasterSp="0">
+<file path=ppt/notesSlides/notesSlide1.xml><?xml version="1.0" encoding="utf-8"?>
+<p:notes xmlns:a="http://schemas.openxmlformats.org/drawingml/2006/main" xmlns:r="http://schemas.openxmlformats.org/officeDocument/2006/relationships" xmlns:p="http://schemas.openxmlformats.org/presentationml/2006/main" showMasterSp="0" showMasterPhAnim="0">
   <p:cSld>
     <p:spTree>
       <p:nvGrpSpPr>
-        <p:cNvPr id="62" name="Shape 62"/>
+        <p:cNvPr id="1" name="Shape 62"/>
         <p:cNvGrpSpPr/>
         <p:nvPr/>
       </p:nvGrpSpPr>
@@ -405,9 +518,11 @@
       <p:sp>
         <p:nvSpPr>
           <p:cNvPr id="63" name="Shape 63"/>
-          <p:cNvSpPr/>
+          <p:cNvSpPr>
+            <a:spLocks noGrp="1" noRot="1" noChangeAspect="1"/>
+          </p:cNvSpPr>
           <p:nvPr>
-            <p:ph idx="2" type="sldImg"/>
+            <p:ph type="sldImg" idx="2"/>
           </p:nvPr>
         </p:nvSpPr>
         <p:spPr>
@@ -416,8 +531,13 @@
             <a:ext cx="6096075" cy="3429000"/>
           </a:xfrm>
           <a:custGeom>
+            <a:avLst/>
+            <a:gdLst/>
+            <a:ahLst/>
+            <a:cxnLst/>
+            <a:rect l="0" t="0" r="0" b="0"/>
             <a:pathLst>
-              <a:path extrusionOk="0" h="120000" w="120000">
+              <a:path w="120000" h="120000" extrusionOk="0">
                 <a:moveTo>
                   <a:pt x="0" y="0"/>
                 </a:moveTo>
@@ -439,9 +559,11 @@
       <p:sp>
         <p:nvSpPr>
           <p:cNvPr id="64" name="Shape 64"/>
-          <p:cNvSpPr txBox="1"/>
+          <p:cNvSpPr txBox="1">
+            <a:spLocks noGrp="1"/>
+          </p:cNvSpPr>
           <p:nvPr>
-            <p:ph idx="1" type="body"/>
+            <p:ph type="body" idx="1"/>
           </p:nvPr>
         </p:nvSpPr>
         <p:spPr>
@@ -454,7 +576,7 @@
           </a:prstGeom>
         </p:spPr>
         <p:txBody>
-          <a:bodyPr anchorCtr="0" anchor="t" bIns="91425" lIns="91425" rIns="91425" tIns="91425">
+          <a:bodyPr lIns="91425" tIns="91425" rIns="91425" bIns="91425" anchor="t" anchorCtr="0">
             <a:noAutofit/>
           </a:bodyPr>
           <a:lstStyle/>
@@ -465,9 +587,6 @@
               </a:spcBef>
               <a:buNone/>
             </a:pPr>
-            <a:r>
-              <a:t/>
-            </a:r>
             <a:endParaRPr/>
           </a:p>
         </p:txBody>
@@ -480,12 +599,12 @@
 </p:notes>
 </file>
 
-<file path=ppt/notesSlides/notesSlide1.xml><?xml version="1.0" encoding="utf-8"?>
-<p:notes xmlns:a="http://schemas.openxmlformats.org/drawingml/2006/main" xmlns:r="http://schemas.openxmlformats.org/officeDocument/2006/relationships" xmlns:mc="http://schemas.openxmlformats.org/markup-compatibility/2006" xmlns:mv="urn:schemas-microsoft-com:mac:vml" xmlns:p="http://schemas.openxmlformats.org/presentationml/2006/main" xmlns:c="http://schemas.openxmlformats.org/drawingml/2006/chart" xmlns:dgm="http://schemas.openxmlformats.org/drawingml/2006/diagram" xmlns:o="urn:schemas-microsoft-com:office:office" xmlns:v="urn:schemas-microsoft-com:vml" xmlns:pvml="urn:schemas-microsoft-com:office:powerpoint" xmlns:com="http://schemas.openxmlformats.org/drawingml/2006/compatibility" xmlns:p14="http://schemas.microsoft.com/office/powerpoint/2010/main" showMasterPhAnim="0" showMasterSp="0">
+<file path=ppt/notesSlides/notesSlide2.xml><?xml version="1.0" encoding="utf-8"?>
+<p:notes xmlns:a="http://schemas.openxmlformats.org/drawingml/2006/main" xmlns:r="http://schemas.openxmlformats.org/officeDocument/2006/relationships" xmlns:p="http://schemas.openxmlformats.org/presentationml/2006/main" showMasterSp="0" showMasterPhAnim="0">
   <p:cSld>
     <p:spTree>
       <p:nvGrpSpPr>
-        <p:cNvPr id="68" name="Shape 68"/>
+        <p:cNvPr id="1" name="Shape 68"/>
         <p:cNvGrpSpPr/>
         <p:nvPr/>
       </p:nvGrpSpPr>
@@ -500,9 +619,11 @@
       <p:sp>
         <p:nvSpPr>
           <p:cNvPr id="69" name="Shape 69"/>
-          <p:cNvSpPr/>
+          <p:cNvSpPr>
+            <a:spLocks noGrp="1" noRot="1" noChangeAspect="1"/>
+          </p:cNvSpPr>
           <p:nvPr>
-            <p:ph idx="2" type="sldImg"/>
+            <p:ph type="sldImg" idx="2"/>
           </p:nvPr>
         </p:nvSpPr>
         <p:spPr>
@@ -511,8 +632,13 @@
             <a:ext cx="6096000" cy="3429000"/>
           </a:xfrm>
           <a:custGeom>
+            <a:avLst/>
+            <a:gdLst/>
+            <a:ahLst/>
+            <a:cxnLst/>
+            <a:rect l="0" t="0" r="0" b="0"/>
             <a:pathLst>
-              <a:path extrusionOk="0" h="120000" w="120000">
+              <a:path w="120000" h="120000" extrusionOk="0">
                 <a:moveTo>
                   <a:pt x="0" y="0"/>
                 </a:moveTo>
@@ -534,9 +660,11 @@
       <p:sp>
         <p:nvSpPr>
           <p:cNvPr id="70" name="Shape 70"/>
-          <p:cNvSpPr txBox="1"/>
+          <p:cNvSpPr txBox="1">
+            <a:spLocks noGrp="1"/>
+          </p:cNvSpPr>
           <p:nvPr>
-            <p:ph idx="1" type="body"/>
+            <p:ph type="body" idx="1"/>
           </p:nvPr>
         </p:nvSpPr>
         <p:spPr>
@@ -549,7 +677,7 @@
           </a:prstGeom>
         </p:spPr>
         <p:txBody>
-          <a:bodyPr anchorCtr="0" anchor="t" bIns="91425" lIns="91425" rIns="91425" tIns="91425">
+          <a:bodyPr lIns="91425" tIns="91425" rIns="91425" bIns="91425" anchor="t" anchorCtr="0">
             <a:noAutofit/>
           </a:bodyPr>
           <a:lstStyle/>
@@ -575,12 +703,12 @@
 </p:notes>
 </file>
 
-<file path=ppt/notesSlides/notesSlide2.xml><?xml version="1.0" encoding="utf-8"?>
-<p:notes xmlns:a="http://schemas.openxmlformats.org/drawingml/2006/main" xmlns:r="http://schemas.openxmlformats.org/officeDocument/2006/relationships" xmlns:mc="http://schemas.openxmlformats.org/markup-compatibility/2006" xmlns:mv="urn:schemas-microsoft-com:mac:vml" xmlns:p="http://schemas.openxmlformats.org/presentationml/2006/main" xmlns:c="http://schemas.openxmlformats.org/drawingml/2006/chart" xmlns:dgm="http://schemas.openxmlformats.org/drawingml/2006/diagram" xmlns:o="urn:schemas-microsoft-com:office:office" xmlns:v="urn:schemas-microsoft-com:vml" xmlns:pvml="urn:schemas-microsoft-com:office:powerpoint" xmlns:com="http://schemas.openxmlformats.org/drawingml/2006/compatibility" xmlns:p14="http://schemas.microsoft.com/office/powerpoint/2010/main" showMasterPhAnim="0" showMasterSp="0">
+<file path=ppt/notesSlides/notesSlide3.xml><?xml version="1.0" encoding="utf-8"?>
+<p:notes xmlns:a="http://schemas.openxmlformats.org/drawingml/2006/main" xmlns:r="http://schemas.openxmlformats.org/officeDocument/2006/relationships" xmlns:p="http://schemas.openxmlformats.org/presentationml/2006/main" showMasterSp="0" showMasterPhAnim="0">
   <p:cSld>
     <p:spTree>
       <p:nvGrpSpPr>
-        <p:cNvPr id="74" name="Shape 74"/>
+        <p:cNvPr id="1" name="Shape 74"/>
         <p:cNvGrpSpPr/>
         <p:nvPr/>
       </p:nvGrpSpPr>
@@ -595,9 +723,11 @@
       <p:sp>
         <p:nvSpPr>
           <p:cNvPr id="75" name="Shape 75"/>
-          <p:cNvSpPr/>
+          <p:cNvSpPr>
+            <a:spLocks noGrp="1" noRot="1" noChangeAspect="1"/>
+          </p:cNvSpPr>
           <p:nvPr>
-            <p:ph idx="2" type="sldImg"/>
+            <p:ph type="sldImg" idx="2"/>
           </p:nvPr>
         </p:nvSpPr>
         <p:spPr>
@@ -606,8 +736,13 @@
             <a:ext cx="6096000" cy="3429000"/>
           </a:xfrm>
           <a:custGeom>
+            <a:avLst/>
+            <a:gdLst/>
+            <a:ahLst/>
+            <a:cxnLst/>
+            <a:rect l="0" t="0" r="0" b="0"/>
             <a:pathLst>
-              <a:path extrusionOk="0" h="120000" w="120000">
+              <a:path w="120000" h="120000" extrusionOk="0">
                 <a:moveTo>
                   <a:pt x="0" y="0"/>
                 </a:moveTo>
@@ -629,9 +764,11 @@
       <p:sp>
         <p:nvSpPr>
           <p:cNvPr id="76" name="Shape 76"/>
-          <p:cNvSpPr txBox="1"/>
+          <p:cNvSpPr txBox="1">
+            <a:spLocks noGrp="1"/>
+          </p:cNvSpPr>
           <p:nvPr>
-            <p:ph idx="1" type="body"/>
+            <p:ph type="body" idx="1"/>
           </p:nvPr>
         </p:nvSpPr>
         <p:spPr>
@@ -644,7 +781,7 @@
           </a:prstGeom>
         </p:spPr>
         <p:txBody>
-          <a:bodyPr anchorCtr="0" anchor="t" bIns="91425" lIns="91425" rIns="91425" tIns="91425">
+          <a:bodyPr lIns="91425" tIns="91425" rIns="91425" bIns="91425" anchor="t" anchorCtr="0">
             <a:noAutofit/>
           </a:bodyPr>
           <a:lstStyle/>
@@ -727,9 +864,6 @@
               </a:spcBef>
               <a:buNone/>
             </a:pPr>
-            <a:r>
-              <a:t/>
-            </a:r>
             <a:endParaRPr/>
           </a:p>
         </p:txBody>
@@ -742,12 +876,12 @@
 </p:notes>
 </file>
 
-<file path=ppt/notesSlides/notesSlide3.xml><?xml version="1.0" encoding="utf-8"?>
-<p:notes xmlns:a="http://schemas.openxmlformats.org/drawingml/2006/main" xmlns:r="http://schemas.openxmlformats.org/officeDocument/2006/relationships" xmlns:mc="http://schemas.openxmlformats.org/markup-compatibility/2006" xmlns:mv="urn:schemas-microsoft-com:mac:vml" xmlns:p="http://schemas.openxmlformats.org/presentationml/2006/main" xmlns:c="http://schemas.openxmlformats.org/drawingml/2006/chart" xmlns:dgm="http://schemas.openxmlformats.org/drawingml/2006/diagram" xmlns:o="urn:schemas-microsoft-com:office:office" xmlns:v="urn:schemas-microsoft-com:vml" xmlns:pvml="urn:schemas-microsoft-com:office:powerpoint" xmlns:com="http://schemas.openxmlformats.org/drawingml/2006/compatibility" xmlns:p14="http://schemas.microsoft.com/office/powerpoint/2010/main" showMasterPhAnim="0" showMasterSp="0">
+<file path=ppt/notesSlides/notesSlide4.xml><?xml version="1.0" encoding="utf-8"?>
+<p:notes xmlns:a="http://schemas.openxmlformats.org/drawingml/2006/main" xmlns:r="http://schemas.openxmlformats.org/officeDocument/2006/relationships" xmlns:p="http://schemas.openxmlformats.org/presentationml/2006/main" showMasterSp="0" showMasterPhAnim="0">
   <p:cSld>
     <p:spTree>
       <p:nvGrpSpPr>
-        <p:cNvPr id="80" name="Shape 80"/>
+        <p:cNvPr id="1" name="Shape 80"/>
         <p:cNvGrpSpPr/>
         <p:nvPr/>
       </p:nvGrpSpPr>
@@ -762,9 +896,11 @@
       <p:sp>
         <p:nvSpPr>
           <p:cNvPr id="81" name="Shape 81"/>
-          <p:cNvSpPr/>
+          <p:cNvSpPr>
+            <a:spLocks noGrp="1" noRot="1" noChangeAspect="1"/>
+          </p:cNvSpPr>
           <p:nvPr>
-            <p:ph idx="2" type="sldImg"/>
+            <p:ph type="sldImg" idx="2"/>
           </p:nvPr>
         </p:nvSpPr>
         <p:spPr>
@@ -773,8 +909,13 @@
             <a:ext cx="6096000" cy="3429000"/>
           </a:xfrm>
           <a:custGeom>
+            <a:avLst/>
+            <a:gdLst/>
+            <a:ahLst/>
+            <a:cxnLst/>
+            <a:rect l="0" t="0" r="0" b="0"/>
             <a:pathLst>
-              <a:path extrusionOk="0" h="120000" w="120000">
+              <a:path w="120000" h="120000" extrusionOk="0">
                 <a:moveTo>
                   <a:pt x="0" y="0"/>
                 </a:moveTo>
@@ -796,9 +937,11 @@
       <p:sp>
         <p:nvSpPr>
           <p:cNvPr id="82" name="Shape 82"/>
-          <p:cNvSpPr txBox="1"/>
+          <p:cNvSpPr txBox="1">
+            <a:spLocks noGrp="1"/>
+          </p:cNvSpPr>
           <p:nvPr>
-            <p:ph idx="1" type="body"/>
+            <p:ph type="body" idx="1"/>
           </p:nvPr>
         </p:nvSpPr>
         <p:spPr>
@@ -811,7 +954,7 @@
           </a:prstGeom>
         </p:spPr>
         <p:txBody>
-          <a:bodyPr anchorCtr="0" anchor="t" bIns="91425" lIns="91425" rIns="91425" tIns="91425">
+          <a:bodyPr lIns="91425" tIns="91425" rIns="91425" bIns="91425" anchor="t" anchorCtr="0">
             <a:noAutofit/>
           </a:bodyPr>
           <a:lstStyle/>
@@ -837,12 +980,12 @@
 </p:notes>
 </file>
 
-<file path=ppt/notesSlides/notesSlide4.xml><?xml version="1.0" encoding="utf-8"?>
-<p:notes xmlns:a="http://schemas.openxmlformats.org/drawingml/2006/main" xmlns:r="http://schemas.openxmlformats.org/officeDocument/2006/relationships" xmlns:mc="http://schemas.openxmlformats.org/markup-compatibility/2006" xmlns:mv="urn:schemas-microsoft-com:mac:vml" xmlns:p="http://schemas.openxmlformats.org/presentationml/2006/main" xmlns:c="http://schemas.openxmlformats.org/drawingml/2006/chart" xmlns:dgm="http://schemas.openxmlformats.org/drawingml/2006/diagram" xmlns:o="urn:schemas-microsoft-com:office:office" xmlns:v="urn:schemas-microsoft-com:vml" xmlns:pvml="urn:schemas-microsoft-com:office:powerpoint" xmlns:com="http://schemas.openxmlformats.org/drawingml/2006/compatibility" xmlns:p14="http://schemas.microsoft.com/office/powerpoint/2010/main" showMasterPhAnim="0" showMasterSp="0">
+<file path=ppt/notesSlides/notesSlide5.xml><?xml version="1.0" encoding="utf-8"?>
+<p:notes xmlns:a="http://schemas.openxmlformats.org/drawingml/2006/main" xmlns:r="http://schemas.openxmlformats.org/officeDocument/2006/relationships" xmlns:p="http://schemas.openxmlformats.org/presentationml/2006/main" showMasterSp="0" showMasterPhAnim="0">
   <p:cSld>
     <p:spTree>
       <p:nvGrpSpPr>
-        <p:cNvPr id="86" name="Shape 86"/>
+        <p:cNvPr id="1" name="Shape 86"/>
         <p:cNvGrpSpPr/>
         <p:nvPr/>
       </p:nvGrpSpPr>
@@ -857,19 +1000,26 @@
       <p:sp>
         <p:nvSpPr>
           <p:cNvPr id="87" name="Shape 87"/>
-          <p:cNvSpPr/>
+          <p:cNvSpPr>
+            <a:spLocks noGrp="1" noRot="1" noChangeAspect="1"/>
+          </p:cNvSpPr>
           <p:nvPr>
-            <p:ph idx="2" type="sldImg"/>
+            <p:ph type="sldImg" idx="2"/>
           </p:nvPr>
         </p:nvSpPr>
         <p:spPr>
           <a:xfrm>
-            <a:off x="381300" y="685800"/>
+            <a:off x="381000" y="685800"/>
             <a:ext cx="6096000" cy="3429000"/>
           </a:xfrm>
           <a:custGeom>
+            <a:avLst/>
+            <a:gdLst/>
+            <a:ahLst/>
+            <a:cxnLst/>
+            <a:rect l="0" t="0" r="0" b="0"/>
             <a:pathLst>
-              <a:path extrusionOk="0" h="120000" w="120000">
+              <a:path w="120000" h="120000" extrusionOk="0">
                 <a:moveTo>
                   <a:pt x="0" y="0"/>
                 </a:moveTo>
@@ -891,9 +1041,11 @@
       <p:sp>
         <p:nvSpPr>
           <p:cNvPr id="88" name="Shape 88"/>
-          <p:cNvSpPr txBox="1"/>
+          <p:cNvSpPr txBox="1">
+            <a:spLocks noGrp="1"/>
+          </p:cNvSpPr>
           <p:nvPr>
-            <p:ph idx="1" type="body"/>
+            <p:ph type="body" idx="1"/>
           </p:nvPr>
         </p:nvSpPr>
         <p:spPr>
@@ -906,7 +1058,7 @@
           </a:prstGeom>
         </p:spPr>
         <p:txBody>
-          <a:bodyPr anchorCtr="0" anchor="t" bIns="91425" lIns="91425" rIns="91425" tIns="91425">
+          <a:bodyPr lIns="91425" tIns="91425" rIns="91425" bIns="91425" anchor="t" anchorCtr="0">
             <a:noAutofit/>
           </a:bodyPr>
           <a:lstStyle/>
@@ -917,9 +1069,6 @@
               </a:spcBef>
               <a:buNone/>
             </a:pPr>
-            <a:r>
-              <a:t/>
-            </a:r>
             <a:endParaRPr/>
           </a:p>
         </p:txBody>
@@ -932,12 +1081,12 @@
 </p:notes>
 </file>
 
-<file path=ppt/notesSlides/notesSlide5.xml><?xml version="1.0" encoding="utf-8"?>
-<p:notes xmlns:a="http://schemas.openxmlformats.org/drawingml/2006/main" xmlns:r="http://schemas.openxmlformats.org/officeDocument/2006/relationships" xmlns:mc="http://schemas.openxmlformats.org/markup-compatibility/2006" xmlns:mv="urn:schemas-microsoft-com:mac:vml" xmlns:p="http://schemas.openxmlformats.org/presentationml/2006/main" xmlns:c="http://schemas.openxmlformats.org/drawingml/2006/chart" xmlns:dgm="http://schemas.openxmlformats.org/drawingml/2006/diagram" xmlns:o="urn:schemas-microsoft-com:office:office" xmlns:v="urn:schemas-microsoft-com:vml" xmlns:pvml="urn:schemas-microsoft-com:office:powerpoint" xmlns:com="http://schemas.openxmlformats.org/drawingml/2006/compatibility" xmlns:p14="http://schemas.microsoft.com/office/powerpoint/2010/main" showMasterPhAnim="0" showMasterSp="0">
+<file path=ppt/notesSlides/notesSlide6.xml><?xml version="1.0" encoding="utf-8"?>
+<p:notes xmlns:a="http://schemas.openxmlformats.org/drawingml/2006/main" xmlns:r="http://schemas.openxmlformats.org/officeDocument/2006/relationships" xmlns:p="http://schemas.openxmlformats.org/presentationml/2006/main" showMasterSp="0" showMasterPhAnim="0">
   <p:cSld>
     <p:spTree>
       <p:nvGrpSpPr>
-        <p:cNvPr id="92" name="Shape 92"/>
+        <p:cNvPr id="1" name="Shape 92"/>
         <p:cNvGrpSpPr/>
         <p:nvPr/>
       </p:nvGrpSpPr>
@@ -952,9 +1101,11 @@
       <p:sp>
         <p:nvSpPr>
           <p:cNvPr id="93" name="Shape 93"/>
-          <p:cNvSpPr/>
+          <p:cNvSpPr>
+            <a:spLocks noGrp="1" noRot="1" noChangeAspect="1"/>
+          </p:cNvSpPr>
           <p:nvPr>
-            <p:ph idx="2" type="sldImg"/>
+            <p:ph type="sldImg" idx="2"/>
           </p:nvPr>
         </p:nvSpPr>
         <p:spPr>
@@ -963,8 +1114,13 @@
             <a:ext cx="6096000" cy="3429000"/>
           </a:xfrm>
           <a:custGeom>
+            <a:avLst/>
+            <a:gdLst/>
+            <a:ahLst/>
+            <a:cxnLst/>
+            <a:rect l="0" t="0" r="0" b="0"/>
             <a:pathLst>
-              <a:path extrusionOk="0" h="120000" w="120000">
+              <a:path w="120000" h="120000" extrusionOk="0">
                 <a:moveTo>
                   <a:pt x="0" y="0"/>
                 </a:moveTo>
@@ -986,9 +1142,11 @@
       <p:sp>
         <p:nvSpPr>
           <p:cNvPr id="94" name="Shape 94"/>
-          <p:cNvSpPr txBox="1"/>
+          <p:cNvSpPr txBox="1">
+            <a:spLocks noGrp="1"/>
+          </p:cNvSpPr>
           <p:nvPr>
-            <p:ph idx="1" type="body"/>
+            <p:ph type="body" idx="1"/>
           </p:nvPr>
         </p:nvSpPr>
         <p:spPr>
@@ -1001,7 +1159,7 @@
           </a:prstGeom>
         </p:spPr>
         <p:txBody>
-          <a:bodyPr anchorCtr="0" anchor="t" bIns="91425" lIns="91425" rIns="91425" tIns="91425">
+          <a:bodyPr lIns="91425" tIns="91425" rIns="91425" bIns="91425" anchor="t" anchorCtr="0">
             <a:noAutofit/>
           </a:bodyPr>
           <a:lstStyle/>
@@ -1012,9 +1170,6 @@
               </a:spcBef>
               <a:buNone/>
             </a:pPr>
-            <a:r>
-              <a:t/>
-            </a:r>
             <a:endParaRPr/>
           </a:p>
         </p:txBody>
@@ -1027,12 +1182,12 @@
 </p:notes>
 </file>
 
-<file path=ppt/slideLayouts/slideLayout.xml><?xml version="1.0" encoding="utf-8"?>
-<p:sldLayout xmlns:a="http://schemas.openxmlformats.org/drawingml/2006/main" xmlns:r="http://schemas.openxmlformats.org/officeDocument/2006/relationships" xmlns:mc="http://schemas.openxmlformats.org/markup-compatibility/2006" xmlns:mv="urn:schemas-microsoft-com:mac:vml" xmlns:p="http://schemas.openxmlformats.org/presentationml/2006/main" xmlns:c="http://schemas.openxmlformats.org/drawingml/2006/chart" xmlns:dgm="http://schemas.openxmlformats.org/drawingml/2006/diagram" xmlns:o="urn:schemas-microsoft-com:office:office" xmlns:v="urn:schemas-microsoft-com:vml" xmlns:pvml="urn:schemas-microsoft-com:office:powerpoint" xmlns:com="http://schemas.openxmlformats.org/drawingml/2006/compatibility" xmlns:p14="http://schemas.microsoft.com/office/powerpoint/2010/main" type="title">
+<file path=ppt/slideLayouts/slideLayout1.xml><?xml version="1.0" encoding="utf-8"?>
+<p:sldLayout xmlns:a="http://schemas.openxmlformats.org/drawingml/2006/main" xmlns:r="http://schemas.openxmlformats.org/officeDocument/2006/relationships" xmlns:p="http://schemas.openxmlformats.org/presentationml/2006/main" type="title">
   <p:cSld name="Title slide">
     <p:spTree>
       <p:nvGrpSpPr>
-        <p:cNvPr id="9" name="Shape 9"/>
+        <p:cNvPr id="1" name="Shape 9"/>
         <p:cNvGrpSpPr/>
         <p:nvPr/>
       </p:nvGrpSpPr>
@@ -1059,14 +1214,14 @@
             <a:avLst/>
           </a:prstGeom>
           <a:noFill/>
-          <a:ln cap="flat" cmpd="sng" w="76200">
+          <a:ln w="76200" cap="flat" cmpd="sng">
             <a:solidFill>
               <a:schemeClr val="lt2"/>
             </a:solidFill>
             <a:prstDash val="solid"/>
             <a:round/>
-            <a:headEnd len="med" w="med" type="none"/>
-            <a:tailEnd len="med" w="med" type="none"/>
+            <a:headEnd type="none" w="med" len="med"/>
+            <a:tailEnd type="none" w="med" len="med"/>
           </a:ln>
         </p:spPr>
       </p:cxnSp>
@@ -1085,14 +1240,14 @@
             <a:avLst/>
           </a:prstGeom>
           <a:noFill/>
-          <a:ln cap="flat" cmpd="sng" w="76200">
+          <a:ln w="76200" cap="flat" cmpd="sng">
             <a:solidFill>
               <a:schemeClr val="lt2"/>
             </a:solidFill>
             <a:prstDash val="solid"/>
             <a:round/>
-            <a:headEnd len="med" w="med" type="none"/>
-            <a:tailEnd len="med" w="med" type="none"/>
+            <a:headEnd type="none" w="med" len="med"/>
+            <a:tailEnd type="none" w="med" len="med"/>
           </a:ln>
         </p:spPr>
       </p:cxnSp>
@@ -1125,14 +1280,14 @@
               <a:avLst/>
             </a:prstGeom>
             <a:noFill/>
-            <a:ln cap="flat" cmpd="sng" w="76200">
+            <a:ln w="76200" cap="flat" cmpd="sng">
               <a:solidFill>
                 <a:schemeClr val="accent3"/>
               </a:solidFill>
               <a:prstDash val="solid"/>
               <a:round/>
-              <a:headEnd len="med" w="med" type="none"/>
-              <a:tailEnd len="med" w="med" type="none"/>
+              <a:headEnd type="none" w="med" len="med"/>
+              <a:tailEnd type="none" w="med" len="med"/>
             </a:ln>
           </p:spPr>
         </p:cxnSp>
@@ -1151,14 +1306,14 @@
               <a:avLst/>
             </a:prstGeom>
             <a:noFill/>
-            <a:ln cap="flat" cmpd="sng" w="9525">
+            <a:ln w="9525" cap="flat" cmpd="sng">
               <a:solidFill>
                 <a:schemeClr val="accent3"/>
               </a:solidFill>
               <a:prstDash val="solid"/>
               <a:round/>
-              <a:headEnd len="med" w="med" type="none"/>
-              <a:tailEnd len="med" w="med" type="none"/>
+              <a:headEnd type="none" w="med" len="med"/>
+              <a:tailEnd type="none" w="med" len="med"/>
             </a:ln>
           </p:spPr>
         </p:cxnSp>
@@ -1192,14 +1347,14 @@
               <a:avLst/>
             </a:prstGeom>
             <a:noFill/>
-            <a:ln cap="flat" cmpd="sng" w="76200">
+            <a:ln w="76200" cap="flat" cmpd="sng">
               <a:solidFill>
                 <a:schemeClr val="accent3"/>
               </a:solidFill>
               <a:prstDash val="solid"/>
               <a:round/>
-              <a:headEnd len="med" w="med" type="none"/>
-              <a:tailEnd len="med" w="med" type="none"/>
+              <a:headEnd type="none" w="med" len="med"/>
+              <a:tailEnd type="none" w="med" len="med"/>
             </a:ln>
           </p:spPr>
         </p:cxnSp>
@@ -1218,14 +1373,14 @@
               <a:avLst/>
             </a:prstGeom>
             <a:noFill/>
-            <a:ln cap="flat" cmpd="sng" w="9525">
+            <a:ln w="9525" cap="flat" cmpd="sng">
               <a:solidFill>
                 <a:schemeClr val="accent3"/>
               </a:solidFill>
               <a:prstDash val="solid"/>
               <a:round/>
-              <a:headEnd len="med" w="med" type="none"/>
-              <a:tailEnd len="med" w="med" type="none"/>
+              <a:headEnd type="none" w="med" len="med"/>
+              <a:tailEnd type="none" w="med" len="med"/>
             </a:ln>
           </p:spPr>
         </p:cxnSp>
@@ -1233,7 +1388,9 @@
       <p:sp>
         <p:nvSpPr>
           <p:cNvPr id="18" name="Shape 18"/>
-          <p:cNvSpPr txBox="1"/>
+          <p:cNvSpPr txBox="1">
+            <a:spLocks noGrp="1"/>
+          </p:cNvSpPr>
           <p:nvPr>
             <p:ph type="ctrTitle"/>
           </p:nvPr>
@@ -1248,7 +1405,7 @@
           </a:prstGeom>
         </p:spPr>
         <p:txBody>
-          <a:bodyPr anchorCtr="0" anchor="b" bIns="91425" lIns="91425" rIns="91425" tIns="91425"/>
+          <a:bodyPr lIns="91425" tIns="91425" rIns="91425" bIns="91425" anchor="b" anchorCtr="0"/>
           <a:lstStyle>
             <a:lvl1pPr lvl="0" algn="ctr">
               <a:spcBef>
@@ -1314,15 +1471,19 @@
               <a:defRPr sz="5400"/>
             </a:lvl9pPr>
           </a:lstStyle>
-          <a:p/>
+          <a:p>
+            <a:endParaRPr/>
+          </a:p>
         </p:txBody>
       </p:sp>
       <p:sp>
         <p:nvSpPr>
           <p:cNvPr id="19" name="Shape 19"/>
-          <p:cNvSpPr txBox="1"/>
+          <p:cNvSpPr txBox="1">
+            <a:spLocks noGrp="1"/>
+          </p:cNvSpPr>
           <p:nvPr>
-            <p:ph idx="1" type="subTitle"/>
+            <p:ph type="subTitle" idx="1"/>
           </p:nvPr>
         </p:nvSpPr>
         <p:spPr>
@@ -1335,7 +1496,7 @@
           </a:prstGeom>
         </p:spPr>
         <p:txBody>
-          <a:bodyPr anchorCtr="0" anchor="t" bIns="91425" lIns="91425" rIns="91425" tIns="91425"/>
+          <a:bodyPr lIns="91425" tIns="91425" rIns="91425" bIns="91425" anchor="t" anchorCtr="0"/>
           <a:lstStyle>
             <a:lvl1pPr lvl="0" algn="ctr">
               <a:lnSpc>
@@ -1464,15 +1625,19 @@
               <a:defRPr sz="2400"/>
             </a:lvl9pPr>
           </a:lstStyle>
-          <a:p/>
+          <a:p>
+            <a:endParaRPr/>
+          </a:p>
         </p:txBody>
       </p:sp>
       <p:sp>
         <p:nvSpPr>
           <p:cNvPr id="20" name="Shape 20"/>
-          <p:cNvSpPr txBox="1"/>
+          <p:cNvSpPr txBox="1">
+            <a:spLocks noGrp="1"/>
+          </p:cNvSpPr>
           <p:nvPr>
-            <p:ph idx="12" type="sldNum"/>
+            <p:ph type="sldNum" idx="12"/>
           </p:nvPr>
         </p:nvSpPr>
         <p:spPr>
@@ -1485,7 +1650,7 @@
           </a:prstGeom>
         </p:spPr>
         <p:txBody>
-          <a:bodyPr anchorCtr="0" anchor="ctr" bIns="91425" lIns="91425" rIns="91425" tIns="91425">
+          <a:bodyPr lIns="91425" tIns="91425" rIns="91425" bIns="91425" anchor="ctr" anchorCtr="0">
             <a:noAutofit/>
           </a:bodyPr>
           <a:lstStyle/>
@@ -1500,6 +1665,7 @@
               <a:rPr lang="en"/>
               <a:t>‹#›</a:t>
             </a:fld>
+            <a:endParaRPr lang="en"/>
           </a:p>
         </p:txBody>
       </p:sp>
@@ -1511,12 +1677,413 @@
 </p:sldLayout>
 </file>
 
-<file path=ppt/slideLayouts/slideLayout1.xml><?xml version="1.0" encoding="utf-8"?>
-<p:sldLayout xmlns:a="http://schemas.openxmlformats.org/drawingml/2006/main" xmlns:r="http://schemas.openxmlformats.org/officeDocument/2006/relationships" xmlns:mc="http://schemas.openxmlformats.org/markup-compatibility/2006" xmlns:mv="urn:schemas-microsoft-com:mac:vml" xmlns:p="http://schemas.openxmlformats.org/presentationml/2006/main" xmlns:c="http://schemas.openxmlformats.org/drawingml/2006/chart" xmlns:dgm="http://schemas.openxmlformats.org/drawingml/2006/diagram" xmlns:o="urn:schemas-microsoft-com:office:office" xmlns:v="urn:schemas-microsoft-com:vml" xmlns:pvml="urn:schemas-microsoft-com:office:powerpoint" xmlns:com="http://schemas.openxmlformats.org/drawingml/2006/compatibility" xmlns:p14="http://schemas.microsoft.com/office/powerpoint/2010/main" type="secHead">
+<file path=ppt/slideLayouts/slideLayout10.xml><?xml version="1.0" encoding="utf-8"?>
+<p:sldLayout xmlns:a="http://schemas.openxmlformats.org/drawingml/2006/main" xmlns:r="http://schemas.openxmlformats.org/officeDocument/2006/relationships" xmlns:p="http://schemas.openxmlformats.org/presentationml/2006/main">
+  <p:cSld name="Big number">
+    <p:spTree>
+      <p:nvGrpSpPr>
+        <p:cNvPr id="1" name="Shape 55"/>
+        <p:cNvGrpSpPr/>
+        <p:nvPr/>
+      </p:nvGrpSpPr>
+      <p:grpSpPr>
+        <a:xfrm>
+          <a:off x="0" y="0"/>
+          <a:ext cx="0" cy="0"/>
+          <a:chOff x="0" y="0"/>
+          <a:chExt cx="0" cy="0"/>
+        </a:xfrm>
+      </p:grpSpPr>
+      <p:sp>
+        <p:nvSpPr>
+          <p:cNvPr id="56" name="Shape 56"/>
+          <p:cNvSpPr/>
+          <p:nvPr/>
+        </p:nvSpPr>
+        <p:spPr>
+          <a:xfrm>
+            <a:off x="-75" y="5045700"/>
+            <a:ext cx="9144000" cy="97800"/>
+          </a:xfrm>
+          <a:prstGeom prst="rect">
+            <a:avLst/>
+          </a:prstGeom>
+          <a:solidFill>
+            <a:schemeClr val="lt2"/>
+          </a:solidFill>
+          <a:ln>
+            <a:noFill/>
+          </a:ln>
+        </p:spPr>
+        <p:txBody>
+          <a:bodyPr lIns="91425" tIns="91425" rIns="91425" bIns="91425" anchor="ctr" anchorCtr="0">
+            <a:noAutofit/>
+          </a:bodyPr>
+          <a:lstStyle/>
+          <a:p>
+            <a:pPr lvl="0">
+              <a:spcBef>
+                <a:spcPts val="0"/>
+              </a:spcBef>
+              <a:buNone/>
+            </a:pPr>
+            <a:endParaRPr/>
+          </a:p>
+        </p:txBody>
+      </p:sp>
+      <p:sp>
+        <p:nvSpPr>
+          <p:cNvPr id="57" name="Shape 57"/>
+          <p:cNvSpPr txBox="1">
+            <a:spLocks noGrp="1"/>
+          </p:cNvSpPr>
+          <p:nvPr>
+            <p:ph type="title"/>
+          </p:nvPr>
+        </p:nvSpPr>
+        <p:spPr>
+          <a:xfrm>
+            <a:off x="311700" y="1304850"/>
+            <a:ext cx="8520599" cy="1538399"/>
+          </a:xfrm>
+          <a:prstGeom prst="rect">
+            <a:avLst/>
+          </a:prstGeom>
+        </p:spPr>
+        <p:txBody>
+          <a:bodyPr lIns="91425" tIns="91425" rIns="91425" bIns="91425" anchor="ctr" anchorCtr="0"/>
+          <a:lstStyle>
+            <a:lvl1pPr lvl="0" algn="ctr">
+              <a:spcBef>
+                <a:spcPts val="0"/>
+              </a:spcBef>
+              <a:buClr>
+                <a:schemeClr val="accent3"/>
+              </a:buClr>
+              <a:buSzPct val="100000"/>
+              <a:defRPr sz="13000">
+                <a:solidFill>
+                  <a:schemeClr val="accent3"/>
+                </a:solidFill>
+              </a:defRPr>
+            </a:lvl1pPr>
+            <a:lvl2pPr lvl="1" algn="ctr">
+              <a:spcBef>
+                <a:spcPts val="0"/>
+              </a:spcBef>
+              <a:buClr>
+                <a:schemeClr val="accent3"/>
+              </a:buClr>
+              <a:buSzPct val="100000"/>
+              <a:defRPr sz="13000">
+                <a:solidFill>
+                  <a:schemeClr val="accent3"/>
+                </a:solidFill>
+              </a:defRPr>
+            </a:lvl2pPr>
+            <a:lvl3pPr lvl="2" algn="ctr">
+              <a:spcBef>
+                <a:spcPts val="0"/>
+              </a:spcBef>
+              <a:buClr>
+                <a:schemeClr val="accent3"/>
+              </a:buClr>
+              <a:buSzPct val="100000"/>
+              <a:defRPr sz="13000">
+                <a:solidFill>
+                  <a:schemeClr val="accent3"/>
+                </a:solidFill>
+              </a:defRPr>
+            </a:lvl3pPr>
+            <a:lvl4pPr lvl="3" algn="ctr">
+              <a:spcBef>
+                <a:spcPts val="0"/>
+              </a:spcBef>
+              <a:buClr>
+                <a:schemeClr val="accent3"/>
+              </a:buClr>
+              <a:buSzPct val="100000"/>
+              <a:defRPr sz="13000">
+                <a:solidFill>
+                  <a:schemeClr val="accent3"/>
+                </a:solidFill>
+              </a:defRPr>
+            </a:lvl4pPr>
+            <a:lvl5pPr lvl="4" algn="ctr">
+              <a:spcBef>
+                <a:spcPts val="0"/>
+              </a:spcBef>
+              <a:buClr>
+                <a:schemeClr val="accent3"/>
+              </a:buClr>
+              <a:buSzPct val="100000"/>
+              <a:defRPr sz="13000">
+                <a:solidFill>
+                  <a:schemeClr val="accent3"/>
+                </a:solidFill>
+              </a:defRPr>
+            </a:lvl5pPr>
+            <a:lvl6pPr lvl="5" algn="ctr">
+              <a:spcBef>
+                <a:spcPts val="0"/>
+              </a:spcBef>
+              <a:buClr>
+                <a:schemeClr val="accent3"/>
+              </a:buClr>
+              <a:buSzPct val="100000"/>
+              <a:defRPr sz="13000">
+                <a:solidFill>
+                  <a:schemeClr val="accent3"/>
+                </a:solidFill>
+              </a:defRPr>
+            </a:lvl6pPr>
+            <a:lvl7pPr lvl="6" algn="ctr">
+              <a:spcBef>
+                <a:spcPts val="0"/>
+              </a:spcBef>
+              <a:buClr>
+                <a:schemeClr val="accent3"/>
+              </a:buClr>
+              <a:buSzPct val="100000"/>
+              <a:defRPr sz="13000">
+                <a:solidFill>
+                  <a:schemeClr val="accent3"/>
+                </a:solidFill>
+              </a:defRPr>
+            </a:lvl7pPr>
+            <a:lvl8pPr lvl="7" algn="ctr">
+              <a:spcBef>
+                <a:spcPts val="0"/>
+              </a:spcBef>
+              <a:buClr>
+                <a:schemeClr val="accent3"/>
+              </a:buClr>
+              <a:buSzPct val="100000"/>
+              <a:defRPr sz="13000">
+                <a:solidFill>
+                  <a:schemeClr val="accent3"/>
+                </a:solidFill>
+              </a:defRPr>
+            </a:lvl8pPr>
+            <a:lvl9pPr lvl="8" algn="ctr">
+              <a:spcBef>
+                <a:spcPts val="0"/>
+              </a:spcBef>
+              <a:buClr>
+                <a:schemeClr val="accent3"/>
+              </a:buClr>
+              <a:buSzPct val="100000"/>
+              <a:defRPr sz="13000">
+                <a:solidFill>
+                  <a:schemeClr val="accent3"/>
+                </a:solidFill>
+              </a:defRPr>
+            </a:lvl9pPr>
+          </a:lstStyle>
+          <a:p>
+            <a:endParaRPr/>
+          </a:p>
+        </p:txBody>
+      </p:sp>
+      <p:sp>
+        <p:nvSpPr>
+          <p:cNvPr id="58" name="Shape 58"/>
+          <p:cNvSpPr txBox="1">
+            <a:spLocks noGrp="1"/>
+          </p:cNvSpPr>
+          <p:nvPr>
+            <p:ph type="body" idx="1"/>
+          </p:nvPr>
+        </p:nvSpPr>
+        <p:spPr>
+          <a:xfrm>
+            <a:off x="311700" y="2995650"/>
+            <a:ext cx="8520599" cy="1071599"/>
+          </a:xfrm>
+          <a:prstGeom prst="rect">
+            <a:avLst/>
+          </a:prstGeom>
+        </p:spPr>
+        <p:txBody>
+          <a:bodyPr lIns="91425" tIns="91425" rIns="91425" bIns="91425" anchor="t" anchorCtr="0"/>
+          <a:lstStyle>
+            <a:lvl1pPr lvl="0" algn="ctr">
+              <a:spcBef>
+                <a:spcPts val="0"/>
+              </a:spcBef>
+              <a:defRPr/>
+            </a:lvl1pPr>
+            <a:lvl2pPr lvl="1" algn="ctr">
+              <a:spcBef>
+                <a:spcPts val="0"/>
+              </a:spcBef>
+              <a:defRPr/>
+            </a:lvl2pPr>
+            <a:lvl3pPr lvl="2" algn="ctr">
+              <a:spcBef>
+                <a:spcPts val="0"/>
+              </a:spcBef>
+              <a:defRPr/>
+            </a:lvl3pPr>
+            <a:lvl4pPr lvl="3" algn="ctr">
+              <a:spcBef>
+                <a:spcPts val="0"/>
+              </a:spcBef>
+              <a:defRPr/>
+            </a:lvl4pPr>
+            <a:lvl5pPr lvl="4" algn="ctr">
+              <a:spcBef>
+                <a:spcPts val="0"/>
+              </a:spcBef>
+              <a:defRPr/>
+            </a:lvl5pPr>
+            <a:lvl6pPr lvl="5" algn="ctr">
+              <a:spcBef>
+                <a:spcPts val="0"/>
+              </a:spcBef>
+              <a:defRPr/>
+            </a:lvl6pPr>
+            <a:lvl7pPr lvl="6" algn="ctr">
+              <a:spcBef>
+                <a:spcPts val="0"/>
+              </a:spcBef>
+              <a:defRPr/>
+            </a:lvl7pPr>
+            <a:lvl8pPr lvl="7" algn="ctr">
+              <a:spcBef>
+                <a:spcPts val="0"/>
+              </a:spcBef>
+              <a:defRPr/>
+            </a:lvl8pPr>
+            <a:lvl9pPr lvl="8" algn="ctr">
+              <a:spcBef>
+                <a:spcPts val="0"/>
+              </a:spcBef>
+              <a:defRPr/>
+            </a:lvl9pPr>
+          </a:lstStyle>
+          <a:p>
+            <a:endParaRPr/>
+          </a:p>
+        </p:txBody>
+      </p:sp>
+      <p:sp>
+        <p:nvSpPr>
+          <p:cNvPr id="59" name="Shape 59"/>
+          <p:cNvSpPr txBox="1">
+            <a:spLocks noGrp="1"/>
+          </p:cNvSpPr>
+          <p:nvPr>
+            <p:ph type="sldNum" idx="12"/>
+          </p:nvPr>
+        </p:nvSpPr>
+        <p:spPr>
+          <a:xfrm>
+            <a:off x="8472457" y="4663216"/>
+            <a:ext cx="548699" cy="393600"/>
+          </a:xfrm>
+          <a:prstGeom prst="rect">
+            <a:avLst/>
+          </a:prstGeom>
+        </p:spPr>
+        <p:txBody>
+          <a:bodyPr lIns="91425" tIns="91425" rIns="91425" bIns="91425" anchor="ctr" anchorCtr="0">
+            <a:noAutofit/>
+          </a:bodyPr>
+          <a:lstStyle/>
+          <a:p>
+            <a:pPr lvl="0">
+              <a:spcBef>
+                <a:spcPts val="0"/>
+              </a:spcBef>
+              <a:buNone/>
+            </a:pPr>
+            <a:fld id="{00000000-1234-1234-1234-123412341234}" type="slidenum">
+              <a:rPr lang="en"/>
+              <a:t>‹#›</a:t>
+            </a:fld>
+            <a:endParaRPr lang="en"/>
+          </a:p>
+        </p:txBody>
+      </p:sp>
+    </p:spTree>
+  </p:cSld>
+  <p:clrMapOvr>
+    <a:masterClrMapping/>
+  </p:clrMapOvr>
+</p:sldLayout>
+</file>
+
+<file path=ppt/slideLayouts/slideLayout11.xml><?xml version="1.0" encoding="utf-8"?>
+<p:sldLayout xmlns:a="http://schemas.openxmlformats.org/drawingml/2006/main" xmlns:r="http://schemas.openxmlformats.org/officeDocument/2006/relationships" xmlns:p="http://schemas.openxmlformats.org/presentationml/2006/main" type="blank">
+  <p:cSld name="Blank">
+    <p:spTree>
+      <p:nvGrpSpPr>
+        <p:cNvPr id="1" name="Shape 60"/>
+        <p:cNvGrpSpPr/>
+        <p:nvPr/>
+      </p:nvGrpSpPr>
+      <p:grpSpPr>
+        <a:xfrm>
+          <a:off x="0" y="0"/>
+          <a:ext cx="0" cy="0"/>
+          <a:chOff x="0" y="0"/>
+          <a:chExt cx="0" cy="0"/>
+        </a:xfrm>
+      </p:grpSpPr>
+      <p:sp>
+        <p:nvSpPr>
+          <p:cNvPr id="61" name="Shape 61"/>
+          <p:cNvSpPr txBox="1">
+            <a:spLocks noGrp="1"/>
+          </p:cNvSpPr>
+          <p:nvPr>
+            <p:ph type="sldNum" idx="12"/>
+          </p:nvPr>
+        </p:nvSpPr>
+        <p:spPr>
+          <a:xfrm>
+            <a:off x="8472457" y="4663216"/>
+            <a:ext cx="548699" cy="393600"/>
+          </a:xfrm>
+          <a:prstGeom prst="rect">
+            <a:avLst/>
+          </a:prstGeom>
+        </p:spPr>
+        <p:txBody>
+          <a:bodyPr lIns="91425" tIns="91425" rIns="91425" bIns="91425" anchor="ctr" anchorCtr="0">
+            <a:noAutofit/>
+          </a:bodyPr>
+          <a:lstStyle/>
+          <a:p>
+            <a:pPr lvl="0">
+              <a:spcBef>
+                <a:spcPts val="0"/>
+              </a:spcBef>
+              <a:buNone/>
+            </a:pPr>
+            <a:fld id="{00000000-1234-1234-1234-123412341234}" type="slidenum">
+              <a:rPr lang="en"/>
+              <a:t>‹#›</a:t>
+            </a:fld>
+            <a:endParaRPr lang="en"/>
+          </a:p>
+        </p:txBody>
+      </p:sp>
+    </p:spTree>
+  </p:cSld>
+  <p:clrMapOvr>
+    <a:masterClrMapping/>
+  </p:clrMapOvr>
+</p:sldLayout>
+</file>
+
+<file path=ppt/slideLayouts/slideLayout2.xml><?xml version="1.0" encoding="utf-8"?>
+<p:sldLayout xmlns:a="http://schemas.openxmlformats.org/drawingml/2006/main" xmlns:r="http://schemas.openxmlformats.org/officeDocument/2006/relationships" xmlns:p="http://schemas.openxmlformats.org/presentationml/2006/main" type="secHead">
   <p:cSld name="Section header">
     <p:spTree>
       <p:nvGrpSpPr>
-        <p:cNvPr id="21" name="Shape 21"/>
+        <p:cNvPr id="1" name="Shape 21"/>
         <p:cNvGrpSpPr/>
         <p:nvPr/>
       </p:nvGrpSpPr>
@@ -1550,7 +2117,7 @@
           </a:ln>
         </p:spPr>
         <p:txBody>
-          <a:bodyPr anchorCtr="0" anchor="ctr" bIns="91425" lIns="91425" rIns="91425" tIns="91425">
+          <a:bodyPr lIns="91425" tIns="91425" rIns="91425" bIns="91425" anchor="ctr" anchorCtr="0">
             <a:noAutofit/>
           </a:bodyPr>
           <a:lstStyle/>
@@ -1561,9 +2128,6 @@
               </a:spcBef>
               <a:buNone/>
             </a:pPr>
-            <a:r>
-              <a:t/>
-            </a:r>
             <a:endParaRPr/>
           </a:p>
         </p:txBody>
@@ -1571,7 +2135,9 @@
       <p:sp>
         <p:nvSpPr>
           <p:cNvPr id="23" name="Shape 23"/>
-          <p:cNvSpPr txBox="1"/>
+          <p:cNvSpPr txBox="1">
+            <a:spLocks noGrp="1"/>
+          </p:cNvSpPr>
           <p:nvPr>
             <p:ph type="title"/>
           </p:nvPr>
@@ -1586,7 +2152,7 @@
           </a:prstGeom>
         </p:spPr>
         <p:txBody>
-          <a:bodyPr anchorCtr="0" anchor="ctr" bIns="91425" lIns="91425" rIns="91425" tIns="91425"/>
+          <a:bodyPr lIns="91425" tIns="91425" rIns="91425" bIns="91425" anchor="ctr" anchorCtr="0"/>
           <a:lstStyle>
             <a:lvl1pPr lvl="0" algn="ctr">
               <a:spcBef>
@@ -1643,15 +2209,19 @@
               <a:defRPr/>
             </a:lvl9pPr>
           </a:lstStyle>
-          <a:p/>
+          <a:p>
+            <a:endParaRPr/>
+          </a:p>
         </p:txBody>
       </p:sp>
       <p:sp>
         <p:nvSpPr>
           <p:cNvPr id="24" name="Shape 24"/>
-          <p:cNvSpPr txBox="1"/>
+          <p:cNvSpPr txBox="1">
+            <a:spLocks noGrp="1"/>
+          </p:cNvSpPr>
           <p:nvPr>
-            <p:ph idx="12" type="sldNum"/>
+            <p:ph type="sldNum" idx="12"/>
           </p:nvPr>
         </p:nvSpPr>
         <p:spPr>
@@ -1664,7 +2234,7 @@
           </a:prstGeom>
         </p:spPr>
         <p:txBody>
-          <a:bodyPr anchorCtr="0" anchor="ctr" bIns="91425" lIns="91425" rIns="91425" tIns="91425">
+          <a:bodyPr lIns="91425" tIns="91425" rIns="91425" bIns="91425" anchor="ctr" anchorCtr="0">
             <a:noAutofit/>
           </a:bodyPr>
           <a:lstStyle/>
@@ -1683,6 +2253,11 @@
               </a:rPr>
               <a:t>‹#›</a:t>
             </a:fld>
+            <a:endParaRPr lang="en">
+              <a:solidFill>
+                <a:schemeClr val="lt1"/>
+              </a:solidFill>
+            </a:endParaRPr>
           </a:p>
         </p:txBody>
       </p:sp>
@@ -1694,73 +2269,12 @@
 </p:sldLayout>
 </file>
 
-<file path=ppt/slideLayouts/slideLayout10.xml><?xml version="1.0" encoding="utf-8"?>
-<p:sldLayout xmlns:a="http://schemas.openxmlformats.org/drawingml/2006/main" xmlns:r="http://schemas.openxmlformats.org/officeDocument/2006/relationships" xmlns:mc="http://schemas.openxmlformats.org/markup-compatibility/2006" xmlns:mv="urn:schemas-microsoft-com:mac:vml" xmlns:p="http://schemas.openxmlformats.org/presentationml/2006/main" xmlns:c="http://schemas.openxmlformats.org/drawingml/2006/chart" xmlns:dgm="http://schemas.openxmlformats.org/drawingml/2006/diagram" xmlns:o="urn:schemas-microsoft-com:office:office" xmlns:v="urn:schemas-microsoft-com:vml" xmlns:pvml="urn:schemas-microsoft-com:office:powerpoint" xmlns:com="http://schemas.openxmlformats.org/drawingml/2006/compatibility" xmlns:p14="http://schemas.microsoft.com/office/powerpoint/2010/main" type="blank">
-  <p:cSld name="Blank">
-    <p:spTree>
-      <p:nvGrpSpPr>
-        <p:cNvPr id="60" name="Shape 60"/>
-        <p:cNvGrpSpPr/>
-        <p:nvPr/>
-      </p:nvGrpSpPr>
-      <p:grpSpPr>
-        <a:xfrm>
-          <a:off x="0" y="0"/>
-          <a:ext cx="0" cy="0"/>
-          <a:chOff x="0" y="0"/>
-          <a:chExt cx="0" cy="0"/>
-        </a:xfrm>
-      </p:grpSpPr>
-      <p:sp>
-        <p:nvSpPr>
-          <p:cNvPr id="61" name="Shape 61"/>
-          <p:cNvSpPr txBox="1"/>
-          <p:nvPr>
-            <p:ph idx="12" type="sldNum"/>
-          </p:nvPr>
-        </p:nvSpPr>
-        <p:spPr>
-          <a:xfrm>
-            <a:off x="8472457" y="4663216"/>
-            <a:ext cx="548699" cy="393600"/>
-          </a:xfrm>
-          <a:prstGeom prst="rect">
-            <a:avLst/>
-          </a:prstGeom>
-        </p:spPr>
-        <p:txBody>
-          <a:bodyPr anchorCtr="0" anchor="ctr" bIns="91425" lIns="91425" rIns="91425" tIns="91425">
-            <a:noAutofit/>
-          </a:bodyPr>
-          <a:lstStyle/>
-          <a:p>
-            <a:pPr lvl="0">
-              <a:spcBef>
-                <a:spcPts val="0"/>
-              </a:spcBef>
-              <a:buNone/>
-            </a:pPr>
-            <a:fld id="{00000000-1234-1234-1234-123412341234}" type="slidenum">
-              <a:rPr lang="en"/>
-              <a:t>‹#›</a:t>
-            </a:fld>
-          </a:p>
-        </p:txBody>
-      </p:sp>
-    </p:spTree>
-  </p:cSld>
-  <p:clrMapOvr>
-    <a:masterClrMapping/>
-  </p:clrMapOvr>
-</p:sldLayout>
-</file>
-
-<file path=ppt/slideLayouts/slideLayout2.xml><?xml version="1.0" encoding="utf-8"?>
-<p:sldLayout xmlns:a="http://schemas.openxmlformats.org/drawingml/2006/main" xmlns:r="http://schemas.openxmlformats.org/officeDocument/2006/relationships" xmlns:mc="http://schemas.openxmlformats.org/markup-compatibility/2006" xmlns:mv="urn:schemas-microsoft-com:mac:vml" xmlns:p="http://schemas.openxmlformats.org/presentationml/2006/main" xmlns:c="http://schemas.openxmlformats.org/drawingml/2006/chart" xmlns:dgm="http://schemas.openxmlformats.org/drawingml/2006/diagram" xmlns:o="urn:schemas-microsoft-com:office:office" xmlns:v="urn:schemas-microsoft-com:vml" xmlns:pvml="urn:schemas-microsoft-com:office:powerpoint" xmlns:com="http://schemas.openxmlformats.org/drawingml/2006/compatibility" xmlns:p14="http://schemas.microsoft.com/office/powerpoint/2010/main" type="tx">
+<file path=ppt/slideLayouts/slideLayout3.xml><?xml version="1.0" encoding="utf-8"?>
+<p:sldLayout xmlns:a="http://schemas.openxmlformats.org/drawingml/2006/main" xmlns:r="http://schemas.openxmlformats.org/officeDocument/2006/relationships" xmlns:p="http://schemas.openxmlformats.org/presentationml/2006/main" type="tx">
   <p:cSld name="Title and body">
     <p:spTree>
       <p:nvGrpSpPr>
-        <p:cNvPr id="25" name="Shape 25"/>
+        <p:cNvPr id="1" name="Shape 25"/>
         <p:cNvGrpSpPr/>
         <p:nvPr/>
       </p:nvGrpSpPr>
@@ -1794,7 +2308,7 @@
           </a:ln>
         </p:spPr>
         <p:txBody>
-          <a:bodyPr anchorCtr="0" anchor="ctr" bIns="91425" lIns="91425" rIns="91425" tIns="91425">
+          <a:bodyPr lIns="91425" tIns="91425" rIns="91425" bIns="91425" anchor="ctr" anchorCtr="0">
             <a:noAutofit/>
           </a:bodyPr>
           <a:lstStyle/>
@@ -1805,9 +2319,6 @@
               </a:spcBef>
               <a:buNone/>
             </a:pPr>
-            <a:r>
-              <a:t/>
-            </a:r>
             <a:endParaRPr/>
           </a:p>
         </p:txBody>
@@ -1815,7 +2326,9 @@
       <p:sp>
         <p:nvSpPr>
           <p:cNvPr id="27" name="Shape 27"/>
-          <p:cNvSpPr txBox="1"/>
+          <p:cNvSpPr txBox="1">
+            <a:spLocks noGrp="1"/>
+          </p:cNvSpPr>
           <p:nvPr>
             <p:ph type="title"/>
           </p:nvPr>
@@ -1830,7 +2343,7 @@
           </a:prstGeom>
         </p:spPr>
         <p:txBody>
-          <a:bodyPr anchorCtr="0" anchor="t" bIns="91425" lIns="91425" rIns="91425" tIns="91425"/>
+          <a:bodyPr lIns="91425" tIns="91425" rIns="91425" bIns="91425" anchor="t" anchorCtr="0"/>
           <a:lstStyle>
             <a:lvl1pPr lvl="0">
               <a:spcBef>
@@ -1887,15 +2400,19 @@
               <a:defRPr/>
             </a:lvl9pPr>
           </a:lstStyle>
-          <a:p/>
+          <a:p>
+            <a:endParaRPr/>
+          </a:p>
         </p:txBody>
       </p:sp>
       <p:sp>
         <p:nvSpPr>
           <p:cNvPr id="28" name="Shape 28"/>
-          <p:cNvSpPr txBox="1"/>
+          <p:cNvSpPr txBox="1">
+            <a:spLocks noGrp="1"/>
+          </p:cNvSpPr>
           <p:nvPr>
-            <p:ph idx="1" type="body"/>
+            <p:ph type="body" idx="1"/>
           </p:nvPr>
         </p:nvSpPr>
         <p:spPr>
@@ -1908,7 +2425,7 @@
           </a:prstGeom>
         </p:spPr>
         <p:txBody>
-          <a:bodyPr anchorCtr="0" anchor="t" bIns="91425" lIns="91425" rIns="91425" tIns="91425"/>
+          <a:bodyPr lIns="91425" tIns="91425" rIns="91425" bIns="91425" anchor="t" anchorCtr="0"/>
           <a:lstStyle>
             <a:lvl1pPr lvl="0">
               <a:spcBef>
@@ -1965,15 +2482,19 @@
               <a:defRPr/>
             </a:lvl9pPr>
           </a:lstStyle>
-          <a:p/>
+          <a:p>
+            <a:endParaRPr/>
+          </a:p>
         </p:txBody>
       </p:sp>
       <p:sp>
         <p:nvSpPr>
           <p:cNvPr id="29" name="Shape 29"/>
-          <p:cNvSpPr txBox="1"/>
+          <p:cNvSpPr txBox="1">
+            <a:spLocks noGrp="1"/>
+          </p:cNvSpPr>
           <p:nvPr>
-            <p:ph idx="12" type="sldNum"/>
+            <p:ph type="sldNum" idx="12"/>
           </p:nvPr>
         </p:nvSpPr>
         <p:spPr>
@@ -1986,7 +2507,7 @@
           </a:prstGeom>
         </p:spPr>
         <p:txBody>
-          <a:bodyPr anchorCtr="0" anchor="ctr" bIns="91425" lIns="91425" rIns="91425" tIns="91425">
+          <a:bodyPr lIns="91425" tIns="91425" rIns="91425" bIns="91425" anchor="ctr" anchorCtr="0">
             <a:noAutofit/>
           </a:bodyPr>
           <a:lstStyle/>
@@ -2001,6 +2522,7 @@
               <a:rPr lang="en"/>
               <a:t>‹#›</a:t>
             </a:fld>
+            <a:endParaRPr lang="en"/>
           </a:p>
         </p:txBody>
       </p:sp>
@@ -2012,12 +2534,12 @@
 </p:sldLayout>
 </file>
 
-<file path=ppt/slideLayouts/slideLayout3.xml><?xml version="1.0" encoding="utf-8"?>
-<p:sldLayout xmlns:a="http://schemas.openxmlformats.org/drawingml/2006/main" xmlns:r="http://schemas.openxmlformats.org/officeDocument/2006/relationships" xmlns:mc="http://schemas.openxmlformats.org/markup-compatibility/2006" xmlns:mv="urn:schemas-microsoft-com:mac:vml" xmlns:p="http://schemas.openxmlformats.org/presentationml/2006/main" xmlns:c="http://schemas.openxmlformats.org/drawingml/2006/chart" xmlns:dgm="http://schemas.openxmlformats.org/drawingml/2006/diagram" xmlns:o="urn:schemas-microsoft-com:office:office" xmlns:v="urn:schemas-microsoft-com:vml" xmlns:pvml="urn:schemas-microsoft-com:office:powerpoint" xmlns:com="http://schemas.openxmlformats.org/drawingml/2006/compatibility" xmlns:p14="http://schemas.microsoft.com/office/powerpoint/2010/main" type="twoColTx">
+<file path=ppt/slideLayouts/slideLayout4.xml><?xml version="1.0" encoding="utf-8"?>
+<p:sldLayout xmlns:a="http://schemas.openxmlformats.org/drawingml/2006/main" xmlns:r="http://schemas.openxmlformats.org/officeDocument/2006/relationships" xmlns:p="http://schemas.openxmlformats.org/presentationml/2006/main" type="twoColTx">
   <p:cSld name="Title and two columns">
     <p:spTree>
       <p:nvGrpSpPr>
-        <p:cNvPr id="30" name="Shape 30"/>
+        <p:cNvPr id="1" name="Shape 30"/>
         <p:cNvGrpSpPr/>
         <p:nvPr/>
       </p:nvGrpSpPr>
@@ -2032,7 +2554,9 @@
       <p:sp>
         <p:nvSpPr>
           <p:cNvPr id="31" name="Shape 31"/>
-          <p:cNvSpPr txBox="1"/>
+          <p:cNvSpPr txBox="1">
+            <a:spLocks noGrp="1"/>
+          </p:cNvSpPr>
           <p:nvPr>
             <p:ph type="title"/>
           </p:nvPr>
@@ -2047,7 +2571,7 @@
           </a:prstGeom>
         </p:spPr>
         <p:txBody>
-          <a:bodyPr anchorCtr="0" anchor="t" bIns="91425" lIns="91425" rIns="91425" tIns="91425"/>
+          <a:bodyPr lIns="91425" tIns="91425" rIns="91425" bIns="91425" anchor="t" anchorCtr="0"/>
           <a:lstStyle>
             <a:lvl1pPr lvl="0">
               <a:spcBef>
@@ -2104,15 +2628,19 @@
               <a:defRPr/>
             </a:lvl9pPr>
           </a:lstStyle>
-          <a:p/>
+          <a:p>
+            <a:endParaRPr/>
+          </a:p>
         </p:txBody>
       </p:sp>
       <p:sp>
         <p:nvSpPr>
           <p:cNvPr id="32" name="Shape 32"/>
-          <p:cNvSpPr txBox="1"/>
+          <p:cNvSpPr txBox="1">
+            <a:spLocks noGrp="1"/>
+          </p:cNvSpPr>
           <p:nvPr>
-            <p:ph idx="1" type="body"/>
+            <p:ph type="body" idx="1"/>
           </p:nvPr>
         </p:nvSpPr>
         <p:spPr>
@@ -2125,7 +2653,7 @@
           </a:prstGeom>
         </p:spPr>
         <p:txBody>
-          <a:bodyPr anchorCtr="0" anchor="t" bIns="91425" lIns="91425" rIns="91425" tIns="91425"/>
+          <a:bodyPr lIns="91425" tIns="91425" rIns="91425" bIns="91425" anchor="t" anchorCtr="0"/>
           <a:lstStyle>
             <a:lvl1pPr lvl="0">
               <a:spcBef>
@@ -2191,15 +2719,19 @@
               <a:defRPr sz="1200"/>
             </a:lvl9pPr>
           </a:lstStyle>
-          <a:p/>
+          <a:p>
+            <a:endParaRPr/>
+          </a:p>
         </p:txBody>
       </p:sp>
       <p:sp>
         <p:nvSpPr>
           <p:cNvPr id="33" name="Shape 33"/>
-          <p:cNvSpPr txBox="1"/>
+          <p:cNvSpPr txBox="1">
+            <a:spLocks noGrp="1"/>
+          </p:cNvSpPr>
           <p:nvPr>
-            <p:ph idx="2" type="body"/>
+            <p:ph type="body" idx="2"/>
           </p:nvPr>
         </p:nvSpPr>
         <p:spPr>
@@ -2212,7 +2744,7 @@
           </a:prstGeom>
         </p:spPr>
         <p:txBody>
-          <a:bodyPr anchorCtr="0" anchor="t" bIns="91425" lIns="91425" rIns="91425" tIns="91425"/>
+          <a:bodyPr lIns="91425" tIns="91425" rIns="91425" bIns="91425" anchor="t" anchorCtr="0"/>
           <a:lstStyle>
             <a:lvl1pPr lvl="0">
               <a:spcBef>
@@ -2278,15 +2810,19 @@
               <a:defRPr sz="1200"/>
             </a:lvl9pPr>
           </a:lstStyle>
-          <a:p/>
+          <a:p>
+            <a:endParaRPr/>
+          </a:p>
         </p:txBody>
       </p:sp>
       <p:sp>
         <p:nvSpPr>
           <p:cNvPr id="34" name="Shape 34"/>
-          <p:cNvSpPr txBox="1"/>
+          <p:cNvSpPr txBox="1">
+            <a:spLocks noGrp="1"/>
+          </p:cNvSpPr>
           <p:nvPr>
-            <p:ph idx="12" type="sldNum"/>
+            <p:ph type="sldNum" idx="12"/>
           </p:nvPr>
         </p:nvSpPr>
         <p:spPr>
@@ -2299,7 +2835,7 @@
           </a:prstGeom>
         </p:spPr>
         <p:txBody>
-          <a:bodyPr anchorCtr="0" anchor="ctr" bIns="91425" lIns="91425" rIns="91425" tIns="91425">
+          <a:bodyPr lIns="91425" tIns="91425" rIns="91425" bIns="91425" anchor="ctr" anchorCtr="0">
             <a:noAutofit/>
           </a:bodyPr>
           <a:lstStyle/>
@@ -2314,6 +2850,7 @@
               <a:rPr lang="en"/>
               <a:t>‹#›</a:t>
             </a:fld>
+            <a:endParaRPr lang="en"/>
           </a:p>
         </p:txBody>
       </p:sp>
@@ -2325,12 +2862,12 @@
 </p:sldLayout>
 </file>
 
-<file path=ppt/slideLayouts/slideLayout4.xml><?xml version="1.0" encoding="utf-8"?>
-<p:sldLayout xmlns:a="http://schemas.openxmlformats.org/drawingml/2006/main" xmlns:r="http://schemas.openxmlformats.org/officeDocument/2006/relationships" xmlns:mc="http://schemas.openxmlformats.org/markup-compatibility/2006" xmlns:mv="urn:schemas-microsoft-com:mac:vml" xmlns:p="http://schemas.openxmlformats.org/presentationml/2006/main" xmlns:c="http://schemas.openxmlformats.org/drawingml/2006/chart" xmlns:dgm="http://schemas.openxmlformats.org/drawingml/2006/diagram" xmlns:o="urn:schemas-microsoft-com:office:office" xmlns:v="urn:schemas-microsoft-com:vml" xmlns:pvml="urn:schemas-microsoft-com:office:powerpoint" xmlns:com="http://schemas.openxmlformats.org/drawingml/2006/compatibility" xmlns:p14="http://schemas.microsoft.com/office/powerpoint/2010/main" type="titleOnly">
+<file path=ppt/slideLayouts/slideLayout5.xml><?xml version="1.0" encoding="utf-8"?>
+<p:sldLayout xmlns:a="http://schemas.openxmlformats.org/drawingml/2006/main" xmlns:r="http://schemas.openxmlformats.org/officeDocument/2006/relationships" xmlns:p="http://schemas.openxmlformats.org/presentationml/2006/main" type="titleOnly">
   <p:cSld name="Title only">
     <p:spTree>
       <p:nvGrpSpPr>
-        <p:cNvPr id="35" name="Shape 35"/>
+        <p:cNvPr id="1" name="Shape 35"/>
         <p:cNvGrpSpPr/>
         <p:nvPr/>
       </p:nvGrpSpPr>
@@ -2345,7 +2882,9 @@
       <p:sp>
         <p:nvSpPr>
           <p:cNvPr id="36" name="Shape 36"/>
-          <p:cNvSpPr txBox="1"/>
+          <p:cNvSpPr txBox="1">
+            <a:spLocks noGrp="1"/>
+          </p:cNvSpPr>
           <p:nvPr>
             <p:ph type="title"/>
           </p:nvPr>
@@ -2360,7 +2899,7 @@
           </a:prstGeom>
         </p:spPr>
         <p:txBody>
-          <a:bodyPr anchorCtr="0" anchor="t" bIns="91425" lIns="91425" rIns="91425" tIns="91425"/>
+          <a:bodyPr lIns="91425" tIns="91425" rIns="91425" bIns="91425" anchor="t" anchorCtr="0"/>
           <a:lstStyle>
             <a:lvl1pPr lvl="0">
               <a:spcBef>
@@ -2417,15 +2956,19 @@
               <a:defRPr/>
             </a:lvl9pPr>
           </a:lstStyle>
-          <a:p/>
+          <a:p>
+            <a:endParaRPr/>
+          </a:p>
         </p:txBody>
       </p:sp>
       <p:sp>
         <p:nvSpPr>
           <p:cNvPr id="37" name="Shape 37"/>
-          <p:cNvSpPr txBox="1"/>
+          <p:cNvSpPr txBox="1">
+            <a:spLocks noGrp="1"/>
+          </p:cNvSpPr>
           <p:nvPr>
-            <p:ph idx="12" type="sldNum"/>
+            <p:ph type="sldNum" idx="12"/>
           </p:nvPr>
         </p:nvSpPr>
         <p:spPr>
@@ -2438,7 +2981,7 @@
           </a:prstGeom>
         </p:spPr>
         <p:txBody>
-          <a:bodyPr anchorCtr="0" anchor="ctr" bIns="91425" lIns="91425" rIns="91425" tIns="91425">
+          <a:bodyPr lIns="91425" tIns="91425" rIns="91425" bIns="91425" anchor="ctr" anchorCtr="0">
             <a:noAutofit/>
           </a:bodyPr>
           <a:lstStyle/>
@@ -2453,6 +2996,7 @@
               <a:rPr lang="en"/>
               <a:t>‹#›</a:t>
             </a:fld>
+            <a:endParaRPr lang="en"/>
           </a:p>
         </p:txBody>
       </p:sp>
@@ -2464,12 +3008,12 @@
 </p:sldLayout>
 </file>
 
-<file path=ppt/slideLayouts/slideLayout5.xml><?xml version="1.0" encoding="utf-8"?>
-<p:sldLayout xmlns:a="http://schemas.openxmlformats.org/drawingml/2006/main" xmlns:r="http://schemas.openxmlformats.org/officeDocument/2006/relationships" xmlns:mc="http://schemas.openxmlformats.org/markup-compatibility/2006" xmlns:mv="urn:schemas-microsoft-com:mac:vml" xmlns:p="http://schemas.openxmlformats.org/presentationml/2006/main" xmlns:c="http://schemas.openxmlformats.org/drawingml/2006/chart" xmlns:dgm="http://schemas.openxmlformats.org/drawingml/2006/diagram" xmlns:o="urn:schemas-microsoft-com:office:office" xmlns:v="urn:schemas-microsoft-com:vml" xmlns:pvml="urn:schemas-microsoft-com:office:powerpoint" xmlns:com="http://schemas.openxmlformats.org/drawingml/2006/compatibility" xmlns:p14="http://schemas.microsoft.com/office/powerpoint/2010/main">
+<file path=ppt/slideLayouts/slideLayout6.xml><?xml version="1.0" encoding="utf-8"?>
+<p:sldLayout xmlns:a="http://schemas.openxmlformats.org/drawingml/2006/main" xmlns:r="http://schemas.openxmlformats.org/officeDocument/2006/relationships" xmlns:p="http://schemas.openxmlformats.org/presentationml/2006/main">
   <p:cSld name="One column text">
     <p:spTree>
       <p:nvGrpSpPr>
-        <p:cNvPr id="38" name="Shape 38"/>
+        <p:cNvPr id="1" name="Shape 38"/>
         <p:cNvGrpSpPr/>
         <p:nvPr/>
       </p:nvGrpSpPr>
@@ -2484,7 +3028,9 @@
       <p:sp>
         <p:nvSpPr>
           <p:cNvPr id="39" name="Shape 39"/>
-          <p:cNvSpPr txBox="1"/>
+          <p:cNvSpPr txBox="1">
+            <a:spLocks noGrp="1"/>
+          </p:cNvSpPr>
           <p:nvPr>
             <p:ph type="title"/>
           </p:nvPr>
@@ -2499,7 +3045,7 @@
           </a:prstGeom>
         </p:spPr>
         <p:txBody>
-          <a:bodyPr anchorCtr="0" anchor="b" bIns="91425" lIns="91425" rIns="91425" tIns="91425"/>
+          <a:bodyPr lIns="91425" tIns="91425" rIns="91425" bIns="91425" anchor="b" anchorCtr="0"/>
           <a:lstStyle>
             <a:lvl1pPr lvl="0">
               <a:spcBef>
@@ -2565,15 +3111,19 @@
               <a:defRPr sz="2400"/>
             </a:lvl9pPr>
           </a:lstStyle>
-          <a:p/>
+          <a:p>
+            <a:endParaRPr/>
+          </a:p>
         </p:txBody>
       </p:sp>
       <p:sp>
         <p:nvSpPr>
           <p:cNvPr id="40" name="Shape 40"/>
-          <p:cNvSpPr txBox="1"/>
+          <p:cNvSpPr txBox="1">
+            <a:spLocks noGrp="1"/>
+          </p:cNvSpPr>
           <p:nvPr>
-            <p:ph idx="1" type="body"/>
+            <p:ph type="body" idx="1"/>
           </p:nvPr>
         </p:nvSpPr>
         <p:spPr>
@@ -2586,7 +3136,7 @@
           </a:prstGeom>
         </p:spPr>
         <p:txBody>
-          <a:bodyPr anchorCtr="0" anchor="t" bIns="91425" lIns="91425" rIns="91425" tIns="91425"/>
+          <a:bodyPr lIns="91425" tIns="91425" rIns="91425" bIns="91425" anchor="t" anchorCtr="0"/>
           <a:lstStyle>
             <a:lvl1pPr lvl="0">
               <a:spcBef>
@@ -2652,15 +3202,19 @@
               <a:defRPr sz="1200"/>
             </a:lvl9pPr>
           </a:lstStyle>
-          <a:p/>
+          <a:p>
+            <a:endParaRPr/>
+          </a:p>
         </p:txBody>
       </p:sp>
       <p:sp>
         <p:nvSpPr>
           <p:cNvPr id="41" name="Shape 41"/>
-          <p:cNvSpPr txBox="1"/>
+          <p:cNvSpPr txBox="1">
+            <a:spLocks noGrp="1"/>
+          </p:cNvSpPr>
           <p:nvPr>
-            <p:ph idx="12" type="sldNum"/>
+            <p:ph type="sldNum" idx="12"/>
           </p:nvPr>
         </p:nvSpPr>
         <p:spPr>
@@ -2673,7 +3227,7 @@
           </a:prstGeom>
         </p:spPr>
         <p:txBody>
-          <a:bodyPr anchorCtr="0" anchor="ctr" bIns="91425" lIns="91425" rIns="91425" tIns="91425">
+          <a:bodyPr lIns="91425" tIns="91425" rIns="91425" bIns="91425" anchor="ctr" anchorCtr="0">
             <a:noAutofit/>
           </a:bodyPr>
           <a:lstStyle/>
@@ -2688,6 +3242,7 @@
               <a:rPr lang="en"/>
               <a:t>‹#›</a:t>
             </a:fld>
+            <a:endParaRPr lang="en"/>
           </a:p>
         </p:txBody>
       </p:sp>
@@ -2699,19 +3254,20 @@
 </p:sldLayout>
 </file>
 
-<file path=ppt/slideLayouts/slideLayout6.xml><?xml version="1.0" encoding="utf-8"?>
-<p:sldLayout xmlns:a="http://schemas.openxmlformats.org/drawingml/2006/main" xmlns:r="http://schemas.openxmlformats.org/officeDocument/2006/relationships" xmlns:mc="http://schemas.openxmlformats.org/markup-compatibility/2006" xmlns:mv="urn:schemas-microsoft-com:mac:vml" xmlns:p="http://schemas.openxmlformats.org/presentationml/2006/main" xmlns:c="http://schemas.openxmlformats.org/drawingml/2006/chart" xmlns:dgm="http://schemas.openxmlformats.org/drawingml/2006/diagram" xmlns:o="urn:schemas-microsoft-com:office:office" xmlns:v="urn:schemas-microsoft-com:vml" xmlns:pvml="urn:schemas-microsoft-com:office:powerpoint" xmlns:com="http://schemas.openxmlformats.org/drawingml/2006/compatibility" xmlns:p14="http://schemas.microsoft.com/office/powerpoint/2010/main">
+<file path=ppt/slideLayouts/slideLayout7.xml><?xml version="1.0" encoding="utf-8"?>
+<p:sldLayout xmlns:a="http://schemas.openxmlformats.org/drawingml/2006/main" xmlns:r="http://schemas.openxmlformats.org/officeDocument/2006/relationships" xmlns:p="http://schemas.openxmlformats.org/presentationml/2006/main">
   <p:cSld name="Main point">
     <p:bg>
       <p:bgPr>
         <a:solidFill>
           <a:schemeClr val="accent6"/>
         </a:solidFill>
+        <a:effectLst/>
       </p:bgPr>
     </p:bg>
     <p:spTree>
       <p:nvGrpSpPr>
-        <p:cNvPr id="42" name="Shape 42"/>
+        <p:cNvPr id="1" name="Shape 42"/>
         <p:cNvGrpSpPr/>
         <p:nvPr/>
       </p:nvGrpSpPr>
@@ -2726,7 +3282,9 @@
       <p:sp>
         <p:nvSpPr>
           <p:cNvPr id="43" name="Shape 43"/>
-          <p:cNvSpPr txBox="1"/>
+          <p:cNvSpPr txBox="1">
+            <a:spLocks noGrp="1"/>
+          </p:cNvSpPr>
           <p:nvPr>
             <p:ph type="title"/>
           </p:nvPr>
@@ -2741,7 +3299,7 @@
           </a:prstGeom>
         </p:spPr>
         <p:txBody>
-          <a:bodyPr anchorCtr="0" anchor="ctr" bIns="91425" lIns="91425" rIns="91425" tIns="91425"/>
+          <a:bodyPr lIns="91425" tIns="91425" rIns="91425" bIns="91425" anchor="ctr" anchorCtr="0"/>
           <a:lstStyle>
             <a:lvl1pPr lvl="0">
               <a:spcBef>
@@ -2751,7 +3309,7 @@
                 <a:schemeClr val="dk2"/>
               </a:buClr>
               <a:buSzPct val="100000"/>
-              <a:defRPr b="0" sz="5400">
+              <a:defRPr sz="5400" b="0">
                 <a:solidFill>
                   <a:schemeClr val="dk2"/>
                 </a:solidFill>
@@ -2765,7 +3323,7 @@
                 <a:schemeClr val="dk2"/>
               </a:buClr>
               <a:buSzPct val="100000"/>
-              <a:defRPr b="0" sz="5400">
+              <a:defRPr sz="5400" b="0">
                 <a:solidFill>
                   <a:schemeClr val="dk2"/>
                 </a:solidFill>
@@ -2779,7 +3337,7 @@
                 <a:schemeClr val="dk2"/>
               </a:buClr>
               <a:buSzPct val="100000"/>
-              <a:defRPr b="0" sz="5400">
+              <a:defRPr sz="5400" b="0">
                 <a:solidFill>
                   <a:schemeClr val="dk2"/>
                 </a:solidFill>
@@ -2793,7 +3351,7 @@
                 <a:schemeClr val="dk2"/>
               </a:buClr>
               <a:buSzPct val="100000"/>
-              <a:defRPr b="0" sz="5400">
+              <a:defRPr sz="5400" b="0">
                 <a:solidFill>
                   <a:schemeClr val="dk2"/>
                 </a:solidFill>
@@ -2807,7 +3365,7 @@
                 <a:schemeClr val="dk2"/>
               </a:buClr>
               <a:buSzPct val="100000"/>
-              <a:defRPr b="0" sz="5400">
+              <a:defRPr sz="5400" b="0">
                 <a:solidFill>
                   <a:schemeClr val="dk2"/>
                 </a:solidFill>
@@ -2821,7 +3379,7 @@
                 <a:schemeClr val="dk2"/>
               </a:buClr>
               <a:buSzPct val="100000"/>
-              <a:defRPr b="0" sz="5400">
+              <a:defRPr sz="5400" b="0">
                 <a:solidFill>
                   <a:schemeClr val="dk2"/>
                 </a:solidFill>
@@ -2835,7 +3393,7 @@
                 <a:schemeClr val="dk2"/>
               </a:buClr>
               <a:buSzPct val="100000"/>
-              <a:defRPr b="0" sz="5400">
+              <a:defRPr sz="5400" b="0">
                 <a:solidFill>
                   <a:schemeClr val="dk2"/>
                 </a:solidFill>
@@ -2849,7 +3407,7 @@
                 <a:schemeClr val="dk2"/>
               </a:buClr>
               <a:buSzPct val="100000"/>
-              <a:defRPr b="0" sz="5400">
+              <a:defRPr sz="5400" b="0">
                 <a:solidFill>
                   <a:schemeClr val="dk2"/>
                 </a:solidFill>
@@ -2863,22 +3421,26 @@
                 <a:schemeClr val="dk2"/>
               </a:buClr>
               <a:buSzPct val="100000"/>
-              <a:defRPr b="0" sz="5400">
+              <a:defRPr sz="5400" b="0">
                 <a:solidFill>
                   <a:schemeClr val="dk2"/>
                 </a:solidFill>
               </a:defRPr>
             </a:lvl9pPr>
           </a:lstStyle>
-          <a:p/>
+          <a:p>
+            <a:endParaRPr/>
+          </a:p>
         </p:txBody>
       </p:sp>
       <p:sp>
         <p:nvSpPr>
           <p:cNvPr id="44" name="Shape 44"/>
-          <p:cNvSpPr txBox="1"/>
+          <p:cNvSpPr txBox="1">
+            <a:spLocks noGrp="1"/>
+          </p:cNvSpPr>
           <p:nvPr>
-            <p:ph idx="12" type="sldNum"/>
+            <p:ph type="sldNum" idx="12"/>
           </p:nvPr>
         </p:nvSpPr>
         <p:spPr>
@@ -2891,7 +3453,7 @@
           </a:prstGeom>
         </p:spPr>
         <p:txBody>
-          <a:bodyPr anchorCtr="0" anchor="ctr" bIns="91425" lIns="91425" rIns="91425" tIns="91425">
+          <a:bodyPr lIns="91425" tIns="91425" rIns="91425" bIns="91425" anchor="ctr" anchorCtr="0">
             <a:noAutofit/>
           </a:bodyPr>
           <a:lstStyle/>
@@ -2906,6 +3468,7 @@
               <a:rPr lang="en"/>
               <a:t>‹#›</a:t>
             </a:fld>
+            <a:endParaRPr lang="en"/>
           </a:p>
         </p:txBody>
       </p:sp>
@@ -2917,12 +3480,12 @@
 </p:sldLayout>
 </file>
 
-<file path=ppt/slideLayouts/slideLayout7.xml><?xml version="1.0" encoding="utf-8"?>
-<p:sldLayout xmlns:a="http://schemas.openxmlformats.org/drawingml/2006/main" xmlns:r="http://schemas.openxmlformats.org/officeDocument/2006/relationships" xmlns:mc="http://schemas.openxmlformats.org/markup-compatibility/2006" xmlns:mv="urn:schemas-microsoft-com:mac:vml" xmlns:p="http://schemas.openxmlformats.org/presentationml/2006/main" xmlns:c="http://schemas.openxmlformats.org/drawingml/2006/chart" xmlns:dgm="http://schemas.openxmlformats.org/drawingml/2006/diagram" xmlns:o="urn:schemas-microsoft-com:office:office" xmlns:v="urn:schemas-microsoft-com:vml" xmlns:pvml="urn:schemas-microsoft-com:office:powerpoint" xmlns:com="http://schemas.openxmlformats.org/drawingml/2006/compatibility" xmlns:p14="http://schemas.microsoft.com/office/powerpoint/2010/main">
+<file path=ppt/slideLayouts/slideLayout8.xml><?xml version="1.0" encoding="utf-8"?>
+<p:sldLayout xmlns:a="http://schemas.openxmlformats.org/drawingml/2006/main" xmlns:r="http://schemas.openxmlformats.org/officeDocument/2006/relationships" xmlns:p="http://schemas.openxmlformats.org/presentationml/2006/main">
   <p:cSld name="Section title and description">
     <p:spTree>
       <p:nvGrpSpPr>
-        <p:cNvPr id="45" name="Shape 45"/>
+        <p:cNvPr id="1" name="Shape 45"/>
         <p:cNvGrpSpPr/>
         <p:nvPr/>
       </p:nvGrpSpPr>
@@ -2956,7 +3519,7 @@
           </a:ln>
         </p:spPr>
         <p:txBody>
-          <a:bodyPr anchorCtr="0" anchor="ctr" bIns="91425" lIns="91425" rIns="91425" tIns="91425">
+          <a:bodyPr lIns="91425" tIns="91425" rIns="91425" bIns="91425" anchor="ctr" anchorCtr="0">
             <a:noAutofit/>
           </a:bodyPr>
           <a:lstStyle/>
@@ -2967,9 +3530,6 @@
               </a:spcBef>
               <a:buNone/>
             </a:pPr>
-            <a:r>
-              <a:t/>
-            </a:r>
             <a:endParaRPr/>
           </a:p>
         </p:txBody>
@@ -2989,21 +3549,23 @@
             <a:avLst/>
           </a:prstGeom>
           <a:noFill/>
-          <a:ln cap="flat" cmpd="sng" w="19050">
+          <a:ln w="19050" cap="flat" cmpd="sng">
             <a:solidFill>
               <a:schemeClr val="lt1"/>
             </a:solidFill>
             <a:prstDash val="solid"/>
             <a:round/>
-            <a:headEnd len="med" w="med" type="none"/>
-            <a:tailEnd len="med" w="med" type="none"/>
+            <a:headEnd type="none" w="med" len="med"/>
+            <a:tailEnd type="none" w="med" len="med"/>
           </a:ln>
         </p:spPr>
       </p:cxnSp>
       <p:sp>
         <p:nvSpPr>
           <p:cNvPr id="48" name="Shape 48"/>
-          <p:cNvSpPr txBox="1"/>
+          <p:cNvSpPr txBox="1">
+            <a:spLocks noGrp="1"/>
+          </p:cNvSpPr>
           <p:nvPr>
             <p:ph type="title"/>
           </p:nvPr>
@@ -3018,7 +3580,7 @@
           </a:prstGeom>
         </p:spPr>
         <p:txBody>
-          <a:bodyPr anchorCtr="0" anchor="b" bIns="91425" lIns="91425" rIns="91425" tIns="91425"/>
+          <a:bodyPr lIns="91425" tIns="91425" rIns="91425" bIns="91425" anchor="b" anchorCtr="0"/>
           <a:lstStyle>
             <a:lvl1pPr lvl="0" algn="ctr">
               <a:spcBef>
@@ -3084,15 +3646,19 @@
               <a:defRPr sz="4200"/>
             </a:lvl9pPr>
           </a:lstStyle>
-          <a:p/>
+          <a:p>
+            <a:endParaRPr/>
+          </a:p>
         </p:txBody>
       </p:sp>
       <p:sp>
         <p:nvSpPr>
           <p:cNvPr id="49" name="Shape 49"/>
-          <p:cNvSpPr txBox="1"/>
+          <p:cNvSpPr txBox="1">
+            <a:spLocks noGrp="1"/>
+          </p:cNvSpPr>
           <p:nvPr>
-            <p:ph idx="1" type="subTitle"/>
+            <p:ph type="subTitle" idx="1"/>
           </p:nvPr>
         </p:nvSpPr>
         <p:spPr>
@@ -3105,7 +3671,7 @@
           </a:prstGeom>
         </p:spPr>
         <p:txBody>
-          <a:bodyPr anchorCtr="0" anchor="t" bIns="91425" lIns="91425" rIns="91425" tIns="91425"/>
+          <a:bodyPr lIns="91425" tIns="91425" rIns="91425" bIns="91425" anchor="t" anchorCtr="0"/>
           <a:lstStyle>
             <a:lvl1pPr lvl="0" algn="ctr">
               <a:lnSpc>
@@ -3234,15 +3800,19 @@
               <a:defRPr sz="2100"/>
             </a:lvl9pPr>
           </a:lstStyle>
-          <a:p/>
+          <a:p>
+            <a:endParaRPr/>
+          </a:p>
         </p:txBody>
       </p:sp>
       <p:sp>
         <p:nvSpPr>
           <p:cNvPr id="50" name="Shape 50"/>
-          <p:cNvSpPr txBox="1"/>
+          <p:cNvSpPr txBox="1">
+            <a:spLocks noGrp="1"/>
+          </p:cNvSpPr>
           <p:nvPr>
-            <p:ph idx="2" type="body"/>
+            <p:ph type="body" idx="2"/>
           </p:nvPr>
         </p:nvSpPr>
         <p:spPr>
@@ -3255,7 +3825,7 @@
           </a:prstGeom>
         </p:spPr>
         <p:txBody>
-          <a:bodyPr anchorCtr="0" anchor="ctr" bIns="91425" lIns="91425" rIns="91425" tIns="91425"/>
+          <a:bodyPr lIns="91425" tIns="91425" rIns="91425" bIns="91425" anchor="ctr" anchorCtr="0"/>
           <a:lstStyle>
             <a:lvl1pPr lvl="0">
               <a:spcBef>
@@ -3375,15 +3945,19 @@
               </a:defRPr>
             </a:lvl9pPr>
           </a:lstStyle>
-          <a:p/>
+          <a:p>
+            <a:endParaRPr/>
+          </a:p>
         </p:txBody>
       </p:sp>
       <p:sp>
         <p:nvSpPr>
           <p:cNvPr id="51" name="Shape 51"/>
-          <p:cNvSpPr txBox="1"/>
+          <p:cNvSpPr txBox="1">
+            <a:spLocks noGrp="1"/>
+          </p:cNvSpPr>
           <p:nvPr>
-            <p:ph idx="12" type="sldNum"/>
+            <p:ph type="sldNum" idx="12"/>
           </p:nvPr>
         </p:nvSpPr>
         <p:spPr>
@@ -3396,7 +3970,7 @@
           </a:prstGeom>
         </p:spPr>
         <p:txBody>
-          <a:bodyPr anchorCtr="0" anchor="ctr" bIns="91425" lIns="91425" rIns="91425" tIns="91425">
+          <a:bodyPr lIns="91425" tIns="91425" rIns="91425" bIns="91425" anchor="ctr" anchorCtr="0">
             <a:noAutofit/>
           </a:bodyPr>
           <a:lstStyle/>
@@ -3415,6 +3989,11 @@
               </a:rPr>
               <a:t>‹#›</a:t>
             </a:fld>
+            <a:endParaRPr lang="en">
+              <a:solidFill>
+                <a:schemeClr val="lt1"/>
+              </a:solidFill>
+            </a:endParaRPr>
           </a:p>
         </p:txBody>
       </p:sp>
@@ -3426,12 +4005,12 @@
 </p:sldLayout>
 </file>
 
-<file path=ppt/slideLayouts/slideLayout8.xml><?xml version="1.0" encoding="utf-8"?>
-<p:sldLayout xmlns:a="http://schemas.openxmlformats.org/drawingml/2006/main" xmlns:r="http://schemas.openxmlformats.org/officeDocument/2006/relationships" xmlns:mc="http://schemas.openxmlformats.org/markup-compatibility/2006" xmlns:mv="urn:schemas-microsoft-com:mac:vml" xmlns:p="http://schemas.openxmlformats.org/presentationml/2006/main" xmlns:c="http://schemas.openxmlformats.org/drawingml/2006/chart" xmlns:dgm="http://schemas.openxmlformats.org/drawingml/2006/diagram" xmlns:o="urn:schemas-microsoft-com:office:office" xmlns:v="urn:schemas-microsoft-com:vml" xmlns:pvml="urn:schemas-microsoft-com:office:powerpoint" xmlns:com="http://schemas.openxmlformats.org/drawingml/2006/compatibility" xmlns:p14="http://schemas.microsoft.com/office/powerpoint/2010/main">
+<file path=ppt/slideLayouts/slideLayout9.xml><?xml version="1.0" encoding="utf-8"?>
+<p:sldLayout xmlns:a="http://schemas.openxmlformats.org/drawingml/2006/main" xmlns:r="http://schemas.openxmlformats.org/officeDocument/2006/relationships" xmlns:p="http://schemas.openxmlformats.org/presentationml/2006/main">
   <p:cSld name="Caption">
     <p:spTree>
       <p:nvGrpSpPr>
-        <p:cNvPr id="52" name="Shape 52"/>
+        <p:cNvPr id="1" name="Shape 52"/>
         <p:cNvGrpSpPr/>
         <p:nvPr/>
       </p:nvGrpSpPr>
@@ -3446,9 +4025,11 @@
       <p:sp>
         <p:nvSpPr>
           <p:cNvPr id="53" name="Shape 53"/>
-          <p:cNvSpPr txBox="1"/>
+          <p:cNvSpPr txBox="1">
+            <a:spLocks noGrp="1"/>
+          </p:cNvSpPr>
           <p:nvPr>
-            <p:ph idx="1" type="body"/>
+            <p:ph type="body" idx="1"/>
           </p:nvPr>
         </p:nvSpPr>
         <p:spPr>
@@ -3461,7 +4042,7 @@
           </a:prstGeom>
         </p:spPr>
         <p:txBody>
-          <a:bodyPr anchorCtr="0" anchor="ctr" bIns="91425" lIns="91425" rIns="91425" tIns="91425"/>
+          <a:bodyPr lIns="91425" tIns="91425" rIns="91425" bIns="91425" anchor="ctr" anchorCtr="0"/>
           <a:lstStyle>
             <a:lvl1pPr lvl="0">
               <a:lnSpc>
@@ -3484,15 +4065,19 @@
               </a:defRPr>
             </a:lvl1pPr>
           </a:lstStyle>
-          <a:p/>
+          <a:p>
+            <a:endParaRPr/>
+          </a:p>
         </p:txBody>
       </p:sp>
       <p:sp>
         <p:nvSpPr>
           <p:cNvPr id="54" name="Shape 54"/>
-          <p:cNvSpPr txBox="1"/>
+          <p:cNvSpPr txBox="1">
+            <a:spLocks noGrp="1"/>
+          </p:cNvSpPr>
           <p:nvPr>
-            <p:ph idx="12" type="sldNum"/>
+            <p:ph type="sldNum" idx="12"/>
           </p:nvPr>
         </p:nvSpPr>
         <p:spPr>
@@ -3505,7 +4090,7 @@
           </a:prstGeom>
         </p:spPr>
         <p:txBody>
-          <a:bodyPr anchorCtr="0" anchor="ctr" bIns="91425" lIns="91425" rIns="91425" tIns="91425">
+          <a:bodyPr lIns="91425" tIns="91425" rIns="91425" bIns="91425" anchor="ctr" anchorCtr="0">
             <a:noAutofit/>
           </a:bodyPr>
           <a:lstStyle/>
@@ -3520,6 +4105,7 @@
               <a:rPr lang="en"/>
               <a:t>‹#›</a:t>
             </a:fld>
+            <a:endParaRPr lang="en"/>
           </a:p>
         </p:txBody>
       </p:sp>
@@ -3531,348 +4117,20 @@
 </p:sldLayout>
 </file>
 
-<file path=ppt/slideLayouts/slideLayout9.xml><?xml version="1.0" encoding="utf-8"?>
-<p:sldLayout xmlns:a="http://schemas.openxmlformats.org/drawingml/2006/main" xmlns:r="http://schemas.openxmlformats.org/officeDocument/2006/relationships" xmlns:mc="http://schemas.openxmlformats.org/markup-compatibility/2006" xmlns:mv="urn:schemas-microsoft-com:mac:vml" xmlns:p="http://schemas.openxmlformats.org/presentationml/2006/main" xmlns:c="http://schemas.openxmlformats.org/drawingml/2006/chart" xmlns:dgm="http://schemas.openxmlformats.org/drawingml/2006/diagram" xmlns:o="urn:schemas-microsoft-com:office:office" xmlns:v="urn:schemas-microsoft-com:vml" xmlns:pvml="urn:schemas-microsoft-com:office:powerpoint" xmlns:com="http://schemas.openxmlformats.org/drawingml/2006/compatibility" xmlns:p14="http://schemas.microsoft.com/office/powerpoint/2010/main">
-  <p:cSld name="Big number">
-    <p:spTree>
-      <p:nvGrpSpPr>
-        <p:cNvPr id="55" name="Shape 55"/>
-        <p:cNvGrpSpPr/>
-        <p:nvPr/>
-      </p:nvGrpSpPr>
-      <p:grpSpPr>
-        <a:xfrm>
-          <a:off x="0" y="0"/>
-          <a:ext cx="0" cy="0"/>
-          <a:chOff x="0" y="0"/>
-          <a:chExt cx="0" cy="0"/>
-        </a:xfrm>
-      </p:grpSpPr>
-      <p:sp>
-        <p:nvSpPr>
-          <p:cNvPr id="56" name="Shape 56"/>
-          <p:cNvSpPr/>
-          <p:nvPr/>
-        </p:nvSpPr>
-        <p:spPr>
-          <a:xfrm>
-            <a:off x="-75" y="5045700"/>
-            <a:ext cx="9144000" cy="97800"/>
-          </a:xfrm>
-          <a:prstGeom prst="rect">
-            <a:avLst/>
-          </a:prstGeom>
-          <a:solidFill>
-            <a:schemeClr val="lt2"/>
-          </a:solidFill>
-          <a:ln>
-            <a:noFill/>
-          </a:ln>
-        </p:spPr>
-        <p:txBody>
-          <a:bodyPr anchorCtr="0" anchor="ctr" bIns="91425" lIns="91425" rIns="91425" tIns="91425">
-            <a:noAutofit/>
-          </a:bodyPr>
-          <a:lstStyle/>
-          <a:p>
-            <a:pPr lvl="0">
-              <a:spcBef>
-                <a:spcPts val="0"/>
-              </a:spcBef>
-              <a:buNone/>
-            </a:pPr>
-            <a:r>
-              <a:t/>
-            </a:r>
-            <a:endParaRPr/>
-          </a:p>
-        </p:txBody>
-      </p:sp>
-      <p:sp>
-        <p:nvSpPr>
-          <p:cNvPr id="57" name="Shape 57"/>
-          <p:cNvSpPr txBox="1"/>
-          <p:nvPr>
-            <p:ph type="title"/>
-          </p:nvPr>
-        </p:nvSpPr>
-        <p:spPr>
-          <a:xfrm>
-            <a:off x="311700" y="1304850"/>
-            <a:ext cx="8520599" cy="1538399"/>
-          </a:xfrm>
-          <a:prstGeom prst="rect">
-            <a:avLst/>
-          </a:prstGeom>
-        </p:spPr>
-        <p:txBody>
-          <a:bodyPr anchorCtr="0" anchor="ctr" bIns="91425" lIns="91425" rIns="91425" tIns="91425"/>
-          <a:lstStyle>
-            <a:lvl1pPr lvl="0" algn="ctr">
-              <a:spcBef>
-                <a:spcPts val="0"/>
-              </a:spcBef>
-              <a:buClr>
-                <a:schemeClr val="accent3"/>
-              </a:buClr>
-              <a:buSzPct val="100000"/>
-              <a:defRPr sz="13000">
-                <a:solidFill>
-                  <a:schemeClr val="accent3"/>
-                </a:solidFill>
-              </a:defRPr>
-            </a:lvl1pPr>
-            <a:lvl2pPr lvl="1" algn="ctr">
-              <a:spcBef>
-                <a:spcPts val="0"/>
-              </a:spcBef>
-              <a:buClr>
-                <a:schemeClr val="accent3"/>
-              </a:buClr>
-              <a:buSzPct val="100000"/>
-              <a:defRPr sz="13000">
-                <a:solidFill>
-                  <a:schemeClr val="accent3"/>
-                </a:solidFill>
-              </a:defRPr>
-            </a:lvl2pPr>
-            <a:lvl3pPr lvl="2" algn="ctr">
-              <a:spcBef>
-                <a:spcPts val="0"/>
-              </a:spcBef>
-              <a:buClr>
-                <a:schemeClr val="accent3"/>
-              </a:buClr>
-              <a:buSzPct val="100000"/>
-              <a:defRPr sz="13000">
-                <a:solidFill>
-                  <a:schemeClr val="accent3"/>
-                </a:solidFill>
-              </a:defRPr>
-            </a:lvl3pPr>
-            <a:lvl4pPr lvl="3" algn="ctr">
-              <a:spcBef>
-                <a:spcPts val="0"/>
-              </a:spcBef>
-              <a:buClr>
-                <a:schemeClr val="accent3"/>
-              </a:buClr>
-              <a:buSzPct val="100000"/>
-              <a:defRPr sz="13000">
-                <a:solidFill>
-                  <a:schemeClr val="accent3"/>
-                </a:solidFill>
-              </a:defRPr>
-            </a:lvl4pPr>
-            <a:lvl5pPr lvl="4" algn="ctr">
-              <a:spcBef>
-                <a:spcPts val="0"/>
-              </a:spcBef>
-              <a:buClr>
-                <a:schemeClr val="accent3"/>
-              </a:buClr>
-              <a:buSzPct val="100000"/>
-              <a:defRPr sz="13000">
-                <a:solidFill>
-                  <a:schemeClr val="accent3"/>
-                </a:solidFill>
-              </a:defRPr>
-            </a:lvl5pPr>
-            <a:lvl6pPr lvl="5" algn="ctr">
-              <a:spcBef>
-                <a:spcPts val="0"/>
-              </a:spcBef>
-              <a:buClr>
-                <a:schemeClr val="accent3"/>
-              </a:buClr>
-              <a:buSzPct val="100000"/>
-              <a:defRPr sz="13000">
-                <a:solidFill>
-                  <a:schemeClr val="accent3"/>
-                </a:solidFill>
-              </a:defRPr>
-            </a:lvl6pPr>
-            <a:lvl7pPr lvl="6" algn="ctr">
-              <a:spcBef>
-                <a:spcPts val="0"/>
-              </a:spcBef>
-              <a:buClr>
-                <a:schemeClr val="accent3"/>
-              </a:buClr>
-              <a:buSzPct val="100000"/>
-              <a:defRPr sz="13000">
-                <a:solidFill>
-                  <a:schemeClr val="accent3"/>
-                </a:solidFill>
-              </a:defRPr>
-            </a:lvl7pPr>
-            <a:lvl8pPr lvl="7" algn="ctr">
-              <a:spcBef>
-                <a:spcPts val="0"/>
-              </a:spcBef>
-              <a:buClr>
-                <a:schemeClr val="accent3"/>
-              </a:buClr>
-              <a:buSzPct val="100000"/>
-              <a:defRPr sz="13000">
-                <a:solidFill>
-                  <a:schemeClr val="accent3"/>
-                </a:solidFill>
-              </a:defRPr>
-            </a:lvl8pPr>
-            <a:lvl9pPr lvl="8" algn="ctr">
-              <a:spcBef>
-                <a:spcPts val="0"/>
-              </a:spcBef>
-              <a:buClr>
-                <a:schemeClr val="accent3"/>
-              </a:buClr>
-              <a:buSzPct val="100000"/>
-              <a:defRPr sz="13000">
-                <a:solidFill>
-                  <a:schemeClr val="accent3"/>
-                </a:solidFill>
-              </a:defRPr>
-            </a:lvl9pPr>
-          </a:lstStyle>
-          <a:p/>
-        </p:txBody>
-      </p:sp>
-      <p:sp>
-        <p:nvSpPr>
-          <p:cNvPr id="58" name="Shape 58"/>
-          <p:cNvSpPr txBox="1"/>
-          <p:nvPr>
-            <p:ph idx="1" type="body"/>
-          </p:nvPr>
-        </p:nvSpPr>
-        <p:spPr>
-          <a:xfrm>
-            <a:off x="311700" y="2995650"/>
-            <a:ext cx="8520599" cy="1071599"/>
-          </a:xfrm>
-          <a:prstGeom prst="rect">
-            <a:avLst/>
-          </a:prstGeom>
-        </p:spPr>
-        <p:txBody>
-          <a:bodyPr anchorCtr="0" anchor="t" bIns="91425" lIns="91425" rIns="91425" tIns="91425"/>
-          <a:lstStyle>
-            <a:lvl1pPr lvl="0" algn="ctr">
-              <a:spcBef>
-                <a:spcPts val="0"/>
-              </a:spcBef>
-              <a:defRPr/>
-            </a:lvl1pPr>
-            <a:lvl2pPr lvl="1" algn="ctr">
-              <a:spcBef>
-                <a:spcPts val="0"/>
-              </a:spcBef>
-              <a:defRPr/>
-            </a:lvl2pPr>
-            <a:lvl3pPr lvl="2" algn="ctr">
-              <a:spcBef>
-                <a:spcPts val="0"/>
-              </a:spcBef>
-              <a:defRPr/>
-            </a:lvl3pPr>
-            <a:lvl4pPr lvl="3" algn="ctr">
-              <a:spcBef>
-                <a:spcPts val="0"/>
-              </a:spcBef>
-              <a:defRPr/>
-            </a:lvl4pPr>
-            <a:lvl5pPr lvl="4" algn="ctr">
-              <a:spcBef>
-                <a:spcPts val="0"/>
-              </a:spcBef>
-              <a:defRPr/>
-            </a:lvl5pPr>
-            <a:lvl6pPr lvl="5" algn="ctr">
-              <a:spcBef>
-                <a:spcPts val="0"/>
-              </a:spcBef>
-              <a:defRPr/>
-            </a:lvl6pPr>
-            <a:lvl7pPr lvl="6" algn="ctr">
-              <a:spcBef>
-                <a:spcPts val="0"/>
-              </a:spcBef>
-              <a:defRPr/>
-            </a:lvl7pPr>
-            <a:lvl8pPr lvl="7" algn="ctr">
-              <a:spcBef>
-                <a:spcPts val="0"/>
-              </a:spcBef>
-              <a:defRPr/>
-            </a:lvl8pPr>
-            <a:lvl9pPr lvl="8" algn="ctr">
-              <a:spcBef>
-                <a:spcPts val="0"/>
-              </a:spcBef>
-              <a:defRPr/>
-            </a:lvl9pPr>
-          </a:lstStyle>
-          <a:p/>
-        </p:txBody>
-      </p:sp>
-      <p:sp>
-        <p:nvSpPr>
-          <p:cNvPr id="59" name="Shape 59"/>
-          <p:cNvSpPr txBox="1"/>
-          <p:nvPr>
-            <p:ph idx="12" type="sldNum"/>
-          </p:nvPr>
-        </p:nvSpPr>
-        <p:spPr>
-          <a:xfrm>
-            <a:off x="8472457" y="4663216"/>
-            <a:ext cx="548699" cy="393600"/>
-          </a:xfrm>
-          <a:prstGeom prst="rect">
-            <a:avLst/>
-          </a:prstGeom>
-        </p:spPr>
-        <p:txBody>
-          <a:bodyPr anchorCtr="0" anchor="ctr" bIns="91425" lIns="91425" rIns="91425" tIns="91425">
-            <a:noAutofit/>
-          </a:bodyPr>
-          <a:lstStyle/>
-          <a:p>
-            <a:pPr lvl="0">
-              <a:spcBef>
-                <a:spcPts val="0"/>
-              </a:spcBef>
-              <a:buNone/>
-            </a:pPr>
-            <a:fld id="{00000000-1234-1234-1234-123412341234}" type="slidenum">
-              <a:rPr lang="en"/>
-              <a:t>‹#›</a:t>
-            </a:fld>
-          </a:p>
-        </p:txBody>
-      </p:sp>
-    </p:spTree>
-  </p:cSld>
-  <p:clrMapOvr>
-    <a:masterClrMapping/>
-  </p:clrMapOvr>
-</p:sldLayout>
-</file>
-
-<file path=ppt/slideMasters/slideMaster.xml><?xml version="1.0" encoding="utf-8"?>
-<p:sldMaster xmlns:a="http://schemas.openxmlformats.org/drawingml/2006/main" xmlns:r="http://schemas.openxmlformats.org/officeDocument/2006/relationships" xmlns:mc="http://schemas.openxmlformats.org/markup-compatibility/2006" xmlns:mv="urn:schemas-microsoft-com:mac:vml" xmlns:p="http://schemas.openxmlformats.org/presentationml/2006/main" xmlns:c="http://schemas.openxmlformats.org/drawingml/2006/chart" xmlns:dgm="http://schemas.openxmlformats.org/drawingml/2006/diagram" xmlns:o="urn:schemas-microsoft-com:office:office" xmlns:v="urn:schemas-microsoft-com:vml" xmlns:pvml="urn:schemas-microsoft-com:office:powerpoint" xmlns:com="http://schemas.openxmlformats.org/drawingml/2006/compatibility" xmlns:p14="http://schemas.microsoft.com/office/powerpoint/2010/main">
+<file path=ppt/slideMasters/slideMaster1.xml><?xml version="1.0" encoding="utf-8"?>
+<p:sldMaster xmlns:a="http://schemas.openxmlformats.org/drawingml/2006/main" xmlns:r="http://schemas.openxmlformats.org/officeDocument/2006/relationships" xmlns:p="http://schemas.openxmlformats.org/presentationml/2006/main">
   <p:cSld>
     <p:bg>
       <p:bgPr>
         <a:solidFill>
           <a:schemeClr val="lt1"/>
         </a:solidFill>
+        <a:effectLst/>
       </p:bgPr>
     </p:bg>
     <p:spTree>
       <p:nvGrpSpPr>
-        <p:cNvPr id="5" name="Shape 5"/>
+        <p:cNvPr id="1" name="Shape 5"/>
         <p:cNvGrpSpPr/>
         <p:nvPr/>
       </p:nvGrpSpPr>
@@ -3887,7 +4145,9 @@
       <p:sp>
         <p:nvSpPr>
           <p:cNvPr id="6" name="Shape 6"/>
-          <p:cNvSpPr txBox="1"/>
+          <p:cNvSpPr txBox="1">
+            <a:spLocks noGrp="1"/>
+          </p:cNvSpPr>
           <p:nvPr>
             <p:ph type="title"/>
           </p:nvPr>
@@ -3906,7 +4166,7 @@
           </a:ln>
         </p:spPr>
         <p:txBody>
-          <a:bodyPr anchorCtr="0" anchor="t" bIns="91425" lIns="91425" rIns="91425" tIns="91425"/>
+          <a:bodyPr lIns="91425" tIns="91425" rIns="91425" bIns="91425" anchor="t" anchorCtr="0"/>
           <a:lstStyle>
             <a:lvl1pPr lvl="0">
               <a:spcBef>
@@ -3918,7 +4178,7 @@
               <a:buSzPct val="100000"/>
               <a:buFont typeface="PT Sans Narrow"/>
               <a:buNone/>
-              <a:defRPr b="1" sz="3600">
+              <a:defRPr sz="3600" b="1">
                 <a:solidFill>
                   <a:schemeClr val="accent1"/>
                 </a:solidFill>
@@ -3938,7 +4198,7 @@
               <a:buSzPct val="100000"/>
               <a:buFont typeface="PT Sans Narrow"/>
               <a:buNone/>
-              <a:defRPr b="1" sz="3600">
+              <a:defRPr sz="3600" b="1">
                 <a:solidFill>
                   <a:schemeClr val="accent1"/>
                 </a:solidFill>
@@ -3958,7 +4218,7 @@
               <a:buSzPct val="100000"/>
               <a:buFont typeface="PT Sans Narrow"/>
               <a:buNone/>
-              <a:defRPr b="1" sz="3600">
+              <a:defRPr sz="3600" b="1">
                 <a:solidFill>
                   <a:schemeClr val="accent1"/>
                 </a:solidFill>
@@ -3978,7 +4238,7 @@
               <a:buSzPct val="100000"/>
               <a:buFont typeface="PT Sans Narrow"/>
               <a:buNone/>
-              <a:defRPr b="1" sz="3600">
+              <a:defRPr sz="3600" b="1">
                 <a:solidFill>
                   <a:schemeClr val="accent1"/>
                 </a:solidFill>
@@ -3998,7 +4258,7 @@
               <a:buSzPct val="100000"/>
               <a:buFont typeface="PT Sans Narrow"/>
               <a:buNone/>
-              <a:defRPr b="1" sz="3600">
+              <a:defRPr sz="3600" b="1">
                 <a:solidFill>
                   <a:schemeClr val="accent1"/>
                 </a:solidFill>
@@ -4018,7 +4278,7 @@
               <a:buSzPct val="100000"/>
               <a:buFont typeface="PT Sans Narrow"/>
               <a:buNone/>
-              <a:defRPr b="1" sz="3600">
+              <a:defRPr sz="3600" b="1">
                 <a:solidFill>
                   <a:schemeClr val="accent1"/>
                 </a:solidFill>
@@ -4038,7 +4298,7 @@
               <a:buSzPct val="100000"/>
               <a:buFont typeface="PT Sans Narrow"/>
               <a:buNone/>
-              <a:defRPr b="1" sz="3600">
+              <a:defRPr sz="3600" b="1">
                 <a:solidFill>
                   <a:schemeClr val="accent1"/>
                 </a:solidFill>
@@ -4058,7 +4318,7 @@
               <a:buSzPct val="100000"/>
               <a:buFont typeface="PT Sans Narrow"/>
               <a:buNone/>
-              <a:defRPr b="1" sz="3600">
+              <a:defRPr sz="3600" b="1">
                 <a:solidFill>
                   <a:schemeClr val="accent1"/>
                 </a:solidFill>
@@ -4078,7 +4338,7 @@
               <a:buSzPct val="100000"/>
               <a:buFont typeface="PT Sans Narrow"/>
               <a:buNone/>
-              <a:defRPr b="1" sz="3600">
+              <a:defRPr sz="3600" b="1">
                 <a:solidFill>
                   <a:schemeClr val="accent1"/>
                 </a:solidFill>
@@ -4089,15 +4349,19 @@
               </a:defRPr>
             </a:lvl9pPr>
           </a:lstStyle>
-          <a:p/>
+          <a:p>
+            <a:endParaRPr/>
+          </a:p>
         </p:txBody>
       </p:sp>
       <p:sp>
         <p:nvSpPr>
           <p:cNvPr id="7" name="Shape 7"/>
-          <p:cNvSpPr txBox="1"/>
+          <p:cNvSpPr txBox="1">
+            <a:spLocks noGrp="1"/>
+          </p:cNvSpPr>
           <p:nvPr>
-            <p:ph idx="1" type="body"/>
+            <p:ph type="body" idx="1"/>
           </p:nvPr>
         </p:nvSpPr>
         <p:spPr>
@@ -4114,7 +4378,7 @@
           </a:ln>
         </p:spPr>
         <p:txBody>
-          <a:bodyPr anchorCtr="0" anchor="t" bIns="91425" lIns="91425" rIns="91425" tIns="91425"/>
+          <a:bodyPr lIns="91425" tIns="91425" rIns="91425" bIns="91425" anchor="t" anchorCtr="0"/>
           <a:lstStyle>
             <a:lvl1pPr lvl="0">
               <a:lnSpc>
@@ -4334,15 +4598,19 @@
               </a:defRPr>
             </a:lvl9pPr>
           </a:lstStyle>
-          <a:p/>
+          <a:p>
+            <a:endParaRPr/>
+          </a:p>
         </p:txBody>
       </p:sp>
       <p:sp>
         <p:nvSpPr>
           <p:cNvPr id="8" name="Shape 8"/>
-          <p:cNvSpPr txBox="1"/>
+          <p:cNvSpPr txBox="1">
+            <a:spLocks noGrp="1"/>
+          </p:cNvSpPr>
           <p:nvPr>
-            <p:ph idx="12" type="sldNum"/>
+            <p:ph type="sldNum" idx="12"/>
           </p:nvPr>
         </p:nvSpPr>
         <p:spPr>
@@ -4359,7 +4627,7 @@
           </a:ln>
         </p:spPr>
         <p:txBody>
-          <a:bodyPr anchorCtr="0" anchor="ctr" bIns="91425" lIns="91425" rIns="91425" tIns="91425">
+          <a:bodyPr lIns="91425" tIns="91425" rIns="91425" bIns="91425" anchor="ctr" anchorCtr="0">
             <a:noAutofit/>
           </a:bodyPr>
           <a:lstStyle/>
@@ -4382,12 +4650,21 @@
               </a:rPr>
               <a:t>‹#›</a:t>
             </a:fld>
+            <a:endParaRPr lang="en" sz="1000">
+              <a:solidFill>
+                <a:schemeClr val="dk2"/>
+              </a:solidFill>
+              <a:latin typeface="Open Sans"/>
+              <a:ea typeface="Open Sans"/>
+              <a:cs typeface="Open Sans"/>
+              <a:sym typeface="Open Sans"/>
+            </a:endParaRPr>
           </a:p>
         </p:txBody>
       </p:sp>
     </p:spTree>
   </p:cSld>
-  <p:clrMap accent1="accent1" accent2="accent2" accent3="accent3" accent4="accent4" accent5="accent5" accent6="accent6" bg1="lt1" bg2="dk2" tx1="dk1" tx2="lt2" folHlink="folHlink" hlink="hlink"/>
+  <p:clrMap bg1="lt1" tx1="dk1" bg2="dk2" tx2="lt2" accent1="accent1" accent2="accent2" accent3="accent3" accent4="accent4" accent5="accent5" accent6="accent6" hlink="hlink" folHlink="folHlink"/>
   <p:sldLayoutIdLst>
     <p:sldLayoutId id="2147483648" r:id="rId1"/>
     <p:sldLayoutId id="2147483649" r:id="rId2"/>
@@ -4401,10 +4678,10 @@
     <p:sldLayoutId id="2147483657" r:id="rId10"/>
     <p:sldLayoutId id="2147483658" r:id="rId11"/>
   </p:sldLayoutIdLst>
-  <p:hf dt="0" ftr="0" hdr="0" sldNum="0"/>
+  <p:hf sldNum="0" hdr="0" ftr="0" dt="0"/>
   <p:txStyles>
     <p:titleStyle>
-      <a:defPPr lvl="0" marR="0" rtl="0" algn="l">
+      <a:defPPr marR="0" lvl="0" algn="l" rtl="0">
         <a:lnSpc>
           <a:spcPct val="100000"/>
         </a:lnSpc>
@@ -4415,7 +4692,7 @@
           <a:spcPts val="0"/>
         </a:spcAft>
       </a:defPPr>
-      <a:lvl1pPr lvl="0" marR="0" rtl="0" algn="l">
+      <a:lvl1pPr marR="0" lvl="0" algn="l" rtl="0">
         <a:lnSpc>
           <a:spcPct val="100000"/>
         </a:lnSpc>
@@ -4426,7 +4703,7 @@
           <a:spcPts val="0"/>
         </a:spcAft>
         <a:buNone/>
-        <a:defRPr b="0" i="0" sz="1400" u="none" cap="none" strike="noStrike">
+        <a:defRPr sz="1400" b="0" i="0" u="none" strike="noStrike" cap="none">
           <a:solidFill>
             <a:srgbClr val="000000"/>
           </a:solidFill>
@@ -4438,7 +4715,7 @@
       </a:lvl1pPr>
     </p:titleStyle>
     <p:bodyStyle>
-      <a:defPPr lvl="0" marR="0" rtl="0" algn="l">
+      <a:defPPr marR="0" lvl="0" algn="l" rtl="0">
         <a:lnSpc>
           <a:spcPct val="100000"/>
         </a:lnSpc>
@@ -4449,7 +4726,7 @@
           <a:spcPts val="0"/>
         </a:spcAft>
       </a:defPPr>
-      <a:lvl1pPr lvl="0" marR="0" rtl="0" algn="l">
+      <a:lvl1pPr marR="0" lvl="0" algn="l" rtl="0">
         <a:lnSpc>
           <a:spcPct val="100000"/>
         </a:lnSpc>
@@ -4460,7 +4737,7 @@
           <a:spcPts val="0"/>
         </a:spcAft>
         <a:buNone/>
-        <a:defRPr b="0" i="0" sz="1400" u="none" cap="none" strike="noStrike">
+        <a:defRPr sz="1400" b="0" i="0" u="none" strike="noStrike" cap="none">
           <a:solidFill>
             <a:srgbClr val="000000"/>
           </a:solidFill>
@@ -4470,7 +4747,7 @@
           <a:sym typeface="Arial"/>
         </a:defRPr>
       </a:lvl1pPr>
-      <a:lvl2pPr lvl="1" marR="0" rtl="0" algn="l">
+      <a:lvl2pPr marR="0" lvl="1" algn="l" rtl="0">
         <a:lnSpc>
           <a:spcPct val="100000"/>
         </a:lnSpc>
@@ -4481,7 +4758,7 @@
           <a:spcPts val="0"/>
         </a:spcAft>
         <a:buNone/>
-        <a:defRPr b="0" i="0" sz="1400" u="none" cap="none" strike="noStrike">
+        <a:defRPr sz="1400" b="0" i="0" u="none" strike="noStrike" cap="none">
           <a:solidFill>
             <a:srgbClr val="000000"/>
           </a:solidFill>
@@ -4491,7 +4768,7 @@
           <a:sym typeface="Arial"/>
         </a:defRPr>
       </a:lvl2pPr>
-      <a:lvl3pPr lvl="2" marR="0" rtl="0" algn="l">
+      <a:lvl3pPr marR="0" lvl="2" algn="l" rtl="0">
         <a:lnSpc>
           <a:spcPct val="100000"/>
         </a:lnSpc>
@@ -4502,7 +4779,7 @@
           <a:spcPts val="0"/>
         </a:spcAft>
         <a:buNone/>
-        <a:defRPr b="0" i="0" sz="1400" u="none" cap="none" strike="noStrike">
+        <a:defRPr sz="1400" b="0" i="0" u="none" strike="noStrike" cap="none">
           <a:solidFill>
             <a:srgbClr val="000000"/>
           </a:solidFill>
@@ -4512,7 +4789,7 @@
           <a:sym typeface="Arial"/>
         </a:defRPr>
       </a:lvl3pPr>
-      <a:lvl4pPr lvl="3" marR="0" rtl="0" algn="l">
+      <a:lvl4pPr marR="0" lvl="3" algn="l" rtl="0">
         <a:lnSpc>
           <a:spcPct val="100000"/>
         </a:lnSpc>
@@ -4523,7 +4800,7 @@
           <a:spcPts val="0"/>
         </a:spcAft>
         <a:buNone/>
-        <a:defRPr b="0" i="0" sz="1400" u="none" cap="none" strike="noStrike">
+        <a:defRPr sz="1400" b="0" i="0" u="none" strike="noStrike" cap="none">
           <a:solidFill>
             <a:srgbClr val="000000"/>
           </a:solidFill>
@@ -4533,7 +4810,7 @@
           <a:sym typeface="Arial"/>
         </a:defRPr>
       </a:lvl4pPr>
-      <a:lvl5pPr lvl="4" marR="0" rtl="0" algn="l">
+      <a:lvl5pPr marR="0" lvl="4" algn="l" rtl="0">
         <a:lnSpc>
           <a:spcPct val="100000"/>
         </a:lnSpc>
@@ -4544,7 +4821,7 @@
           <a:spcPts val="0"/>
         </a:spcAft>
         <a:buNone/>
-        <a:defRPr b="0" i="0" sz="1400" u="none" cap="none" strike="noStrike">
+        <a:defRPr sz="1400" b="0" i="0" u="none" strike="noStrike" cap="none">
           <a:solidFill>
             <a:srgbClr val="000000"/>
           </a:solidFill>
@@ -4554,7 +4831,7 @@
           <a:sym typeface="Arial"/>
         </a:defRPr>
       </a:lvl5pPr>
-      <a:lvl6pPr lvl="5" marR="0" rtl="0" algn="l">
+      <a:lvl6pPr marR="0" lvl="5" algn="l" rtl="0">
         <a:lnSpc>
           <a:spcPct val="100000"/>
         </a:lnSpc>
@@ -4565,7 +4842,7 @@
           <a:spcPts val="0"/>
         </a:spcAft>
         <a:buNone/>
-        <a:defRPr b="0" i="0" sz="1400" u="none" cap="none" strike="noStrike">
+        <a:defRPr sz="1400" b="0" i="0" u="none" strike="noStrike" cap="none">
           <a:solidFill>
             <a:srgbClr val="000000"/>
           </a:solidFill>
@@ -4575,7 +4852,7 @@
           <a:sym typeface="Arial"/>
         </a:defRPr>
       </a:lvl6pPr>
-      <a:lvl7pPr lvl="6" marR="0" rtl="0" algn="l">
+      <a:lvl7pPr marR="0" lvl="6" algn="l" rtl="0">
         <a:lnSpc>
           <a:spcPct val="100000"/>
         </a:lnSpc>
@@ -4586,7 +4863,7 @@
           <a:spcPts val="0"/>
         </a:spcAft>
         <a:buNone/>
-        <a:defRPr b="0" i="0" sz="1400" u="none" cap="none" strike="noStrike">
+        <a:defRPr sz="1400" b="0" i="0" u="none" strike="noStrike" cap="none">
           <a:solidFill>
             <a:srgbClr val="000000"/>
           </a:solidFill>
@@ -4596,7 +4873,7 @@
           <a:sym typeface="Arial"/>
         </a:defRPr>
       </a:lvl7pPr>
-      <a:lvl8pPr lvl="7" marR="0" rtl="0" algn="l">
+      <a:lvl8pPr marR="0" lvl="7" algn="l" rtl="0">
         <a:lnSpc>
           <a:spcPct val="100000"/>
         </a:lnSpc>
@@ -4607,7 +4884,7 @@
           <a:spcPts val="0"/>
         </a:spcAft>
         <a:buNone/>
-        <a:defRPr b="0" i="0" sz="1400" u="none" cap="none" strike="noStrike">
+        <a:defRPr sz="1400" b="0" i="0" u="none" strike="noStrike" cap="none">
           <a:solidFill>
             <a:srgbClr val="000000"/>
           </a:solidFill>
@@ -4617,7 +4894,7 @@
           <a:sym typeface="Arial"/>
         </a:defRPr>
       </a:lvl8pPr>
-      <a:lvl9pPr lvl="8" marR="0" rtl="0" algn="l">
+      <a:lvl9pPr marR="0" lvl="8" algn="l" rtl="0">
         <a:lnSpc>
           <a:spcPct val="100000"/>
         </a:lnSpc>
@@ -4628,7 +4905,7 @@
           <a:spcPts val="0"/>
         </a:spcAft>
         <a:buNone/>
-        <a:defRPr b="0" i="0" sz="1400" u="none" cap="none" strike="noStrike">
+        <a:defRPr sz="1400" b="0" i="0" u="none" strike="noStrike" cap="none">
           <a:solidFill>
             <a:srgbClr val="000000"/>
           </a:solidFill>
@@ -4640,7 +4917,7 @@
       </a:lvl9pPr>
     </p:bodyStyle>
     <p:otherStyle>
-      <a:defPPr lvl="0" marR="0" rtl="0" algn="l">
+      <a:defPPr marR="0" lvl="0" algn="l" rtl="0">
         <a:lnSpc>
           <a:spcPct val="100000"/>
         </a:lnSpc>
@@ -4651,7 +4928,7 @@
           <a:spcPts val="0"/>
         </a:spcAft>
       </a:defPPr>
-      <a:lvl1pPr lvl="0" marR="0" rtl="0" algn="l">
+      <a:lvl1pPr marR="0" lvl="0" algn="l" rtl="0">
         <a:lnSpc>
           <a:spcPct val="100000"/>
         </a:lnSpc>
@@ -4662,7 +4939,7 @@
           <a:spcPts val="0"/>
         </a:spcAft>
         <a:buNone/>
-        <a:defRPr b="0" i="0" sz="1400" u="none" cap="none" strike="noStrike">
+        <a:defRPr sz="1400" b="0" i="0" u="none" strike="noStrike" cap="none">
           <a:solidFill>
             <a:srgbClr val="000000"/>
           </a:solidFill>
@@ -4672,7 +4949,7 @@
           <a:sym typeface="Arial"/>
         </a:defRPr>
       </a:lvl1pPr>
-      <a:lvl2pPr lvl="1" marR="0" rtl="0" algn="l">
+      <a:lvl2pPr marR="0" lvl="1" algn="l" rtl="0">
         <a:lnSpc>
           <a:spcPct val="100000"/>
         </a:lnSpc>
@@ -4683,7 +4960,7 @@
           <a:spcPts val="0"/>
         </a:spcAft>
         <a:buNone/>
-        <a:defRPr b="0" i="0" sz="1400" u="none" cap="none" strike="noStrike">
+        <a:defRPr sz="1400" b="0" i="0" u="none" strike="noStrike" cap="none">
           <a:solidFill>
             <a:srgbClr val="000000"/>
           </a:solidFill>
@@ -4693,7 +4970,7 @@
           <a:sym typeface="Arial"/>
         </a:defRPr>
       </a:lvl2pPr>
-      <a:lvl3pPr lvl="2" marR="0" rtl="0" algn="l">
+      <a:lvl3pPr marR="0" lvl="2" algn="l" rtl="0">
         <a:lnSpc>
           <a:spcPct val="100000"/>
         </a:lnSpc>
@@ -4704,7 +4981,7 @@
           <a:spcPts val="0"/>
         </a:spcAft>
         <a:buNone/>
-        <a:defRPr b="0" i="0" sz="1400" u="none" cap="none" strike="noStrike">
+        <a:defRPr sz="1400" b="0" i="0" u="none" strike="noStrike" cap="none">
           <a:solidFill>
             <a:srgbClr val="000000"/>
           </a:solidFill>
@@ -4714,7 +4991,7 @@
           <a:sym typeface="Arial"/>
         </a:defRPr>
       </a:lvl3pPr>
-      <a:lvl4pPr lvl="3" marR="0" rtl="0" algn="l">
+      <a:lvl4pPr marR="0" lvl="3" algn="l" rtl="0">
         <a:lnSpc>
           <a:spcPct val="100000"/>
         </a:lnSpc>
@@ -4725,7 +5002,7 @@
           <a:spcPts val="0"/>
         </a:spcAft>
         <a:buNone/>
-        <a:defRPr b="0" i="0" sz="1400" u="none" cap="none" strike="noStrike">
+        <a:defRPr sz="1400" b="0" i="0" u="none" strike="noStrike" cap="none">
           <a:solidFill>
             <a:srgbClr val="000000"/>
           </a:solidFill>
@@ -4735,7 +5012,7 @@
           <a:sym typeface="Arial"/>
         </a:defRPr>
       </a:lvl4pPr>
-      <a:lvl5pPr lvl="4" marR="0" rtl="0" algn="l">
+      <a:lvl5pPr marR="0" lvl="4" algn="l" rtl="0">
         <a:lnSpc>
           <a:spcPct val="100000"/>
         </a:lnSpc>
@@ -4746,7 +5023,7 @@
           <a:spcPts val="0"/>
         </a:spcAft>
         <a:buNone/>
-        <a:defRPr b="0" i="0" sz="1400" u="none" cap="none" strike="noStrike">
+        <a:defRPr sz="1400" b="0" i="0" u="none" strike="noStrike" cap="none">
           <a:solidFill>
             <a:srgbClr val="000000"/>
           </a:solidFill>
@@ -4756,7 +5033,7 @@
           <a:sym typeface="Arial"/>
         </a:defRPr>
       </a:lvl5pPr>
-      <a:lvl6pPr lvl="5" marR="0" rtl="0" algn="l">
+      <a:lvl6pPr marR="0" lvl="5" algn="l" rtl="0">
         <a:lnSpc>
           <a:spcPct val="100000"/>
         </a:lnSpc>
@@ -4767,7 +5044,7 @@
           <a:spcPts val="0"/>
         </a:spcAft>
         <a:buNone/>
-        <a:defRPr b="0" i="0" sz="1400" u="none" cap="none" strike="noStrike">
+        <a:defRPr sz="1400" b="0" i="0" u="none" strike="noStrike" cap="none">
           <a:solidFill>
             <a:srgbClr val="000000"/>
           </a:solidFill>
@@ -4777,7 +5054,7 @@
           <a:sym typeface="Arial"/>
         </a:defRPr>
       </a:lvl6pPr>
-      <a:lvl7pPr lvl="6" marR="0" rtl="0" algn="l">
+      <a:lvl7pPr marR="0" lvl="6" algn="l" rtl="0">
         <a:lnSpc>
           <a:spcPct val="100000"/>
         </a:lnSpc>
@@ -4788,7 +5065,7 @@
           <a:spcPts val="0"/>
         </a:spcAft>
         <a:buNone/>
-        <a:defRPr b="0" i="0" sz="1400" u="none" cap="none" strike="noStrike">
+        <a:defRPr sz="1400" b="0" i="0" u="none" strike="noStrike" cap="none">
           <a:solidFill>
             <a:srgbClr val="000000"/>
           </a:solidFill>
@@ -4798,7 +5075,7 @@
           <a:sym typeface="Arial"/>
         </a:defRPr>
       </a:lvl7pPr>
-      <a:lvl8pPr lvl="7" marR="0" rtl="0" algn="l">
+      <a:lvl8pPr marR="0" lvl="7" algn="l" rtl="0">
         <a:lnSpc>
           <a:spcPct val="100000"/>
         </a:lnSpc>
@@ -4809,7 +5086,7 @@
           <a:spcPts val="0"/>
         </a:spcAft>
         <a:buNone/>
-        <a:defRPr b="0" i="0" sz="1400" u="none" cap="none" strike="noStrike">
+        <a:defRPr sz="1400" b="0" i="0" u="none" strike="noStrike" cap="none">
           <a:solidFill>
             <a:srgbClr val="000000"/>
           </a:solidFill>
@@ -4819,7 +5096,7 @@
           <a:sym typeface="Arial"/>
         </a:defRPr>
       </a:lvl8pPr>
-      <a:lvl9pPr lvl="8" marR="0" rtl="0" algn="l">
+      <a:lvl9pPr marR="0" lvl="8" algn="l" rtl="0">
         <a:lnSpc>
           <a:spcPct val="100000"/>
         </a:lnSpc>
@@ -4830,7 +5107,7 @@
           <a:spcPts val="0"/>
         </a:spcAft>
         <a:buNone/>
-        <a:defRPr b="0" i="0" sz="1400" u="none" cap="none" strike="noStrike">
+        <a:defRPr sz="1400" b="0" i="0" u="none" strike="noStrike" cap="none">
           <a:solidFill>
             <a:srgbClr val="000000"/>
           </a:solidFill>
@@ -4845,12 +5122,12 @@
 </p:sldMaster>
 </file>
 
-<file path=ppt/slides/slide.xml><?xml version="1.0" encoding="utf-8"?>
-<p:sld xmlns:a="http://schemas.openxmlformats.org/drawingml/2006/main" xmlns:r="http://schemas.openxmlformats.org/officeDocument/2006/relationships" xmlns:mc="http://schemas.openxmlformats.org/markup-compatibility/2006" xmlns:mv="urn:schemas-microsoft-com:mac:vml" xmlns:p="http://schemas.openxmlformats.org/presentationml/2006/main" xmlns:c="http://schemas.openxmlformats.org/drawingml/2006/chart" xmlns:dgm="http://schemas.openxmlformats.org/drawingml/2006/diagram" xmlns:o="urn:schemas-microsoft-com:office:office" xmlns:v="urn:schemas-microsoft-com:vml" xmlns:pvml="urn:schemas-microsoft-com:office:powerpoint" xmlns:com="http://schemas.openxmlformats.org/drawingml/2006/compatibility" xmlns:p14="http://schemas.microsoft.com/office/powerpoint/2010/main">
+<file path=ppt/slides/slide1.xml><?xml version="1.0" encoding="utf-8"?>
+<p:sld xmlns:a="http://schemas.openxmlformats.org/drawingml/2006/main" xmlns:r="http://schemas.openxmlformats.org/officeDocument/2006/relationships" xmlns:p="http://schemas.openxmlformats.org/presentationml/2006/main">
   <p:cSld>
     <p:spTree>
       <p:nvGrpSpPr>
-        <p:cNvPr id="65" name="Shape 65"/>
+        <p:cNvPr id="1" name="Shape 65"/>
         <p:cNvGrpSpPr/>
         <p:nvPr/>
       </p:nvGrpSpPr>
@@ -4865,7 +5142,9 @@
       <p:sp>
         <p:nvSpPr>
           <p:cNvPr id="66" name="Shape 66"/>
-          <p:cNvSpPr txBox="1"/>
+          <p:cNvSpPr txBox="1">
+            <a:spLocks noGrp="1"/>
+          </p:cNvSpPr>
           <p:nvPr>
             <p:ph type="ctrTitle"/>
           </p:nvPr>
@@ -4880,7 +5159,7 @@
           </a:prstGeom>
         </p:spPr>
         <p:txBody>
-          <a:bodyPr anchorCtr="0" anchor="b" bIns="91425" lIns="91425" rIns="91425" tIns="91425">
+          <a:bodyPr lIns="91425" tIns="91425" rIns="91425" bIns="91425" anchor="b" anchorCtr="0">
             <a:noAutofit/>
           </a:bodyPr>
           <a:lstStyle/>
@@ -4901,9 +5180,11 @@
       <p:sp>
         <p:nvSpPr>
           <p:cNvPr id="67" name="Shape 67"/>
-          <p:cNvSpPr txBox="1"/>
+          <p:cNvSpPr txBox="1">
+            <a:spLocks noGrp="1"/>
+          </p:cNvSpPr>
           <p:nvPr>
-            <p:ph idx="1" type="subTitle"/>
+            <p:ph type="subTitle" idx="1"/>
           </p:nvPr>
         </p:nvSpPr>
         <p:spPr>
@@ -4916,7 +5197,7 @@
           </a:prstGeom>
         </p:spPr>
         <p:txBody>
-          <a:bodyPr anchorCtr="0" anchor="t" bIns="91425" lIns="91425" rIns="91425" tIns="91425">
+          <a:bodyPr lIns="91425" tIns="91425" rIns="91425" bIns="91425" anchor="t" anchorCtr="0">
             <a:noAutofit/>
           </a:bodyPr>
           <a:lstStyle/>
@@ -4945,12 +5226,12 @@
 </p:sld>
 </file>
 
-<file path=ppt/slides/slide1.xml><?xml version="1.0" encoding="utf-8"?>
-<p:sld xmlns:a="http://schemas.openxmlformats.org/drawingml/2006/main" xmlns:r="http://schemas.openxmlformats.org/officeDocument/2006/relationships" xmlns:mc="http://schemas.openxmlformats.org/markup-compatibility/2006" xmlns:mv="urn:schemas-microsoft-com:mac:vml" xmlns:p="http://schemas.openxmlformats.org/presentationml/2006/main" xmlns:c="http://schemas.openxmlformats.org/drawingml/2006/chart" xmlns:dgm="http://schemas.openxmlformats.org/drawingml/2006/diagram" xmlns:o="urn:schemas-microsoft-com:office:office" xmlns:v="urn:schemas-microsoft-com:vml" xmlns:pvml="urn:schemas-microsoft-com:office:powerpoint" xmlns:com="http://schemas.openxmlformats.org/drawingml/2006/compatibility" xmlns:p14="http://schemas.microsoft.com/office/powerpoint/2010/main">
+<file path=ppt/slides/slide2.xml><?xml version="1.0" encoding="utf-8"?>
+<p:sld xmlns:a="http://schemas.openxmlformats.org/drawingml/2006/main" xmlns:r="http://schemas.openxmlformats.org/officeDocument/2006/relationships" xmlns:p="http://schemas.openxmlformats.org/presentationml/2006/main">
   <p:cSld>
     <p:spTree>
       <p:nvGrpSpPr>
-        <p:cNvPr id="71" name="Shape 71"/>
+        <p:cNvPr id="1" name="Shape 71"/>
         <p:cNvGrpSpPr/>
         <p:nvPr/>
       </p:nvGrpSpPr>
@@ -4965,7 +5246,9 @@
       <p:sp>
         <p:nvSpPr>
           <p:cNvPr id="72" name="Shape 72"/>
-          <p:cNvSpPr txBox="1"/>
+          <p:cNvSpPr txBox="1">
+            <a:spLocks noGrp="1"/>
+          </p:cNvSpPr>
           <p:nvPr>
             <p:ph type="title"/>
           </p:nvPr>
@@ -4980,7 +5263,7 @@
           </a:prstGeom>
         </p:spPr>
         <p:txBody>
-          <a:bodyPr anchorCtr="0" anchor="t" bIns="91425" lIns="91425" rIns="91425" tIns="91425">
+          <a:bodyPr lIns="91425" tIns="91425" rIns="91425" bIns="91425" anchor="t" anchorCtr="0">
             <a:noAutofit/>
           </a:bodyPr>
           <a:lstStyle/>
@@ -5001,9 +5284,11 @@
       <p:sp>
         <p:nvSpPr>
           <p:cNvPr id="73" name="Shape 73"/>
-          <p:cNvSpPr txBox="1"/>
+          <p:cNvSpPr txBox="1">
+            <a:spLocks noGrp="1"/>
+          </p:cNvSpPr>
           <p:nvPr>
-            <p:ph idx="1" type="body"/>
+            <p:ph type="body" idx="1"/>
           </p:nvPr>
         </p:nvSpPr>
         <p:spPr>
@@ -5016,7 +5301,7 @@
           </a:prstGeom>
         </p:spPr>
         <p:txBody>
-          <a:bodyPr anchorCtr="0" anchor="t" bIns="91425" lIns="91425" rIns="91425" tIns="91425">
+          <a:bodyPr lIns="91425" tIns="91425" rIns="91425" bIns="91425" anchor="t" anchorCtr="0">
             <a:noAutofit/>
           </a:bodyPr>
           <a:lstStyle/>
@@ -5057,16 +5342,30 @@
             </a:r>
           </a:p>
           <a:p>
-            <a:pPr lvl="0">
+            <a:pPr lvl="0" rtl="0">
               <a:spcBef>
                 <a:spcPts val="0"/>
               </a:spcBef>
               <a:buNone/>
             </a:pPr>
             <a:r>
-              <a:rPr lang="en"/>
+              <a:rPr lang="en" u="sng">
+                <a:solidFill>
+                  <a:schemeClr val="hlink"/>
+                </a:solidFill>
+                <a:hlinkClick r:id="rId3"/>
+              </a:rPr>
               <a:t>http://cordova.apache.org/</a:t>
             </a:r>
+          </a:p>
+          <a:p>
+            <a:pPr lvl="0">
+              <a:spcBef>
+                <a:spcPts val="0"/>
+              </a:spcBef>
+              <a:buNone/>
+            </a:pPr>
+            <a:endParaRPr/>
           </a:p>
         </p:txBody>
       </p:sp>
@@ -5081,12 +5380,12 @@
 </p:sld>
 </file>
 
-<file path=ppt/slides/slide2.xml><?xml version="1.0" encoding="utf-8"?>
-<p:sld xmlns:a="http://schemas.openxmlformats.org/drawingml/2006/main" xmlns:r="http://schemas.openxmlformats.org/officeDocument/2006/relationships" xmlns:mc="http://schemas.openxmlformats.org/markup-compatibility/2006" xmlns:mv="urn:schemas-microsoft-com:mac:vml" xmlns:p="http://schemas.openxmlformats.org/presentationml/2006/main" xmlns:c="http://schemas.openxmlformats.org/drawingml/2006/chart" xmlns:dgm="http://schemas.openxmlformats.org/drawingml/2006/diagram" xmlns:o="urn:schemas-microsoft-com:office:office" xmlns:v="urn:schemas-microsoft-com:vml" xmlns:pvml="urn:schemas-microsoft-com:office:powerpoint" xmlns:com="http://schemas.openxmlformats.org/drawingml/2006/compatibility" xmlns:p14="http://schemas.microsoft.com/office/powerpoint/2010/main">
+<file path=ppt/slides/slide3.xml><?xml version="1.0" encoding="utf-8"?>
+<p:sld xmlns:a="http://schemas.openxmlformats.org/drawingml/2006/main" xmlns:r="http://schemas.openxmlformats.org/officeDocument/2006/relationships" xmlns:p="http://schemas.openxmlformats.org/presentationml/2006/main">
   <p:cSld>
     <p:spTree>
       <p:nvGrpSpPr>
-        <p:cNvPr id="77" name="Shape 77"/>
+        <p:cNvPr id="1" name="Shape 77"/>
         <p:cNvGrpSpPr/>
         <p:nvPr/>
       </p:nvGrpSpPr>
@@ -5101,7 +5400,9 @@
       <p:sp>
         <p:nvSpPr>
           <p:cNvPr id="78" name="Shape 78"/>
-          <p:cNvSpPr txBox="1"/>
+          <p:cNvSpPr txBox="1">
+            <a:spLocks noGrp="1"/>
+          </p:cNvSpPr>
           <p:nvPr>
             <p:ph type="title"/>
           </p:nvPr>
@@ -5116,7 +5417,7 @@
           </a:prstGeom>
         </p:spPr>
         <p:txBody>
-          <a:bodyPr anchorCtr="0" anchor="t" bIns="91425" lIns="91425" rIns="91425" tIns="91425">
+          <a:bodyPr lIns="91425" tIns="91425" rIns="91425" bIns="91425" anchor="t" anchorCtr="0">
             <a:noAutofit/>
           </a:bodyPr>
           <a:lstStyle/>
@@ -5137,9 +5438,11 @@
       <p:sp>
         <p:nvSpPr>
           <p:cNvPr id="79" name="Shape 79"/>
-          <p:cNvSpPr txBox="1"/>
+          <p:cNvSpPr txBox="1">
+            <a:spLocks noGrp="1"/>
+          </p:cNvSpPr>
           <p:nvPr>
-            <p:ph idx="1" type="body"/>
+            <p:ph type="body" idx="1"/>
           </p:nvPr>
         </p:nvSpPr>
         <p:spPr>
@@ -5152,7 +5455,7 @@
           </a:prstGeom>
         </p:spPr>
         <p:txBody>
-          <a:bodyPr anchorCtr="0" anchor="t" bIns="91425" lIns="91425" rIns="91425" tIns="91425">
+          <a:bodyPr lIns="91425" tIns="91425" rIns="91425" bIns="91425" anchor="t" anchorCtr="0">
             <a:noAutofit/>
           </a:bodyPr>
           <a:lstStyle/>
@@ -5205,7 +5508,24 @@
             </a:r>
           </a:p>
           <a:p>
-            <a:pPr lvl="0">
+            <a:pPr lvl="0" rtl="0">
+              <a:spcBef>
+                <a:spcPts val="0"/>
+              </a:spcBef>
+              <a:buNone/>
+            </a:pPr>
+            <a:r>
+              <a:rPr lang="en" u="sng">
+                <a:solidFill>
+                  <a:schemeClr val="hlink"/>
+                </a:solidFill>
+                <a:hlinkClick r:id="rId3"/>
+              </a:rPr>
+              <a:t>http://reapp.io/</a:t>
+            </a:r>
+          </a:p>
+          <a:p>
+            <a:pPr lvl="0" rtl="0">
               <a:spcBef>
                 <a:spcPts val="0"/>
               </a:spcBef>
@@ -5213,8 +5533,17 @@
             </a:pPr>
             <a:r>
               <a:rPr lang="en"/>
-              <a:t>http://reapp.io/</a:t>
+              <a:t>Interactive Animations</a:t>
             </a:r>
+          </a:p>
+          <a:p>
+            <a:pPr lvl="0">
+              <a:spcBef>
+                <a:spcPts val="0"/>
+              </a:spcBef>
+              <a:buNone/>
+            </a:pPr>
+            <a:endParaRPr/>
           </a:p>
         </p:txBody>
       </p:sp>
@@ -5229,12 +5558,12 @@
 </p:sld>
 </file>
 
-<file path=ppt/slides/slide3.xml><?xml version="1.0" encoding="utf-8"?>
-<p:sld xmlns:a="http://schemas.openxmlformats.org/drawingml/2006/main" xmlns:r="http://schemas.openxmlformats.org/officeDocument/2006/relationships" xmlns:mc="http://schemas.openxmlformats.org/markup-compatibility/2006" xmlns:mv="urn:schemas-microsoft-com:mac:vml" xmlns:p="http://schemas.openxmlformats.org/presentationml/2006/main" xmlns:c="http://schemas.openxmlformats.org/drawingml/2006/chart" xmlns:dgm="http://schemas.openxmlformats.org/drawingml/2006/diagram" xmlns:o="urn:schemas-microsoft-com:office:office" xmlns:v="urn:schemas-microsoft-com:vml" xmlns:pvml="urn:schemas-microsoft-com:office:powerpoint" xmlns:com="http://schemas.openxmlformats.org/drawingml/2006/compatibility" xmlns:p14="http://schemas.microsoft.com/office/powerpoint/2010/main">
+<file path=ppt/slides/slide4.xml><?xml version="1.0" encoding="utf-8"?>
+<p:sld xmlns:a="http://schemas.openxmlformats.org/drawingml/2006/main" xmlns:r="http://schemas.openxmlformats.org/officeDocument/2006/relationships" xmlns:p="http://schemas.openxmlformats.org/presentationml/2006/main">
   <p:cSld>
     <p:spTree>
       <p:nvGrpSpPr>
-        <p:cNvPr id="83" name="Shape 83"/>
+        <p:cNvPr id="1" name="Shape 83"/>
         <p:cNvGrpSpPr/>
         <p:nvPr/>
       </p:nvGrpSpPr>
@@ -5313,12 +5642,12 @@
 </p:sld>
 </file>
 
-<file path=ppt/slides/slide4.xml><?xml version="1.0" encoding="utf-8"?>
-<p:sld xmlns:a="http://schemas.openxmlformats.org/drawingml/2006/main" xmlns:r="http://schemas.openxmlformats.org/officeDocument/2006/relationships" xmlns:mc="http://schemas.openxmlformats.org/markup-compatibility/2006" xmlns:mv="urn:schemas-microsoft-com:mac:vml" xmlns:p="http://schemas.openxmlformats.org/presentationml/2006/main" xmlns:c="http://schemas.openxmlformats.org/drawingml/2006/chart" xmlns:dgm="http://schemas.openxmlformats.org/drawingml/2006/diagram" xmlns:o="urn:schemas-microsoft-com:office:office" xmlns:v="urn:schemas-microsoft-com:vml" xmlns:pvml="urn:schemas-microsoft-com:office:powerpoint" xmlns:com="http://schemas.openxmlformats.org/drawingml/2006/compatibility" xmlns:p14="http://schemas.microsoft.com/office/powerpoint/2010/main">
+<file path=ppt/slides/slide5.xml><?xml version="1.0" encoding="utf-8"?>
+<p:sld xmlns:a="http://schemas.openxmlformats.org/drawingml/2006/main" xmlns:r="http://schemas.openxmlformats.org/officeDocument/2006/relationships" xmlns:p="http://schemas.openxmlformats.org/presentationml/2006/main">
   <p:cSld>
     <p:spTree>
       <p:nvGrpSpPr>
-        <p:cNvPr id="89" name="Shape 89"/>
+        <p:cNvPr id="1" name="Shape 89"/>
         <p:cNvGrpSpPr/>
         <p:nvPr/>
       </p:nvGrpSpPr>
@@ -5333,7 +5662,9 @@
       <p:sp>
         <p:nvSpPr>
           <p:cNvPr id="90" name="Shape 90"/>
-          <p:cNvSpPr txBox="1"/>
+          <p:cNvSpPr txBox="1">
+            <a:spLocks noGrp="1"/>
+          </p:cNvSpPr>
           <p:nvPr>
             <p:ph type="title"/>
           </p:nvPr>
@@ -5348,7 +5679,7 @@
           </a:prstGeom>
         </p:spPr>
         <p:txBody>
-          <a:bodyPr anchorCtr="0" anchor="t" bIns="91425" lIns="91425" rIns="91425" tIns="91425">
+          <a:bodyPr lIns="91425" tIns="91425" rIns="91425" bIns="91425" anchor="t" anchorCtr="0">
             <a:noAutofit/>
           </a:bodyPr>
           <a:lstStyle/>
@@ -5369,22 +5700,24 @@
       <p:sp>
         <p:nvSpPr>
           <p:cNvPr id="91" name="Shape 91"/>
-          <p:cNvSpPr txBox="1"/>
+          <p:cNvSpPr txBox="1">
+            <a:spLocks noGrp="1"/>
+          </p:cNvSpPr>
           <p:nvPr>
-            <p:ph idx="1" type="body"/>
+            <p:ph type="body" idx="1"/>
           </p:nvPr>
         </p:nvSpPr>
         <p:spPr>
           <a:xfrm>
-            <a:off x="311700" y="1266325"/>
-            <a:ext cx="8520599" cy="3302700"/>
+            <a:off x="311700" y="1266324"/>
+            <a:ext cx="6622500" cy="3591425"/>
           </a:xfrm>
           <a:prstGeom prst="rect">
             <a:avLst/>
           </a:prstGeom>
         </p:spPr>
         <p:txBody>
-          <a:bodyPr anchorCtr="0" anchor="t" bIns="91425" lIns="91425" rIns="91425" tIns="91425">
+          <a:bodyPr lIns="91425" tIns="91425" rIns="91425" bIns="91425" anchor="t" anchorCtr="0">
             <a:noAutofit/>
           </a:bodyPr>
           <a:lstStyle/>
@@ -5396,8 +5729,30 @@
               <a:buNone/>
             </a:pPr>
             <a:r>
-              <a:rPr lang="en"/>
-              <a:t>Ionic (Cordova Angular)</a:t>
+              <a:rPr lang="en" dirty="0"/>
+              <a:t>Ionic (Cordova Angular, Angular 2.0) </a:t>
+            </a:r>
+            <a:r>
+              <a:rPr lang="en" dirty="0"/>
+              <a:t> </a:t>
+            </a:r>
+            <a:r>
+              <a:rPr lang="en" u="sng" dirty="0" smtClean="0">
+                <a:solidFill>
+                  <a:schemeClr val="hlink"/>
+                </a:solidFill>
+                <a:hlinkClick r:id="rId3"/>
+              </a:rPr>
+              <a:t>http</a:t>
+            </a:r>
+            <a:r>
+              <a:rPr lang="en" u="sng" dirty="0">
+                <a:solidFill>
+                  <a:schemeClr val="hlink"/>
+                </a:solidFill>
+                <a:hlinkClick r:id="rId3"/>
+              </a:rPr>
+              <a:t>://blog.ionic.io/angular-2-ionic/</a:t>
             </a:r>
           </a:p>
           <a:p>
@@ -5408,8 +5763,26 @@
               <a:buNone/>
             </a:pPr>
             <a:r>
-              <a:rPr lang="en"/>
-              <a:t>TouchstoneJS (Cordova ReactJS)</a:t>
+              <a:rPr lang="en" dirty="0"/>
+              <a:t>TouchstoneJS (Cordova ReactJS) </a:t>
+            </a:r>
+            <a:r>
+              <a:rPr lang="en" u="sng" dirty="0" smtClean="0">
+                <a:solidFill>
+                  <a:schemeClr val="hlink"/>
+                </a:solidFill>
+                <a:hlinkClick r:id="rId4"/>
+              </a:rPr>
+              <a:t>https</a:t>
+            </a:r>
+            <a:r>
+              <a:rPr lang="en" u="sng" dirty="0">
+                <a:solidFill>
+                  <a:schemeClr val="hlink"/>
+                </a:solidFill>
+                <a:hlinkClick r:id="rId4"/>
+              </a:rPr>
+              <a:t>://github.com/touchstonejs/touchstonejs</a:t>
             </a:r>
           </a:p>
           <a:p>
@@ -5420,21 +5793,61 @@
               <a:buNone/>
             </a:pPr>
             <a:r>
-              <a:rPr lang="en"/>
-              <a:t>React Native (not Cordova)</a:t>
+              <a:rPr lang="en" dirty="0"/>
+              <a:t>React Native (not Cordova) </a:t>
             </a:r>
-          </a:p>
-          <a:p>
-            <a:pPr lvl="0">
+            <a:r>
+              <a:rPr lang="en" u="sng" dirty="0">
+                <a:solidFill>
+                  <a:schemeClr val="hlink"/>
+                </a:solidFill>
+                <a:hlinkClick r:id="rId5"/>
+              </a:rPr>
+              <a:t>http://www.reactnative.com/introducing-react-native/</a:t>
+            </a:r>
+          </a:p>
+          <a:p>
+            <a:pPr lvl="0" rtl="0">
               <a:spcBef>
                 <a:spcPts val="0"/>
               </a:spcBef>
               <a:buNone/>
             </a:pPr>
             <a:r>
-              <a:rPr lang="en"/>
-              <a:t>Meteor (like Cordova, Angular/React)</a:t>
+              <a:rPr lang="en" dirty="0"/>
+              <a:t>Meteor (like Cordova, </a:t>
             </a:r>
+            <a:r>
+              <a:rPr lang="en" dirty="0" smtClean="0"/>
+              <a:t>Angular/React) </a:t>
+            </a:r>
+            <a:r>
+              <a:rPr lang="en" u="sng" dirty="0" smtClean="0">
+                <a:solidFill>
+                  <a:schemeClr val="hlink"/>
+                </a:solidFill>
+                <a:hlinkClick r:id="rId6"/>
+              </a:rPr>
+              <a:t>https</a:t>
+            </a:r>
+            <a:r>
+              <a:rPr lang="en" u="sng" dirty="0">
+                <a:solidFill>
+                  <a:schemeClr val="hlink"/>
+                </a:solidFill>
+                <a:hlinkClick r:id="rId6"/>
+              </a:rPr>
+              <a:t>://github.com/meteor/meteor</a:t>
+            </a:r>
+          </a:p>
+          <a:p>
+            <a:pPr lvl="0">
+              <a:spcBef>
+                <a:spcPts val="0"/>
+              </a:spcBef>
+              <a:buNone/>
+            </a:pPr>
+            <a:endParaRPr dirty="0"/>
           </a:p>
         </p:txBody>
       </p:sp>
@@ -5449,12 +5862,12 @@
 </p:sld>
 </file>
 
-<file path=ppt/slides/slide5.xml><?xml version="1.0" encoding="utf-8"?>
-<p:sld xmlns:a="http://schemas.openxmlformats.org/drawingml/2006/main" xmlns:r="http://schemas.openxmlformats.org/officeDocument/2006/relationships" xmlns:mc="http://schemas.openxmlformats.org/markup-compatibility/2006" xmlns:mv="urn:schemas-microsoft-com:mac:vml" xmlns:p="http://schemas.openxmlformats.org/presentationml/2006/main" xmlns:c="http://schemas.openxmlformats.org/drawingml/2006/chart" xmlns:dgm="http://schemas.openxmlformats.org/drawingml/2006/diagram" xmlns:o="urn:schemas-microsoft-com:office:office" xmlns:v="urn:schemas-microsoft-com:vml" xmlns:pvml="urn:schemas-microsoft-com:office:powerpoint" xmlns:com="http://schemas.openxmlformats.org/drawingml/2006/compatibility" xmlns:p14="http://schemas.microsoft.com/office/powerpoint/2010/main">
+<file path=ppt/slides/slide6.xml><?xml version="1.0" encoding="utf-8"?>
+<p:sld xmlns:a="http://schemas.openxmlformats.org/drawingml/2006/main" xmlns:r="http://schemas.openxmlformats.org/officeDocument/2006/relationships" xmlns:p="http://schemas.openxmlformats.org/presentationml/2006/main">
   <p:cSld>
     <p:spTree>
       <p:nvGrpSpPr>
-        <p:cNvPr id="95" name="Shape 95"/>
+        <p:cNvPr id="1" name="Shape 95"/>
         <p:cNvGrpSpPr/>
         <p:nvPr/>
       </p:nvGrpSpPr>
@@ -5469,7 +5882,9 @@
       <p:sp>
         <p:nvSpPr>
           <p:cNvPr id="96" name="Shape 96"/>
-          <p:cNvSpPr txBox="1"/>
+          <p:cNvSpPr txBox="1">
+            <a:spLocks noGrp="1"/>
+          </p:cNvSpPr>
           <p:nvPr>
             <p:ph type="title"/>
           </p:nvPr>
@@ -5484,7 +5899,7 @@
           </a:prstGeom>
         </p:spPr>
         <p:txBody>
-          <a:bodyPr anchorCtr="0" anchor="t" bIns="91425" lIns="91425" rIns="91425" tIns="91425">
+          <a:bodyPr lIns="91425" tIns="91425" rIns="91425" bIns="91425" anchor="t" anchorCtr="0">
             <a:noAutofit/>
           </a:bodyPr>
           <a:lstStyle/>
@@ -5505,9 +5920,11 @@
       <p:sp>
         <p:nvSpPr>
           <p:cNvPr id="97" name="Shape 97"/>
-          <p:cNvSpPr txBox="1"/>
+          <p:cNvSpPr txBox="1">
+            <a:spLocks noGrp="1"/>
+          </p:cNvSpPr>
           <p:nvPr>
-            <p:ph idx="1" type="body"/>
+            <p:ph type="body" idx="1"/>
           </p:nvPr>
         </p:nvSpPr>
         <p:spPr>
@@ -5520,7 +5937,7 @@
           </a:prstGeom>
         </p:spPr>
         <p:txBody>
-          <a:bodyPr anchorCtr="0" anchor="t" bIns="91425" lIns="91425" rIns="91425" tIns="91425">
+          <a:bodyPr lIns="91425" tIns="91425" rIns="91425" bIns="91425" anchor="t" anchorCtr="0">
             <a:noAutofit/>
           </a:bodyPr>
           <a:lstStyle/>
@@ -5532,21 +5949,40 @@
               <a:buNone/>
             </a:pPr>
             <a:r>
-              <a:rPr lang="en"/>
+              <a:rPr lang="en" u="sng">
+                <a:solidFill>
+                  <a:schemeClr val="hlink"/>
+                </a:solidFill>
+                <a:hlinkClick r:id="rId3"/>
+              </a:rPr>
               <a:t>https://github.com/rlloyd2001/reapp-presentation</a:t>
             </a:r>
           </a:p>
           <a:p>
-            <a:pPr lvl="0">
+            <a:pPr lvl="0" rtl="0">
               <a:spcBef>
                 <a:spcPts val="0"/>
               </a:spcBef>
               <a:buNone/>
             </a:pPr>
             <a:r>
-              <a:rPr lang="en"/>
+              <a:rPr lang="en" u="sng">
+                <a:solidFill>
+                  <a:schemeClr val="hlink"/>
+                </a:solidFill>
+                <a:hlinkClick r:id="rId4"/>
+              </a:rPr>
               <a:t>https://github.com/reapp/kitchen-sink</a:t>
             </a:r>
+          </a:p>
+          <a:p>
+            <a:pPr lvl="0">
+              <a:spcBef>
+                <a:spcPts val="0"/>
+              </a:spcBef>
+              <a:buNone/>
+            </a:pPr>
+            <a:endParaRPr/>
           </a:p>
         </p:txBody>
       </p:sp>
@@ -5561,8 +5997,289 @@
 </p:sld>
 </file>
 
-<file path=ppt/theme/theme.xml><?xml version="1.0" encoding="utf-8"?>
-<a:theme xmlns:a="http://schemas.openxmlformats.org/drawingml/2006/main" xmlns:r="http://schemas.openxmlformats.org/officeDocument/2006/relationships" name="Custom Theme">
+<file path=ppt/theme/theme1.xml><?xml version="1.0" encoding="utf-8"?>
+<a:theme xmlns:a="http://schemas.openxmlformats.org/drawingml/2006/main" name="tropic">
+  <a:themeElements>
+    <a:clrScheme name="Tropic">
+      <a:dk1>
+        <a:srgbClr val="A1E8D9"/>
+      </a:dk1>
+      <a:lt1>
+        <a:srgbClr val="FFFFFF"/>
+      </a:lt1>
+      <a:dk2>
+        <a:srgbClr val="695D46"/>
+      </a:dk2>
+      <a:lt2>
+        <a:srgbClr val="B3A77D"/>
+      </a:lt2>
+      <a:accent1>
+        <a:srgbClr val="EF6C00"/>
+      </a:accent1>
+      <a:accent2>
+        <a:srgbClr val="009668"/>
+      </a:accent2>
+      <a:accent3>
+        <a:srgbClr val="4DB6AC"/>
+      </a:accent3>
+      <a:accent4>
+        <a:srgbClr val="FF9800"/>
+      </a:accent4>
+      <a:accent5>
+        <a:srgbClr val="CE93D8"/>
+      </a:accent5>
+      <a:accent6>
+        <a:srgbClr val="EEFF41"/>
+      </a:accent6>
+      <a:hlink>
+        <a:srgbClr val="CE93D8"/>
+      </a:hlink>
+      <a:folHlink>
+        <a:srgbClr val="CE93D8"/>
+      </a:folHlink>
+    </a:clrScheme>
+    <a:fontScheme name="Office">
+      <a:majorFont>
+        <a:latin typeface="Arial"/>
+        <a:ea typeface=""/>
+        <a:cs typeface=""/>
+        <a:font script="Jpan" typeface="ＭＳ Ｐゴシック"/>
+        <a:font script="Hang" typeface="맑은 고딕"/>
+        <a:font script="Hans" typeface="宋体"/>
+        <a:font script="Hant" typeface="新細明體"/>
+        <a:font script="Arab" typeface="Times New Roman"/>
+        <a:font script="Hebr" typeface="Times New Roman"/>
+        <a:font script="Thai" typeface="Angsana New"/>
+        <a:font script="Ethi" typeface="Nyala"/>
+        <a:font script="Beng" typeface="Vrinda"/>
+        <a:font script="Gujr" typeface="Shruti"/>
+        <a:font script="Khmr" typeface="MoolBoran"/>
+        <a:font script="Knda" typeface="Tunga"/>
+        <a:font script="Guru" typeface="Raavi"/>
+        <a:font script="Cans" typeface="Euphemia"/>
+        <a:font script="Cher" typeface="Plantagenet Cherokee"/>
+        <a:font script="Yiii" typeface="Microsoft Yi Baiti"/>
+        <a:font script="Tibt" typeface="Microsoft Himalaya"/>
+        <a:font script="Thaa" typeface="MV Boli"/>
+        <a:font script="Deva" typeface="Mangal"/>
+        <a:font script="Telu" typeface="Gautami"/>
+        <a:font script="Taml" typeface="Latha"/>
+        <a:font script="Syrc" typeface="Estrangelo Edessa"/>
+        <a:font script="Orya" typeface="Kalinga"/>
+        <a:font script="Mlym" typeface="Kartika"/>
+        <a:font script="Laoo" typeface="DokChampa"/>
+        <a:font script="Sinh" typeface="Iskoola Pota"/>
+        <a:font script="Mong" typeface="Mongolian Baiti"/>
+        <a:font script="Viet" typeface="Times New Roman"/>
+        <a:font script="Uigh" typeface="Microsoft Uighur"/>
+        <a:font script="Geor" typeface="Sylfaen"/>
+      </a:majorFont>
+      <a:minorFont>
+        <a:latin typeface="Arial"/>
+        <a:ea typeface=""/>
+        <a:cs typeface=""/>
+        <a:font script="Jpan" typeface="ＭＳ Ｐゴシック"/>
+        <a:font script="Hang" typeface="맑은 고딕"/>
+        <a:font script="Hans" typeface="宋体"/>
+        <a:font script="Hant" typeface="新細明體"/>
+        <a:font script="Arab" typeface="Arial"/>
+        <a:font script="Hebr" typeface="Arial"/>
+        <a:font script="Thai" typeface="Cordia New"/>
+        <a:font script="Ethi" typeface="Nyala"/>
+        <a:font script="Beng" typeface="Vrinda"/>
+        <a:font script="Gujr" typeface="Shruti"/>
+        <a:font script="Khmr" typeface="DaunPenh"/>
+        <a:font script="Knda" typeface="Tunga"/>
+        <a:font script="Guru" typeface="Raavi"/>
+        <a:font script="Cans" typeface="Euphemia"/>
+        <a:font script="Cher" typeface="Plantagenet Cherokee"/>
+        <a:font script="Yiii" typeface="Microsoft Yi Baiti"/>
+        <a:font script="Tibt" typeface="Microsoft Himalaya"/>
+        <a:font script="Thaa" typeface="MV Boli"/>
+        <a:font script="Deva" typeface="Mangal"/>
+        <a:font script="Telu" typeface="Gautami"/>
+        <a:font script="Taml" typeface="Latha"/>
+        <a:font script="Syrc" typeface="Estrangelo Edessa"/>
+        <a:font script="Orya" typeface="Kalinga"/>
+        <a:font script="Mlym" typeface="Kartika"/>
+        <a:font script="Laoo" typeface="DokChampa"/>
+        <a:font script="Sinh" typeface="Iskoola Pota"/>
+        <a:font script="Mong" typeface="Mongolian Baiti"/>
+        <a:font script="Viet" typeface="Arial"/>
+        <a:font script="Uigh" typeface="Microsoft Uighur"/>
+        <a:font script="Geor" typeface="Sylfaen"/>
+      </a:minorFont>
+    </a:fontScheme>
+    <a:fmtScheme name="Office">
+      <a:fillStyleLst>
+        <a:solidFill>
+          <a:schemeClr val="phClr"/>
+        </a:solidFill>
+        <a:gradFill rotWithShape="1">
+          <a:gsLst>
+            <a:gs pos="0">
+              <a:schemeClr val="phClr">
+                <a:tint val="50000"/>
+                <a:satMod val="300000"/>
+              </a:schemeClr>
+            </a:gs>
+            <a:gs pos="35000">
+              <a:schemeClr val="phClr">
+                <a:tint val="37000"/>
+                <a:satMod val="300000"/>
+              </a:schemeClr>
+            </a:gs>
+            <a:gs pos="100000">
+              <a:schemeClr val="phClr">
+                <a:tint val="15000"/>
+                <a:satMod val="350000"/>
+              </a:schemeClr>
+            </a:gs>
+          </a:gsLst>
+          <a:lin ang="16200000" scaled="1"/>
+        </a:gradFill>
+        <a:gradFill rotWithShape="1">
+          <a:gsLst>
+            <a:gs pos="0">
+              <a:schemeClr val="phClr">
+                <a:tint val="100000"/>
+                <a:shade val="100000"/>
+                <a:satMod val="130000"/>
+              </a:schemeClr>
+            </a:gs>
+            <a:gs pos="100000">
+              <a:schemeClr val="phClr">
+                <a:tint val="50000"/>
+                <a:shade val="100000"/>
+                <a:satMod val="350000"/>
+              </a:schemeClr>
+            </a:gs>
+          </a:gsLst>
+          <a:lin ang="16200000" scaled="0"/>
+        </a:gradFill>
+      </a:fillStyleLst>
+      <a:lnStyleLst>
+        <a:ln w="9525" cap="flat" cmpd="sng" algn="ctr">
+          <a:solidFill>
+            <a:schemeClr val="phClr">
+              <a:shade val="95000"/>
+              <a:satMod val="105000"/>
+            </a:schemeClr>
+          </a:solidFill>
+          <a:prstDash val="solid"/>
+        </a:ln>
+        <a:ln w="25400" cap="flat" cmpd="sng" algn="ctr">
+          <a:solidFill>
+            <a:schemeClr val="phClr"/>
+          </a:solidFill>
+          <a:prstDash val="solid"/>
+        </a:ln>
+        <a:ln w="38100" cap="flat" cmpd="sng" algn="ctr">
+          <a:solidFill>
+            <a:schemeClr val="phClr"/>
+          </a:solidFill>
+          <a:prstDash val="solid"/>
+        </a:ln>
+      </a:lnStyleLst>
+      <a:effectStyleLst>
+        <a:effectStyle>
+          <a:effectLst>
+            <a:outerShdw blurRad="40000" dist="20000" dir="5400000" rotWithShape="0">
+              <a:srgbClr val="000000">
+                <a:alpha val="38000"/>
+              </a:srgbClr>
+            </a:outerShdw>
+          </a:effectLst>
+        </a:effectStyle>
+        <a:effectStyle>
+          <a:effectLst>
+            <a:outerShdw blurRad="40000" dist="23000" dir="5400000" rotWithShape="0">
+              <a:srgbClr val="000000">
+                <a:alpha val="35000"/>
+              </a:srgbClr>
+            </a:outerShdw>
+          </a:effectLst>
+        </a:effectStyle>
+        <a:effectStyle>
+          <a:effectLst>
+            <a:outerShdw blurRad="40000" dist="23000" dir="5400000" rotWithShape="0">
+              <a:srgbClr val="000000">
+                <a:alpha val="35000"/>
+              </a:srgbClr>
+            </a:outerShdw>
+          </a:effectLst>
+          <a:scene3d>
+            <a:camera prst="orthographicFront">
+              <a:rot lat="0" lon="0" rev="0"/>
+            </a:camera>
+            <a:lightRig rig="threePt" dir="t">
+              <a:rot lat="0" lon="0" rev="1200000"/>
+            </a:lightRig>
+          </a:scene3d>
+          <a:sp3d>
+            <a:bevelT w="63500" h="25400"/>
+          </a:sp3d>
+        </a:effectStyle>
+      </a:effectStyleLst>
+      <a:bgFillStyleLst>
+        <a:solidFill>
+          <a:schemeClr val="phClr"/>
+        </a:solidFill>
+        <a:gradFill rotWithShape="1">
+          <a:gsLst>
+            <a:gs pos="0">
+              <a:schemeClr val="phClr">
+                <a:tint val="40000"/>
+                <a:satMod val="350000"/>
+              </a:schemeClr>
+            </a:gs>
+            <a:gs pos="40000">
+              <a:schemeClr val="phClr">
+                <a:tint val="45000"/>
+                <a:shade val="99000"/>
+                <a:satMod val="350000"/>
+              </a:schemeClr>
+            </a:gs>
+            <a:gs pos="100000">
+              <a:schemeClr val="phClr">
+                <a:shade val="20000"/>
+                <a:satMod val="255000"/>
+              </a:schemeClr>
+            </a:gs>
+          </a:gsLst>
+          <a:path path="circle">
+            <a:fillToRect l="50000" t="-80000" r="50000" b="180000"/>
+          </a:path>
+        </a:gradFill>
+        <a:gradFill rotWithShape="1">
+          <a:gsLst>
+            <a:gs pos="0">
+              <a:schemeClr val="phClr">
+                <a:tint val="80000"/>
+                <a:satMod val="300000"/>
+              </a:schemeClr>
+            </a:gs>
+            <a:gs pos="100000">
+              <a:schemeClr val="phClr">
+                <a:shade val="30000"/>
+                <a:satMod val="200000"/>
+              </a:schemeClr>
+            </a:gs>
+          </a:gsLst>
+          <a:path path="circle">
+            <a:fillToRect l="50000" t="50000" r="50000" b="50000"/>
+          </a:path>
+        </a:gradFill>
+      </a:bgFillStyleLst>
+    </a:fmtScheme>
+  </a:themeElements>
+  <a:objectDefaults/>
+  <a:extraClrSchemeLst/>
+</a:theme>
+</file>
+
+<file path=ppt/theme/theme2.xml><?xml version="1.0" encoding="utf-8"?>
+<a:theme xmlns:a="http://schemas.openxmlformats.org/drawingml/2006/main" name="Custom Theme">
   <a:themeElements>
     <a:clrScheme name="Default">
       <a:dk1>
@@ -5837,284 +6554,7 @@
       </a:bgFillStyleLst>
     </a:fmtScheme>
   </a:themeElements>
-</a:theme>
-</file>
-
-<file path=ppt/theme/theme1.xml><?xml version="1.0" encoding="utf-8"?>
-<a:theme xmlns:a="http://schemas.openxmlformats.org/drawingml/2006/main" xmlns:r="http://schemas.openxmlformats.org/officeDocument/2006/relationships" name="tropic">
-  <a:themeElements>
-    <a:clrScheme name="Tropic">
-      <a:dk1>
-        <a:srgbClr val="A1E8D9"/>
-      </a:dk1>
-      <a:lt1>
-        <a:srgbClr val="FFFFFF"/>
-      </a:lt1>
-      <a:dk2>
-        <a:srgbClr val="695D46"/>
-      </a:dk2>
-      <a:lt2>
-        <a:srgbClr val="B3A77D"/>
-      </a:lt2>
-      <a:accent1>
-        <a:srgbClr val="EF6C00"/>
-      </a:accent1>
-      <a:accent2>
-        <a:srgbClr val="009668"/>
-      </a:accent2>
-      <a:accent3>
-        <a:srgbClr val="4DB6AC"/>
-      </a:accent3>
-      <a:accent4>
-        <a:srgbClr val="FF9800"/>
-      </a:accent4>
-      <a:accent5>
-        <a:srgbClr val="CE93D8"/>
-      </a:accent5>
-      <a:accent6>
-        <a:srgbClr val="EEFF41"/>
-      </a:accent6>
-      <a:hlink>
-        <a:srgbClr val="CE93D8"/>
-      </a:hlink>
-      <a:folHlink>
-        <a:srgbClr val="CE93D8"/>
-      </a:folHlink>
-    </a:clrScheme>
-    <a:fontScheme name="Office">
-      <a:majorFont>
-        <a:latin typeface="Arial"/>
-        <a:ea typeface=""/>
-        <a:cs typeface=""/>
-        <a:font script="Jpan" typeface="ＭＳ Ｐゴシック"/>
-        <a:font script="Hang" typeface="맑은 고딕"/>
-        <a:font script="Hans" typeface="宋体"/>
-        <a:font script="Hant" typeface="新細明體"/>
-        <a:font script="Arab" typeface="Times New Roman"/>
-        <a:font script="Hebr" typeface="Times New Roman"/>
-        <a:font script="Thai" typeface="Angsana New"/>
-        <a:font script="Ethi" typeface="Nyala"/>
-        <a:font script="Beng" typeface="Vrinda"/>
-        <a:font script="Gujr" typeface="Shruti"/>
-        <a:font script="Khmr" typeface="MoolBoran"/>
-        <a:font script="Knda" typeface="Tunga"/>
-        <a:font script="Guru" typeface="Raavi"/>
-        <a:font script="Cans" typeface="Euphemia"/>
-        <a:font script="Cher" typeface="Plantagenet Cherokee"/>
-        <a:font script="Yiii" typeface="Microsoft Yi Baiti"/>
-        <a:font script="Tibt" typeface="Microsoft Himalaya"/>
-        <a:font script="Thaa" typeface="MV Boli"/>
-        <a:font script="Deva" typeface="Mangal"/>
-        <a:font script="Telu" typeface="Gautami"/>
-        <a:font script="Taml" typeface="Latha"/>
-        <a:font script="Syrc" typeface="Estrangelo Edessa"/>
-        <a:font script="Orya" typeface="Kalinga"/>
-        <a:font script="Mlym" typeface="Kartika"/>
-        <a:font script="Laoo" typeface="DokChampa"/>
-        <a:font script="Sinh" typeface="Iskoola Pota"/>
-        <a:font script="Mong" typeface="Mongolian Baiti"/>
-        <a:font script="Viet" typeface="Times New Roman"/>
-        <a:font script="Uigh" typeface="Microsoft Uighur"/>
-        <a:font script="Geor" typeface="Sylfaen"/>
-      </a:majorFont>
-      <a:minorFont>
-        <a:latin typeface="Arial"/>
-        <a:ea typeface=""/>
-        <a:cs typeface=""/>
-        <a:font script="Jpan" typeface="ＭＳ Ｐゴシック"/>
-        <a:font script="Hang" typeface="맑은 고딕"/>
-        <a:font script="Hans" typeface="宋体"/>
-        <a:font script="Hant" typeface="新細明體"/>
-        <a:font script="Arab" typeface="Arial"/>
-        <a:font script="Hebr" typeface="Arial"/>
-        <a:font script="Thai" typeface="Cordia New"/>
-        <a:font script="Ethi" typeface="Nyala"/>
-        <a:font script="Beng" typeface="Vrinda"/>
-        <a:font script="Gujr" typeface="Shruti"/>
-        <a:font script="Khmr" typeface="DaunPenh"/>
-        <a:font script="Knda" typeface="Tunga"/>
-        <a:font script="Guru" typeface="Raavi"/>
-        <a:font script="Cans" typeface="Euphemia"/>
-        <a:font script="Cher" typeface="Plantagenet Cherokee"/>
-        <a:font script="Yiii" typeface="Microsoft Yi Baiti"/>
-        <a:font script="Tibt" typeface="Microsoft Himalaya"/>
-        <a:font script="Thaa" typeface="MV Boli"/>
-        <a:font script="Deva" typeface="Mangal"/>
-        <a:font script="Telu" typeface="Gautami"/>
-        <a:font script="Taml" typeface="Latha"/>
-        <a:font script="Syrc" typeface="Estrangelo Edessa"/>
-        <a:font script="Orya" typeface="Kalinga"/>
-        <a:font script="Mlym" typeface="Kartika"/>
-        <a:font script="Laoo" typeface="DokChampa"/>
-        <a:font script="Sinh" typeface="Iskoola Pota"/>
-        <a:font script="Mong" typeface="Mongolian Baiti"/>
-        <a:font script="Viet" typeface="Arial"/>
-        <a:font script="Uigh" typeface="Microsoft Uighur"/>
-        <a:font script="Geor" typeface="Sylfaen"/>
-      </a:minorFont>
-    </a:fontScheme>
-    <a:fmtScheme name="Office">
-      <a:fillStyleLst>
-        <a:solidFill>
-          <a:schemeClr val="phClr"/>
-        </a:solidFill>
-        <a:gradFill rotWithShape="1">
-          <a:gsLst>
-            <a:gs pos="0">
-              <a:schemeClr val="phClr">
-                <a:tint val="50000"/>
-                <a:satMod val="300000"/>
-              </a:schemeClr>
-            </a:gs>
-            <a:gs pos="35000">
-              <a:schemeClr val="phClr">
-                <a:tint val="37000"/>
-                <a:satMod val="300000"/>
-              </a:schemeClr>
-            </a:gs>
-            <a:gs pos="100000">
-              <a:schemeClr val="phClr">
-                <a:tint val="15000"/>
-                <a:satMod val="350000"/>
-              </a:schemeClr>
-            </a:gs>
-          </a:gsLst>
-          <a:lin ang="16200000" scaled="1"/>
-        </a:gradFill>
-        <a:gradFill rotWithShape="1">
-          <a:gsLst>
-            <a:gs pos="0">
-              <a:schemeClr val="phClr">
-                <a:tint val="100000"/>
-                <a:shade val="100000"/>
-                <a:satMod val="130000"/>
-              </a:schemeClr>
-            </a:gs>
-            <a:gs pos="100000">
-              <a:schemeClr val="phClr">
-                <a:tint val="50000"/>
-                <a:shade val="100000"/>
-                <a:satMod val="350000"/>
-              </a:schemeClr>
-            </a:gs>
-          </a:gsLst>
-          <a:lin ang="16200000" scaled="0"/>
-        </a:gradFill>
-      </a:fillStyleLst>
-      <a:lnStyleLst>
-        <a:ln w="9525" cap="flat" cmpd="sng" algn="ctr">
-          <a:solidFill>
-            <a:schemeClr val="phClr">
-              <a:shade val="95000"/>
-              <a:satMod val="105000"/>
-            </a:schemeClr>
-          </a:solidFill>
-          <a:prstDash val="solid"/>
-        </a:ln>
-        <a:ln w="25400" cap="flat" cmpd="sng" algn="ctr">
-          <a:solidFill>
-            <a:schemeClr val="phClr"/>
-          </a:solidFill>
-          <a:prstDash val="solid"/>
-        </a:ln>
-        <a:ln w="38100" cap="flat" cmpd="sng" algn="ctr">
-          <a:solidFill>
-            <a:schemeClr val="phClr"/>
-          </a:solidFill>
-          <a:prstDash val="solid"/>
-        </a:ln>
-      </a:lnStyleLst>
-      <a:effectStyleLst>
-        <a:effectStyle>
-          <a:effectLst>
-            <a:outerShdw blurRad="40000" dist="20000" dir="5400000" rotWithShape="0">
-              <a:srgbClr val="000000">
-                <a:alpha val="38000"/>
-              </a:srgbClr>
-            </a:outerShdw>
-          </a:effectLst>
-        </a:effectStyle>
-        <a:effectStyle>
-          <a:effectLst>
-            <a:outerShdw blurRad="40000" dist="23000" dir="5400000" rotWithShape="0">
-              <a:srgbClr val="000000">
-                <a:alpha val="35000"/>
-              </a:srgbClr>
-            </a:outerShdw>
-          </a:effectLst>
-        </a:effectStyle>
-        <a:effectStyle>
-          <a:effectLst>
-            <a:outerShdw blurRad="40000" dist="23000" dir="5400000" rotWithShape="0">
-              <a:srgbClr val="000000">
-                <a:alpha val="35000"/>
-              </a:srgbClr>
-            </a:outerShdw>
-          </a:effectLst>
-          <a:scene3d>
-            <a:camera prst="orthographicFront">
-              <a:rot lat="0" lon="0" rev="0"/>
-            </a:camera>
-            <a:lightRig rig="threePt" dir="t">
-              <a:rot lat="0" lon="0" rev="1200000"/>
-            </a:lightRig>
-          </a:scene3d>
-          <a:sp3d>
-            <a:bevelT w="63500" h="25400"/>
-          </a:sp3d>
-        </a:effectStyle>
-      </a:effectStyleLst>
-      <a:bgFillStyleLst>
-        <a:solidFill>
-          <a:schemeClr val="phClr"/>
-        </a:solidFill>
-        <a:gradFill rotWithShape="1">
-          <a:gsLst>
-            <a:gs pos="0">
-              <a:schemeClr val="phClr">
-                <a:tint val="40000"/>
-                <a:satMod val="350000"/>
-              </a:schemeClr>
-            </a:gs>
-            <a:gs pos="40000">
-              <a:schemeClr val="phClr">
-                <a:tint val="45000"/>
-                <a:shade val="99000"/>
-                <a:satMod val="350000"/>
-              </a:schemeClr>
-            </a:gs>
-            <a:gs pos="100000">
-              <a:schemeClr val="phClr">
-                <a:shade val="20000"/>
-                <a:satMod val="255000"/>
-              </a:schemeClr>
-            </a:gs>
-          </a:gsLst>
-          <a:path path="circle">
-            <a:fillToRect l="50000" t="-80000" r="50000" b="180000"/>
-          </a:path>
-        </a:gradFill>
-        <a:gradFill rotWithShape="1">
-          <a:gsLst>
-            <a:gs pos="0">
-              <a:schemeClr val="phClr">
-                <a:tint val="80000"/>
-                <a:satMod val="300000"/>
-              </a:schemeClr>
-            </a:gs>
-            <a:gs pos="100000">
-              <a:schemeClr val="phClr">
-                <a:shade val="30000"/>
-                <a:satMod val="200000"/>
-              </a:schemeClr>
-            </a:gs>
-          </a:gsLst>
-          <a:path path="circle">
-            <a:fillToRect l="50000" t="50000" r="50000" b="50000"/>
-          </a:path>
-        </a:gradFill>
-      </a:bgFillStyleLst>
-    </a:fmtScheme>
-  </a:themeElements>
+  <a:objectDefaults/>
+  <a:extraClrSchemeLst/>
 </a:theme>
 </file>
</xml_diff>